<commit_message>
Trabalhos Relacionados e Funcionamento
</commit_message>
<xml_diff>
--- a/Apresentação - Projeto.pptx
+++ b/Apresentação - Projeto.pptx
@@ -8,10 +8,14 @@
     <p:sldId id="256" r:id="rId2"/>
     <p:sldId id="257" r:id="rId3"/>
     <p:sldId id="258" r:id="rId4"/>
-    <p:sldId id="259" r:id="rId5"/>
-    <p:sldId id="265" r:id="rId6"/>
-    <p:sldId id="261" r:id="rId7"/>
-    <p:sldId id="262" r:id="rId8"/>
+    <p:sldId id="266" r:id="rId5"/>
+    <p:sldId id="268" r:id="rId6"/>
+    <p:sldId id="267" r:id="rId7"/>
+    <p:sldId id="259" r:id="rId8"/>
+    <p:sldId id="265" r:id="rId9"/>
+    <p:sldId id="269" r:id="rId10"/>
+    <p:sldId id="261" r:id="rId11"/>
+    <p:sldId id="262" r:id="rId12"/>
   </p:sldIdLst>
   <p:sldSz cx="9144000" cy="6858000" type="screen4x3"/>
   <p:notesSz cx="6858000" cy="9144000"/>
@@ -118,6 +122,10 @@
 </p:presentation>
 </file>
 
+<file path=ppt/revisionInfo.xml><?xml version="1.0" encoding="utf-8"?>
+<p1510:revInfo xmlns:a="http://schemas.openxmlformats.org/drawingml/2006/main" xmlns:r="http://schemas.openxmlformats.org/officeDocument/2006/relationships" xmlns:p1510="http://schemas.microsoft.com/office/powerpoint/2015/10/main"/>
+</file>
+
 <file path=ppt/slideLayouts/slideLayout1.xml><?xml version="1.0" encoding="utf-8"?>
 <p:sldLayout xmlns:a="http://schemas.openxmlformats.org/drawingml/2006/main" xmlns:r="http://schemas.openxmlformats.org/officeDocument/2006/relationships" xmlns:p="http://schemas.openxmlformats.org/presentationml/2006/main" type="title" preserve="1">
   <p:cSld name="Slide de título">
@@ -249,7 +257,7 @@
           <a:p>
             <a:fld id="{10FE5BFE-EBFF-4D6E-8C56-06511E61A9FB}" type="datetimeFigureOut">
               <a:rPr lang="pt-BR" smtClean="0"/>
-              <a:t>30/08/2017</a:t>
+              <a:t>31/08/2017</a:t>
             </a:fld>
             <a:endParaRPr lang="pt-BR"/>
           </a:p>
@@ -419,7 +427,7 @@
           <a:p>
             <a:fld id="{10FE5BFE-EBFF-4D6E-8C56-06511E61A9FB}" type="datetimeFigureOut">
               <a:rPr lang="pt-BR" smtClean="0"/>
-              <a:t>30/08/2017</a:t>
+              <a:t>31/08/2017</a:t>
             </a:fld>
             <a:endParaRPr lang="pt-BR"/>
           </a:p>
@@ -599,7 +607,7 @@
           <a:p>
             <a:fld id="{10FE5BFE-EBFF-4D6E-8C56-06511E61A9FB}" type="datetimeFigureOut">
               <a:rPr lang="pt-BR" smtClean="0"/>
-              <a:t>30/08/2017</a:t>
+              <a:t>31/08/2017</a:t>
             </a:fld>
             <a:endParaRPr lang="pt-BR"/>
           </a:p>
@@ -769,7 +777,7 @@
           <a:p>
             <a:fld id="{10FE5BFE-EBFF-4D6E-8C56-06511E61A9FB}" type="datetimeFigureOut">
               <a:rPr lang="pt-BR" smtClean="0"/>
-              <a:t>30/08/2017</a:t>
+              <a:t>31/08/2017</a:t>
             </a:fld>
             <a:endParaRPr lang="pt-BR"/>
           </a:p>
@@ -1013,7 +1021,7 @@
           <a:p>
             <a:fld id="{10FE5BFE-EBFF-4D6E-8C56-06511E61A9FB}" type="datetimeFigureOut">
               <a:rPr lang="pt-BR" smtClean="0"/>
-              <a:t>30/08/2017</a:t>
+              <a:t>31/08/2017</a:t>
             </a:fld>
             <a:endParaRPr lang="pt-BR"/>
           </a:p>
@@ -1245,7 +1253,7 @@
           <a:p>
             <a:fld id="{10FE5BFE-EBFF-4D6E-8C56-06511E61A9FB}" type="datetimeFigureOut">
               <a:rPr lang="pt-BR" smtClean="0"/>
-              <a:t>30/08/2017</a:t>
+              <a:t>31/08/2017</a:t>
             </a:fld>
             <a:endParaRPr lang="pt-BR"/>
           </a:p>
@@ -1612,7 +1620,7 @@
           <a:p>
             <a:fld id="{10FE5BFE-EBFF-4D6E-8C56-06511E61A9FB}" type="datetimeFigureOut">
               <a:rPr lang="pt-BR" smtClean="0"/>
-              <a:t>30/08/2017</a:t>
+              <a:t>31/08/2017</a:t>
             </a:fld>
             <a:endParaRPr lang="pt-BR"/>
           </a:p>
@@ -1730,7 +1738,7 @@
           <a:p>
             <a:fld id="{10FE5BFE-EBFF-4D6E-8C56-06511E61A9FB}" type="datetimeFigureOut">
               <a:rPr lang="pt-BR" smtClean="0"/>
-              <a:t>30/08/2017</a:t>
+              <a:t>31/08/2017</a:t>
             </a:fld>
             <a:endParaRPr lang="pt-BR"/>
           </a:p>
@@ -1825,7 +1833,7 @@
           <a:p>
             <a:fld id="{10FE5BFE-EBFF-4D6E-8C56-06511E61A9FB}" type="datetimeFigureOut">
               <a:rPr lang="pt-BR" smtClean="0"/>
-              <a:t>30/08/2017</a:t>
+              <a:t>31/08/2017</a:t>
             </a:fld>
             <a:endParaRPr lang="pt-BR"/>
           </a:p>
@@ -2102,7 +2110,7 @@
           <a:p>
             <a:fld id="{10FE5BFE-EBFF-4D6E-8C56-06511E61A9FB}" type="datetimeFigureOut">
               <a:rPr lang="pt-BR" smtClean="0"/>
-              <a:t>30/08/2017</a:t>
+              <a:t>31/08/2017</a:t>
             </a:fld>
             <a:endParaRPr lang="pt-BR"/>
           </a:p>
@@ -2359,7 +2367,7 @@
           <a:p>
             <a:fld id="{10FE5BFE-EBFF-4D6E-8C56-06511E61A9FB}" type="datetimeFigureOut">
               <a:rPr lang="pt-BR" smtClean="0"/>
-              <a:t>30/08/2017</a:t>
+              <a:t>31/08/2017</a:t>
             </a:fld>
             <a:endParaRPr lang="pt-BR"/>
           </a:p>
@@ -2581,7 +2589,7 @@
           <a:p>
             <a:fld id="{10FE5BFE-EBFF-4D6E-8C56-06511E61A9FB}" type="datetimeFigureOut">
               <a:rPr lang="pt-BR" smtClean="0"/>
-              <a:t>30/08/2017</a:t>
+              <a:t>31/08/2017</a:t>
             </a:fld>
             <a:endParaRPr lang="pt-BR"/>
           </a:p>
@@ -3101,6 +3109,203 @@
 </p:sld>
 </file>
 
+<file path=ppt/slides/slide10.xml><?xml version="1.0" encoding="utf-8"?>
+<p:sld xmlns:a="http://schemas.openxmlformats.org/drawingml/2006/main" xmlns:r="http://schemas.openxmlformats.org/officeDocument/2006/relationships" xmlns:p="http://schemas.openxmlformats.org/presentationml/2006/main">
+  <p:cSld>
+    <p:spTree>
+      <p:nvGrpSpPr>
+        <p:cNvPr id="1" name=""/>
+        <p:cNvGrpSpPr/>
+        <p:nvPr/>
+      </p:nvGrpSpPr>
+      <p:grpSpPr>
+        <a:xfrm>
+          <a:off x="0" y="0"/>
+          <a:ext cx="0" cy="0"/>
+          <a:chOff x="0" y="0"/>
+          <a:chExt cx="0" cy="0"/>
+        </a:xfrm>
+      </p:grpSpPr>
+      <p:sp>
+        <p:nvSpPr>
+          <p:cNvPr id="2" name="Título 1">
+            <a:extLst>
+              <a:ext uri="{FF2B5EF4-FFF2-40B4-BE49-F238E27FC236}">
+                <a16:creationId xmlns:a16="http://schemas.microsoft.com/office/drawing/2014/main" id="{F2B947D0-576F-47F6-8609-E9C08D781D29}"/>
+              </a:ext>
+            </a:extLst>
+          </p:cNvPr>
+          <p:cNvSpPr>
+            <a:spLocks noGrp="1"/>
+          </p:cNvSpPr>
+          <p:nvPr>
+            <p:ph type="title"/>
+          </p:nvPr>
+        </p:nvSpPr>
+        <p:spPr/>
+        <p:txBody>
+          <a:bodyPr/>
+          <a:lstStyle/>
+          <a:p>
+            <a:r>
+              <a:rPr lang="pt-BR" dirty="0"/>
+              <a:t>Considerações finais</a:t>
+            </a:r>
+          </a:p>
+        </p:txBody>
+      </p:sp>
+      <p:sp>
+        <p:nvSpPr>
+          <p:cNvPr id="3" name="Espaço Reservado para Conteúdo 2">
+            <a:extLst>
+              <a:ext uri="{FF2B5EF4-FFF2-40B4-BE49-F238E27FC236}">
+                <a16:creationId xmlns:a16="http://schemas.microsoft.com/office/drawing/2014/main" id="{AE4E2037-6713-40C8-B78D-FF89A0C6A191}"/>
+              </a:ext>
+            </a:extLst>
+          </p:cNvPr>
+          <p:cNvSpPr>
+            <a:spLocks noGrp="1"/>
+          </p:cNvSpPr>
+          <p:nvPr>
+            <p:ph idx="1"/>
+          </p:nvPr>
+        </p:nvSpPr>
+        <p:spPr/>
+        <p:txBody>
+          <a:bodyPr/>
+          <a:lstStyle/>
+          <a:p>
+            <a:r>
+              <a:rPr lang="pt-BR" dirty="0"/>
+              <a:t>Extensão da ideia</a:t>
+            </a:r>
+          </a:p>
+          <a:p>
+            <a:pPr lvl="1"/>
+            <a:r>
+              <a:rPr lang="pt-BR" dirty="0"/>
+              <a:t>Vagas públicas em shoppings</a:t>
+            </a:r>
+          </a:p>
+          <a:p>
+            <a:pPr lvl="1"/>
+            <a:r>
+              <a:rPr lang="pt-BR" dirty="0"/>
+              <a:t>Reservar estacionamento particular de outros usuários</a:t>
+            </a:r>
+          </a:p>
+          <a:p>
+            <a:pPr lvl="1"/>
+            <a:endParaRPr lang="pt-BR" dirty="0"/>
+          </a:p>
+          <a:p>
+            <a:pPr marL="0" indent="0">
+              <a:buNone/>
+            </a:pPr>
+            <a:endParaRPr lang="pt-BR" dirty="0"/>
+          </a:p>
+        </p:txBody>
+      </p:sp>
+    </p:spTree>
+    <p:extLst>
+      <p:ext uri="{BB962C8B-B14F-4D97-AF65-F5344CB8AC3E}">
+        <p14:creationId xmlns:p14="http://schemas.microsoft.com/office/powerpoint/2010/main" val="1836809286"/>
+      </p:ext>
+    </p:extLst>
+  </p:cSld>
+  <p:clrMapOvr>
+    <a:masterClrMapping/>
+  </p:clrMapOvr>
+  <mc:AlternateContent xmlns:mc="http://schemas.openxmlformats.org/markup-compatibility/2006" xmlns:p14="http://schemas.microsoft.com/office/powerpoint/2010/main">
+    <mc:Choice Requires="p14">
+      <p:transition spd="med" p14:dur="700">
+        <p:fade/>
+      </p:transition>
+    </mc:Choice>
+    <mc:Fallback xmlns="">
+      <p:transition spd="med">
+        <p:fade/>
+      </p:transition>
+    </mc:Fallback>
+  </mc:AlternateContent>
+</p:sld>
+</file>
+
+<file path=ppt/slides/slide11.xml><?xml version="1.0" encoding="utf-8"?>
+<p:sld xmlns:a="http://schemas.openxmlformats.org/drawingml/2006/main" xmlns:r="http://schemas.openxmlformats.org/officeDocument/2006/relationships" xmlns:p="http://schemas.openxmlformats.org/presentationml/2006/main">
+  <p:cSld>
+    <p:spTree>
+      <p:nvGrpSpPr>
+        <p:cNvPr id="1" name=""/>
+        <p:cNvGrpSpPr/>
+        <p:nvPr/>
+      </p:nvGrpSpPr>
+      <p:grpSpPr>
+        <a:xfrm>
+          <a:off x="0" y="0"/>
+          <a:ext cx="0" cy="0"/>
+          <a:chOff x="0" y="0"/>
+          <a:chExt cx="0" cy="0"/>
+        </a:xfrm>
+      </p:grpSpPr>
+      <p:sp>
+        <p:nvSpPr>
+          <p:cNvPr id="2" name="Título 1">
+            <a:extLst>
+              <a:ext uri="{FF2B5EF4-FFF2-40B4-BE49-F238E27FC236}">
+                <a16:creationId xmlns:a16="http://schemas.microsoft.com/office/drawing/2014/main" id="{BE07E189-A6F3-40C3-A7BD-0FE653BF89F2}"/>
+              </a:ext>
+            </a:extLst>
+          </p:cNvPr>
+          <p:cNvSpPr>
+            <a:spLocks noGrp="1"/>
+          </p:cNvSpPr>
+          <p:nvPr>
+            <p:ph type="title"/>
+          </p:nvPr>
+        </p:nvSpPr>
+        <p:spPr>
+          <a:xfrm>
+            <a:off x="3019153" y="2690315"/>
+            <a:ext cx="7886700" cy="1325563"/>
+          </a:xfrm>
+        </p:spPr>
+        <p:txBody>
+          <a:bodyPr/>
+          <a:lstStyle/>
+          <a:p>
+            <a:r>
+              <a:rPr lang="pt-BR" b="1" dirty="0"/>
+              <a:t>DÚVIDAS?</a:t>
+            </a:r>
+          </a:p>
+        </p:txBody>
+      </p:sp>
+    </p:spTree>
+    <p:extLst>
+      <p:ext uri="{BB962C8B-B14F-4D97-AF65-F5344CB8AC3E}">
+        <p14:creationId xmlns:p14="http://schemas.microsoft.com/office/powerpoint/2010/main" val="1600193798"/>
+      </p:ext>
+    </p:extLst>
+  </p:cSld>
+  <p:clrMapOvr>
+    <a:masterClrMapping/>
+  </p:clrMapOvr>
+  <mc:AlternateContent xmlns:mc="http://schemas.openxmlformats.org/markup-compatibility/2006" xmlns:p15="http://schemas.microsoft.com/office/powerpoint/2012/main">
+    <mc:Choice Requires="p15">
+      <p:transition xmlns:p14="http://schemas.microsoft.com/office/powerpoint/2010/main" spd="slow" p14:dur="1250">
+        <p15:prstTrans prst="airplane"/>
+      </p:transition>
+    </mc:Choice>
+    <mc:Fallback xmlns="">
+      <p:transition spd="slow">
+        <p:fade/>
+      </p:transition>
+    </mc:Fallback>
+  </mc:AlternateContent>
+</p:sld>
+</file>
+
 <file path=ppt/slides/slide2.xml><?xml version="1.0" encoding="utf-8"?>
 <p:sld xmlns:a="http://schemas.openxmlformats.org/drawingml/2006/main" xmlns:r="http://schemas.openxmlformats.org/officeDocument/2006/relationships" xmlns:p="http://schemas.openxmlformats.org/presentationml/2006/main">
   <p:cSld>
@@ -3251,7 +3456,7 @@
           <p:cNvPr id="2" name="Título 1">
             <a:extLst>
               <a:ext uri="{FF2B5EF4-FFF2-40B4-BE49-F238E27FC236}">
-                <a16:creationId xmlns="" xmlns:a16="http://schemas.microsoft.com/office/drawing/2014/main" id="{D08976B5-9E57-4C41-948A-A2B364481CF8}"/>
+                <a16:creationId xmlns:a16="http://schemas.microsoft.com/office/drawing/2014/main" id="{D08976B5-9E57-4C41-948A-A2B364481CF8}"/>
               </a:ext>
             </a:extLst>
           </p:cNvPr>
@@ -3279,7 +3484,7 @@
           <p:cNvPr id="3" name="Espaço Reservado para Conteúdo 2">
             <a:extLst>
               <a:ext uri="{FF2B5EF4-FFF2-40B4-BE49-F238E27FC236}">
-                <a16:creationId xmlns="" xmlns:a16="http://schemas.microsoft.com/office/drawing/2014/main" id="{645333F7-299B-4BBD-BF58-650F0B644CAF}"/>
+                <a16:creationId xmlns:a16="http://schemas.microsoft.com/office/drawing/2014/main" id="{645333F7-299B-4BBD-BF58-650F0B644CAF}"/>
               </a:ext>
             </a:extLst>
           </p:cNvPr>
@@ -3296,38 +3501,27 @@
           <a:lstStyle/>
           <a:p>
             <a:r>
-              <a:rPr lang="pt-BR" dirty="0" smtClean="0"/>
+              <a:rPr lang="pt-BR" dirty="0"/>
               <a:t>Dificuldade em encontrar vagas de estacionamento</a:t>
             </a:r>
+          </a:p>
+          <a:p>
             <a:endParaRPr lang="pt-BR" dirty="0"/>
           </a:p>
           <a:p>
+            <a:r>
+              <a:rPr lang="pt-BR" dirty="0"/>
+              <a:t>Sensor de detecção de presença</a:t>
+            </a:r>
+          </a:p>
+          <a:p>
             <a:endParaRPr lang="pt-BR" dirty="0"/>
           </a:p>
           <a:p>
             <a:r>
-              <a:rPr lang="pt-BR" dirty="0" smtClean="0"/>
-              <a:t>Sensor </a:t>
-            </a:r>
-            <a:r>
               <a:rPr lang="pt-BR" dirty="0"/>
-              <a:t>de </a:t>
-            </a:r>
-            <a:r>
-              <a:rPr lang="pt-BR" dirty="0" smtClean="0"/>
-              <a:t>detecção de presença</a:t>
-            </a:r>
-            <a:endParaRPr lang="pt-BR" dirty="0"/>
-          </a:p>
-          <a:p>
-            <a:endParaRPr lang="pt-BR" dirty="0"/>
-          </a:p>
-          <a:p>
-            <a:r>
-              <a:rPr lang="pt-BR" dirty="0" smtClean="0"/>
               <a:t>Sistema para determinar rotas</a:t>
             </a:r>
-            <a:endParaRPr lang="pt-BR" dirty="0"/>
           </a:p>
         </p:txBody>
       </p:sp>
@@ -3378,7 +3572,7 @@
           <p:cNvPr id="2" name="Título 1">
             <a:extLst>
               <a:ext uri="{FF2B5EF4-FFF2-40B4-BE49-F238E27FC236}">
-                <a16:creationId xmlns="" xmlns:a16="http://schemas.microsoft.com/office/drawing/2014/main" id="{1DBDCC19-41A4-43AA-B20A-425069423CAD}"/>
+                <a16:creationId xmlns:a16="http://schemas.microsoft.com/office/drawing/2014/main" id="{E2FFB0C0-CE0F-44F3-8F45-0C15B0F2CED4}"/>
               </a:ext>
             </a:extLst>
           </p:cNvPr>
@@ -3396,7 +3590,7 @@
           <a:p>
             <a:r>
               <a:rPr lang="pt-BR" dirty="0"/>
-              <a:t>Desenvolvimento da ideia</a:t>
+              <a:t>Trabalhos Relacionados</a:t>
             </a:r>
           </a:p>
         </p:txBody>
@@ -3406,7 +3600,7 @@
           <p:cNvPr id="3" name="Espaço Reservado para Conteúdo 2">
             <a:extLst>
               <a:ext uri="{FF2B5EF4-FFF2-40B4-BE49-F238E27FC236}">
-                <a16:creationId xmlns="" xmlns:a16="http://schemas.microsoft.com/office/drawing/2014/main" id="{30C3EF9A-9A91-4C09-9FDE-6CF0EDC35FEF}"/>
+                <a16:creationId xmlns:a16="http://schemas.microsoft.com/office/drawing/2014/main" id="{7CBE2034-0293-4F1B-A35D-C330239EDAB1}"/>
               </a:ext>
             </a:extLst>
           </p:cNvPr>
@@ -3423,75 +3617,61 @@
           <a:lstStyle/>
           <a:p>
             <a:r>
-              <a:rPr lang="pt-BR" dirty="0" smtClean="0"/>
-              <a:t>Sensor de presença em cada vaga</a:t>
-            </a:r>
+              <a:rPr lang="pt-BR" dirty="0"/>
+              <a:t>“Google Maps ganha recurso para mostrar onde é fácil estacionar no Brasil”, G1 (2017)</a:t>
+            </a:r>
+          </a:p>
+          <a:p>
             <a:endParaRPr lang="pt-BR" dirty="0"/>
           </a:p>
-          <a:p>
-            <a:endParaRPr lang="pt-BR" dirty="0"/>
-          </a:p>
-          <a:p>
-            <a:r>
-              <a:rPr lang="pt-BR" dirty="0" smtClean="0"/>
-              <a:t>Aplicativo </a:t>
-            </a:r>
-            <a:r>
-              <a:rPr lang="pt-BR" dirty="0" err="1" smtClean="0"/>
-              <a:t>Android</a:t>
-            </a:r>
-            <a:endParaRPr lang="pt-BR" dirty="0"/>
-          </a:p>
-          <a:p>
-            <a:endParaRPr lang="pt-BR" dirty="0"/>
-          </a:p>
-          <a:p>
-            <a:r>
-              <a:rPr lang="pt-BR" dirty="0" err="1" smtClean="0"/>
-              <a:t>Arduino</a:t>
-            </a:r>
-            <a:r>
-              <a:rPr lang="pt-BR" dirty="0" smtClean="0"/>
-              <a:t> e </a:t>
-            </a:r>
-            <a:r>
-              <a:rPr lang="pt-BR" dirty="0"/>
-              <a:t>PIR DYP-ME003 </a:t>
-            </a:r>
-          </a:p>
-          <a:p>
-            <a:endParaRPr lang="pt-BR" dirty="0"/>
-          </a:p>
-          <a:p>
-            <a:endParaRPr lang="pt-BR" dirty="0"/>
-          </a:p>
-          <a:p>
-            <a:endParaRPr lang="pt-BR" dirty="0"/>
-          </a:p>
-        </p:txBody>
-      </p:sp>
+        </p:txBody>
+      </p:sp>
+      <p:pic>
+        <p:nvPicPr>
+          <p:cNvPr id="5" name="Imagem 4" descr="Uma imagem contendo equipamentos eletrônicos&#10;&#10;Descrição gerada com alta confiança">
+            <a:extLst>
+              <a:ext uri="{FF2B5EF4-FFF2-40B4-BE49-F238E27FC236}">
+                <a16:creationId xmlns:a16="http://schemas.microsoft.com/office/drawing/2014/main" id="{4C7D3967-0549-4A4E-96E4-160A28CA4307}"/>
+              </a:ext>
+            </a:extLst>
+          </p:cNvPr>
+          <p:cNvPicPr>
+            <a:picLocks noChangeAspect="1"/>
+          </p:cNvPicPr>
+          <p:nvPr/>
+        </p:nvPicPr>
+        <p:blipFill>
+          <a:blip r:embed="rId2" cstate="print">
+            <a:extLst>
+              <a:ext uri="{28A0092B-C50C-407E-A947-70E740481C1C}">
+                <a14:useLocalDpi xmlns:a14="http://schemas.microsoft.com/office/drawing/2010/main" val="0"/>
+              </a:ext>
+            </a:extLst>
+          </a:blip>
+          <a:stretch>
+            <a:fillRect/>
+          </a:stretch>
+        </p:blipFill>
+        <p:spPr>
+          <a:xfrm>
+            <a:off x="2636874" y="2655807"/>
+            <a:ext cx="3359889" cy="3151576"/>
+          </a:xfrm>
+          <a:prstGeom prst="rect">
+            <a:avLst/>
+          </a:prstGeom>
+        </p:spPr>
+      </p:pic>
     </p:spTree>
     <p:extLst>
       <p:ext uri="{BB962C8B-B14F-4D97-AF65-F5344CB8AC3E}">
-        <p14:creationId xmlns:p14="http://schemas.microsoft.com/office/powerpoint/2010/main" val="3869973666"/>
+        <p14:creationId xmlns:p14="http://schemas.microsoft.com/office/powerpoint/2010/main" val="4246062506"/>
       </p:ext>
     </p:extLst>
   </p:cSld>
   <p:clrMapOvr>
     <a:masterClrMapping/>
   </p:clrMapOvr>
-  <mc:AlternateContent xmlns:mc="http://schemas.openxmlformats.org/markup-compatibility/2006" xmlns:p14="http://schemas.microsoft.com/office/powerpoint/2010/main">
-    <mc:Choice Requires="p14">
-      <p:transition spd="med" p14:dur="700">
-        <p:fade/>
-      </p:transition>
-    </mc:Choice>
-    <mc:Fallback xmlns="">
-      <p:transition spd="med">
-        <p:fade/>
-      </p:transition>
-    </mc:Fallback>
-  </mc:AlternateContent>
 </p:sld>
 </file>
 
@@ -3514,7 +3694,13 @@
       </p:grpSpPr>
       <p:sp>
         <p:nvSpPr>
-          <p:cNvPr id="2" name="Título 1"/>
+          <p:cNvPr id="2" name="Título 1">
+            <a:extLst>
+              <a:ext uri="{FF2B5EF4-FFF2-40B4-BE49-F238E27FC236}">
+                <a16:creationId xmlns:a16="http://schemas.microsoft.com/office/drawing/2014/main" id="{E2FFB0C0-CE0F-44F3-8F45-0C15B0F2CED4}"/>
+              </a:ext>
+            </a:extLst>
+          </p:cNvPr>
           <p:cNvSpPr>
             <a:spLocks noGrp="1"/>
           </p:cNvSpPr>
@@ -3528,46 +3714,89 @@
           <a:lstStyle/>
           <a:p>
             <a:r>
-              <a:rPr lang="pt-BR" dirty="0" smtClean="0"/>
-              <a:t>Desenvolvimento da ideia</a:t>
-            </a:r>
+              <a:rPr lang="pt-BR" dirty="0"/>
+              <a:t>Trabalhos Relacionados</a:t>
+            </a:r>
+          </a:p>
+        </p:txBody>
+      </p:sp>
+      <p:sp>
+        <p:nvSpPr>
+          <p:cNvPr id="3" name="Espaço Reservado para Conteúdo 2">
+            <a:extLst>
+              <a:ext uri="{FF2B5EF4-FFF2-40B4-BE49-F238E27FC236}">
+                <a16:creationId xmlns:a16="http://schemas.microsoft.com/office/drawing/2014/main" id="{7CBE2034-0293-4F1B-A35D-C330239EDAB1}"/>
+              </a:ext>
+            </a:extLst>
+          </p:cNvPr>
+          <p:cNvSpPr>
+            <a:spLocks noGrp="1"/>
+          </p:cNvSpPr>
+          <p:nvPr>
+            <p:ph idx="1"/>
+          </p:nvPr>
+        </p:nvSpPr>
+        <p:spPr/>
+        <p:txBody>
+          <a:bodyPr>
+            <a:normAutofit lnSpcReduction="10000"/>
+          </a:bodyPr>
+          <a:lstStyle/>
+          <a:p>
+            <a:r>
+              <a:rPr lang="pt-BR" dirty="0"/>
+              <a:t>“Bosch cria sistema que acha vagas de estacionamento”,</a:t>
+            </a:r>
+          </a:p>
+          <a:p>
+            <a:pPr lvl="1"/>
+            <a:r>
+              <a:rPr lang="pt-BR" dirty="0"/>
+              <a:t>Sensores informam sobre disponibilidade e localização de espaços urbanos livres.</a:t>
+            </a:r>
+          </a:p>
+          <a:p>
+            <a:pPr marL="457200" lvl="1" indent="0">
+              <a:buNone/>
+            </a:pPr>
             <a:endParaRPr lang="pt-BR" dirty="0"/>
           </a:p>
-        </p:txBody>
-      </p:sp>
-      <p:pic>
-        <p:nvPicPr>
-          <p:cNvPr id="3" name="Espaço Reservado para Conteúdo 2"/>
-          <p:cNvPicPr>
-            <a:picLocks noGrp="1" noChangeAspect="1"/>
-          </p:cNvPicPr>
-          <p:nvPr>
-            <p:ph idx="1"/>
-          </p:nvPr>
-        </p:nvPicPr>
-        <p:blipFill>
-          <a:blip r:embed="rId2" cstate="print">
-            <a:extLst>
-              <a:ext uri="{28A0092B-C50C-407E-A947-70E740481C1C}">
-                <a14:useLocalDpi xmlns:a14="http://schemas.microsoft.com/office/drawing/2010/main" val="0"/>
-              </a:ext>
-            </a:extLst>
-          </a:blip>
-          <a:stretch>
-            <a:fillRect/>
-          </a:stretch>
-        </p:blipFill>
-        <p:spPr>
-          <a:xfrm>
-            <a:off x="1469943" y="1921808"/>
-            <a:ext cx="7023783" cy="3339740"/>
-          </a:xfrm>
-        </p:spPr>
-      </p:pic>
+          <a:p>
+            <a:pPr lvl="1"/>
+            <a:r>
+              <a:rPr lang="pt-BR" dirty="0"/>
+              <a:t>“As meta-informações sobre cada vaga de estacionamento também serão disponíveis, informando se o espaço é reservado para famílias, mulheres ou deficientes, além do preço por hora do estacionamento e se há ponto para carregamento de veículos elétricos.“</a:t>
+            </a:r>
+          </a:p>
+          <a:p>
+            <a:pPr marL="457200" lvl="1" indent="0" algn="r">
+              <a:buNone/>
+            </a:pPr>
+            <a:endParaRPr lang="pt-BR" dirty="0"/>
+          </a:p>
+          <a:p>
+            <a:pPr marL="457200" lvl="1" indent="0" algn="r">
+              <a:buNone/>
+            </a:pPr>
+            <a:r>
+              <a:rPr lang="pt-BR" sz="1800" dirty="0" err="1"/>
+              <a:t>AutomotiveBusiness</a:t>
+            </a:r>
+            <a:r>
+              <a:rPr lang="pt-BR" sz="1800" dirty="0"/>
+              <a:t> (2015)</a:t>
+            </a:r>
+          </a:p>
+          <a:p>
+            <a:pPr lvl="1"/>
+            <a:endParaRPr lang="pt-BR" dirty="0"/>
+          </a:p>
+        </p:txBody>
+      </p:sp>
     </p:spTree>
     <p:extLst>
       <p:ext uri="{BB962C8B-B14F-4D97-AF65-F5344CB8AC3E}">
-        <p14:creationId xmlns:p14="http://schemas.microsoft.com/office/powerpoint/2010/main" val="1629198763"/>
+        <p14:creationId xmlns:p14="http://schemas.microsoft.com/office/powerpoint/2010/main" val="4268386754"/>
       </p:ext>
     </p:extLst>
   </p:cSld>
@@ -3599,7 +3828,7 @@
           <p:cNvPr id="2" name="Título 1">
             <a:extLst>
               <a:ext uri="{FF2B5EF4-FFF2-40B4-BE49-F238E27FC236}">
-                <a16:creationId xmlns="" xmlns:a16="http://schemas.microsoft.com/office/drawing/2014/main" id="{F2B947D0-576F-47F6-8609-E9C08D781D29}"/>
+                <a16:creationId xmlns:a16="http://schemas.microsoft.com/office/drawing/2014/main" id="{E2FFB0C0-CE0F-44F3-8F45-0C15B0F2CED4}"/>
               </a:ext>
             </a:extLst>
           </p:cNvPr>
@@ -3617,7 +3846,7 @@
           <a:p>
             <a:r>
               <a:rPr lang="pt-BR" dirty="0"/>
-              <a:t>Considerações finais</a:t>
+              <a:t>Trabalhos Relacionados</a:t>
             </a:r>
           </a:p>
         </p:txBody>
@@ -3627,7 +3856,7 @@
           <p:cNvPr id="3" name="Espaço Reservado para Conteúdo 2">
             <a:extLst>
               <a:ext uri="{FF2B5EF4-FFF2-40B4-BE49-F238E27FC236}">
-                <a16:creationId xmlns="" xmlns:a16="http://schemas.microsoft.com/office/drawing/2014/main" id="{AE4E2037-6713-40C8-B78D-FF89A0C6A191}"/>
+                <a16:creationId xmlns:a16="http://schemas.microsoft.com/office/drawing/2014/main" id="{7CBE2034-0293-4F1B-A35D-C330239EDAB1}"/>
               </a:ext>
             </a:extLst>
           </p:cNvPr>
@@ -3645,44 +3874,314 @@
           <a:p>
             <a:r>
               <a:rPr lang="pt-BR" dirty="0"/>
-              <a:t>Extensão da ideia</a:t>
-            </a:r>
-          </a:p>
-          <a:p>
-            <a:pPr lvl="1"/>
-            <a:r>
-              <a:rPr lang="pt-BR" dirty="0" smtClean="0"/>
-              <a:t>Vagas públicas </a:t>
-            </a:r>
-            <a:r>
-              <a:rPr lang="pt-BR" dirty="0"/>
-              <a:t>em shoppings</a:t>
-            </a:r>
-          </a:p>
-          <a:p>
-            <a:pPr lvl="1"/>
-            <a:r>
-              <a:rPr lang="pt-BR" dirty="0" smtClean="0"/>
-              <a:t>Reservar estacionamento particular de outros usuários</a:t>
-            </a:r>
+              <a:t>Controle Inteligente de Vagas da Prossiga</a:t>
+            </a:r>
+          </a:p>
+          <a:p>
             <a:endParaRPr lang="pt-BR" dirty="0"/>
           </a:p>
-          <a:p>
-            <a:pPr lvl="1"/>
+        </p:txBody>
+      </p:sp>
+      <p:sp>
+        <p:nvSpPr>
+          <p:cNvPr id="4" name="CaixaDeTexto 3">
+            <a:extLst>
+              <a:ext uri="{FF2B5EF4-FFF2-40B4-BE49-F238E27FC236}">
+                <a16:creationId xmlns:a16="http://schemas.microsoft.com/office/drawing/2014/main" id="{563D8BF8-3563-4B51-A979-B111C5CDB0D3}"/>
+              </a:ext>
+            </a:extLst>
+          </p:cNvPr>
+          <p:cNvSpPr txBox="1"/>
+          <p:nvPr/>
+        </p:nvSpPr>
+        <p:spPr>
+          <a:xfrm>
+            <a:off x="2261746" y="5431323"/>
+            <a:ext cx="2317898" cy="369332"/>
+          </a:xfrm>
+          <a:prstGeom prst="rect">
+            <a:avLst/>
+          </a:prstGeom>
+          <a:noFill/>
+        </p:spPr>
+        <p:txBody>
+          <a:bodyPr wrap="square" rtlCol="0">
+            <a:spAutoFit/>
+          </a:bodyPr>
+          <a:lstStyle/>
+          <a:p>
+            <a:pPr algn="ctr"/>
+            <a:r>
+              <a:rPr lang="pt-BR" b="1" dirty="0"/>
+              <a:t>PARKHELP</a:t>
+            </a:r>
             <a:endParaRPr lang="pt-BR" dirty="0"/>
           </a:p>
-          <a:p>
-            <a:pPr marL="0" indent="0">
-              <a:buNone/>
-            </a:pPr>
-            <a:endParaRPr lang="pt-BR" dirty="0"/>
-          </a:p>
-        </p:txBody>
-      </p:sp>
+        </p:txBody>
+      </p:sp>
+      <p:pic>
+        <p:nvPicPr>
+          <p:cNvPr id="1028" name="Picture 4" descr="prosiga908">
+            <a:extLst>
+              <a:ext uri="{FF2B5EF4-FFF2-40B4-BE49-F238E27FC236}">
+                <a16:creationId xmlns:a16="http://schemas.microsoft.com/office/drawing/2014/main" id="{364BD2E8-E38B-4835-B2FE-E0F74D54AFAE}"/>
+              </a:ext>
+            </a:extLst>
+          </p:cNvPr>
+          <p:cNvPicPr>
+            <a:picLocks noChangeAspect="1" noChangeArrowheads="1"/>
+          </p:cNvPicPr>
+          <p:nvPr/>
+        </p:nvPicPr>
+        <p:blipFill>
+          <a:blip r:embed="rId2">
+            <a:extLst>
+              <a:ext uri="{28A0092B-C50C-407E-A947-70E740481C1C}">
+                <a14:useLocalDpi xmlns:a14="http://schemas.microsoft.com/office/drawing/2010/main" val="0"/>
+              </a:ext>
+            </a:extLst>
+          </a:blip>
+          <a:srcRect/>
+          <a:stretch>
+            <a:fillRect/>
+          </a:stretch>
+        </p:blipFill>
+        <p:spPr bwMode="auto">
+          <a:xfrm>
+            <a:off x="5689749" y="2490120"/>
+            <a:ext cx="2592030" cy="1004500"/>
+          </a:xfrm>
+          <a:prstGeom prst="rect">
+            <a:avLst/>
+          </a:prstGeom>
+          <a:noFill/>
+          <a:extLst>
+            <a:ext uri="{909E8E84-426E-40DD-AFC4-6F175D3DCCD1}">
+              <a14:hiddenFill xmlns:a14="http://schemas.microsoft.com/office/drawing/2010/main">
+                <a:solidFill>
+                  <a:srgbClr val="FFFFFF"/>
+                </a:solidFill>
+              </a14:hiddenFill>
+            </a:ext>
+          </a:extLst>
+        </p:spPr>
+      </p:pic>
+      <p:pic>
+        <p:nvPicPr>
+          <p:cNvPr id="1030" name="Picture 6" descr="sljpg">
+            <a:extLst>
+              <a:ext uri="{FF2B5EF4-FFF2-40B4-BE49-F238E27FC236}">
+                <a16:creationId xmlns:a16="http://schemas.microsoft.com/office/drawing/2014/main" id="{F1B309E9-EDCF-43F7-BE1F-F7F9C22FA12B}"/>
+              </a:ext>
+            </a:extLst>
+          </p:cNvPr>
+          <p:cNvPicPr>
+            <a:picLocks noChangeAspect="1" noChangeArrowheads="1"/>
+          </p:cNvPicPr>
+          <p:nvPr/>
+        </p:nvPicPr>
+        <p:blipFill>
+          <a:blip r:embed="rId3">
+            <a:extLst>
+              <a:ext uri="{28A0092B-C50C-407E-A947-70E740481C1C}">
+                <a14:useLocalDpi xmlns:a14="http://schemas.microsoft.com/office/drawing/2010/main" val="0"/>
+              </a:ext>
+            </a:extLst>
+          </a:blip>
+          <a:srcRect/>
+          <a:stretch>
+            <a:fillRect/>
+          </a:stretch>
+        </p:blipFill>
+        <p:spPr bwMode="auto">
+          <a:xfrm>
+            <a:off x="5946261" y="3454925"/>
+            <a:ext cx="2143125" cy="2190750"/>
+          </a:xfrm>
+          <a:prstGeom prst="rect">
+            <a:avLst/>
+          </a:prstGeom>
+          <a:noFill/>
+          <a:extLst>
+            <a:ext uri="{909E8E84-426E-40DD-AFC4-6F175D3DCCD1}">
+              <a14:hiddenFill xmlns:a14="http://schemas.microsoft.com/office/drawing/2010/main">
+                <a:solidFill>
+                  <a:srgbClr val="FFFFFF"/>
+                </a:solidFill>
+              </a14:hiddenFill>
+            </a:ext>
+          </a:extLst>
+        </p:spPr>
+      </p:pic>
+      <p:pic>
+        <p:nvPicPr>
+          <p:cNvPr id="1032" name="Picture 8" descr="sc">
+            <a:extLst>
+              <a:ext uri="{FF2B5EF4-FFF2-40B4-BE49-F238E27FC236}">
+                <a16:creationId xmlns:a16="http://schemas.microsoft.com/office/drawing/2014/main" id="{5A96E752-C90C-405E-AA84-A4B55684CDAD}"/>
+              </a:ext>
+            </a:extLst>
+          </p:cNvPr>
+          <p:cNvPicPr>
+            <a:picLocks noChangeAspect="1" noChangeArrowheads="1"/>
+          </p:cNvPicPr>
+          <p:nvPr/>
+        </p:nvPicPr>
+        <p:blipFill>
+          <a:blip r:embed="rId4" cstate="print">
+            <a:extLst>
+              <a:ext uri="{28A0092B-C50C-407E-A947-70E740481C1C}">
+                <a14:useLocalDpi xmlns:a14="http://schemas.microsoft.com/office/drawing/2010/main" val="0"/>
+              </a:ext>
+            </a:extLst>
+          </a:blip>
+          <a:srcRect/>
+          <a:stretch>
+            <a:fillRect/>
+          </a:stretch>
+        </p:blipFill>
+        <p:spPr bwMode="auto">
+          <a:xfrm>
+            <a:off x="555552" y="3386192"/>
+            <a:ext cx="5134197" cy="2328216"/>
+          </a:xfrm>
+          <a:prstGeom prst="rect">
+            <a:avLst/>
+          </a:prstGeom>
+          <a:noFill/>
+          <a:extLst>
+            <a:ext uri="{909E8E84-426E-40DD-AFC4-6F175D3DCCD1}">
+              <a14:hiddenFill xmlns:a14="http://schemas.microsoft.com/office/drawing/2010/main">
+                <a:solidFill>
+                  <a:srgbClr val="FFFFFF"/>
+                </a:solidFill>
+              </a14:hiddenFill>
+            </a:ext>
+          </a:extLst>
+        </p:spPr>
+      </p:pic>
     </p:spTree>
     <p:extLst>
       <p:ext uri="{BB962C8B-B14F-4D97-AF65-F5344CB8AC3E}">
-        <p14:creationId xmlns:p14="http://schemas.microsoft.com/office/powerpoint/2010/main" val="1836809286"/>
+        <p14:creationId xmlns:p14="http://schemas.microsoft.com/office/powerpoint/2010/main" val="2822695219"/>
+      </p:ext>
+    </p:extLst>
+  </p:cSld>
+  <p:clrMapOvr>
+    <a:masterClrMapping/>
+  </p:clrMapOvr>
+</p:sld>
+</file>
+
+<file path=ppt/slides/slide7.xml><?xml version="1.0" encoding="utf-8"?>
+<p:sld xmlns:a="http://schemas.openxmlformats.org/drawingml/2006/main" xmlns:r="http://schemas.openxmlformats.org/officeDocument/2006/relationships" xmlns:p="http://schemas.openxmlformats.org/presentationml/2006/main">
+  <p:cSld>
+    <p:spTree>
+      <p:nvGrpSpPr>
+        <p:cNvPr id="1" name=""/>
+        <p:cNvGrpSpPr/>
+        <p:nvPr/>
+      </p:nvGrpSpPr>
+      <p:grpSpPr>
+        <a:xfrm>
+          <a:off x="0" y="0"/>
+          <a:ext cx="0" cy="0"/>
+          <a:chOff x="0" y="0"/>
+          <a:chExt cx="0" cy="0"/>
+        </a:xfrm>
+      </p:grpSpPr>
+      <p:sp>
+        <p:nvSpPr>
+          <p:cNvPr id="2" name="Título 1">
+            <a:extLst>
+              <a:ext uri="{FF2B5EF4-FFF2-40B4-BE49-F238E27FC236}">
+                <a16:creationId xmlns:a16="http://schemas.microsoft.com/office/drawing/2014/main" id="{1DBDCC19-41A4-43AA-B20A-425069423CAD}"/>
+              </a:ext>
+            </a:extLst>
+          </p:cNvPr>
+          <p:cNvSpPr>
+            <a:spLocks noGrp="1"/>
+          </p:cNvSpPr>
+          <p:nvPr>
+            <p:ph type="title"/>
+          </p:nvPr>
+        </p:nvSpPr>
+        <p:spPr/>
+        <p:txBody>
+          <a:bodyPr/>
+          <a:lstStyle/>
+          <a:p>
+            <a:r>
+              <a:rPr lang="pt-BR" dirty="0"/>
+              <a:t>Desenvolvimento da ideia</a:t>
+            </a:r>
+          </a:p>
+        </p:txBody>
+      </p:sp>
+      <p:sp>
+        <p:nvSpPr>
+          <p:cNvPr id="3" name="Espaço Reservado para Conteúdo 2">
+            <a:extLst>
+              <a:ext uri="{FF2B5EF4-FFF2-40B4-BE49-F238E27FC236}">
+                <a16:creationId xmlns:a16="http://schemas.microsoft.com/office/drawing/2014/main" id="{30C3EF9A-9A91-4C09-9FDE-6CF0EDC35FEF}"/>
+              </a:ext>
+            </a:extLst>
+          </p:cNvPr>
+          <p:cNvSpPr>
+            <a:spLocks noGrp="1"/>
+          </p:cNvSpPr>
+          <p:nvPr>
+            <p:ph idx="1"/>
+          </p:nvPr>
+        </p:nvSpPr>
+        <p:spPr/>
+        <p:txBody>
+          <a:bodyPr/>
+          <a:lstStyle/>
+          <a:p>
+            <a:r>
+              <a:rPr lang="pt-BR" dirty="0"/>
+              <a:t>Sensor de presença em cada vaga</a:t>
+            </a:r>
+          </a:p>
+          <a:p>
+            <a:r>
+              <a:rPr lang="pt-BR" dirty="0"/>
+              <a:t>Servidor para processar as informações e oferecer dados</a:t>
+            </a:r>
+          </a:p>
+          <a:p>
+            <a:r>
+              <a:rPr lang="pt-BR" dirty="0"/>
+              <a:t>Aplicativo </a:t>
+            </a:r>
+            <a:r>
+              <a:rPr lang="pt-BR" dirty="0" err="1"/>
+              <a:t>Android</a:t>
+            </a:r>
+            <a:endParaRPr lang="pt-BR" dirty="0"/>
+          </a:p>
+          <a:p>
+            <a:r>
+              <a:rPr lang="pt-BR" dirty="0"/>
+              <a:t>Arduino e PIR DYP-ME003 </a:t>
+            </a:r>
+          </a:p>
+          <a:p>
+            <a:endParaRPr lang="pt-BR" dirty="0"/>
+          </a:p>
+          <a:p>
+            <a:endParaRPr lang="pt-BR" dirty="0"/>
+          </a:p>
+          <a:p>
+            <a:endParaRPr lang="pt-BR" dirty="0"/>
+          </a:p>
+        </p:txBody>
+      </p:sp>
+    </p:spTree>
+    <p:extLst>
+      <p:ext uri="{BB962C8B-B14F-4D97-AF65-F5344CB8AC3E}">
+        <p14:creationId xmlns:p14="http://schemas.microsoft.com/office/powerpoint/2010/main" val="3869973666"/>
       </p:ext>
     </p:extLst>
   </p:cSld>
@@ -3704,7 +4203,7 @@
 </p:sld>
 </file>
 
-<file path=ppt/slides/slide7.xml><?xml version="1.0" encoding="utf-8"?>
+<file path=ppt/slides/slide8.xml><?xml version="1.0" encoding="utf-8"?>
 <p:sld xmlns:a="http://schemas.openxmlformats.org/drawingml/2006/main" xmlns:r="http://schemas.openxmlformats.org/officeDocument/2006/relationships" xmlns:p="http://schemas.openxmlformats.org/presentationml/2006/main">
   <p:cSld>
     <p:spTree>
@@ -3723,13 +4222,7 @@
       </p:grpSpPr>
       <p:sp>
         <p:nvSpPr>
-          <p:cNvPr id="2" name="Título 1">
-            <a:extLst>
-              <a:ext uri="{FF2B5EF4-FFF2-40B4-BE49-F238E27FC236}">
-                <a16:creationId xmlns="" xmlns:a16="http://schemas.microsoft.com/office/drawing/2014/main" id="{BE07E189-A6F3-40C3-A7BD-0FE653BF89F2}"/>
-              </a:ext>
-            </a:extLst>
-          </p:cNvPr>
+          <p:cNvPr id="2" name="Título 1"/>
           <p:cNvSpPr>
             <a:spLocks noGrp="1"/>
           </p:cNvSpPr>
@@ -3737,45 +4230,1774 @@
             <p:ph type="title"/>
           </p:nvPr>
         </p:nvSpPr>
-        <p:spPr>
-          <a:xfrm>
-            <a:off x="3019153" y="2690315"/>
-            <a:ext cx="7886700" cy="1325563"/>
-          </a:xfrm>
-        </p:spPr>
-        <p:txBody>
-          <a:bodyPr/>
-          <a:lstStyle/>
-          <a:p>
-            <a:r>
-              <a:rPr lang="pt-BR" b="1" dirty="0"/>
-              <a:t>DÚVIDAS?</a:t>
-            </a:r>
-          </a:p>
-        </p:txBody>
-      </p:sp>
+        <p:spPr/>
+        <p:txBody>
+          <a:bodyPr/>
+          <a:lstStyle/>
+          <a:p>
+            <a:r>
+              <a:rPr lang="pt-BR" dirty="0"/>
+              <a:t>Desenvolvimento da ideia</a:t>
+            </a:r>
+          </a:p>
+        </p:txBody>
+      </p:sp>
+      <p:pic>
+        <p:nvPicPr>
+          <p:cNvPr id="3" name="Espaço Reservado para Conteúdo 2"/>
+          <p:cNvPicPr>
+            <a:picLocks noGrp="1" noChangeAspect="1"/>
+          </p:cNvPicPr>
+          <p:nvPr>
+            <p:ph idx="1"/>
+          </p:nvPr>
+        </p:nvPicPr>
+        <p:blipFill>
+          <a:blip r:embed="rId2" cstate="print">
+            <a:extLst>
+              <a:ext uri="{28A0092B-C50C-407E-A947-70E740481C1C}">
+                <a14:useLocalDpi xmlns:a14="http://schemas.microsoft.com/office/drawing/2010/main" val="0"/>
+              </a:ext>
+            </a:extLst>
+          </a:blip>
+          <a:stretch>
+            <a:fillRect/>
+          </a:stretch>
+        </p:blipFill>
+        <p:spPr>
+          <a:xfrm>
+            <a:off x="1469943" y="1921808"/>
+            <a:ext cx="7023783" cy="3339740"/>
+          </a:xfrm>
+        </p:spPr>
+      </p:pic>
     </p:spTree>
     <p:extLst>
       <p:ext uri="{BB962C8B-B14F-4D97-AF65-F5344CB8AC3E}">
-        <p14:creationId xmlns:p14="http://schemas.microsoft.com/office/powerpoint/2010/main" val="1600193798"/>
+        <p14:creationId xmlns:p14="http://schemas.microsoft.com/office/powerpoint/2010/main" val="1629198763"/>
       </p:ext>
     </p:extLst>
   </p:cSld>
   <p:clrMapOvr>
     <a:masterClrMapping/>
   </p:clrMapOvr>
-  <mc:AlternateContent xmlns:mc="http://schemas.openxmlformats.org/markup-compatibility/2006" xmlns:p15="http://schemas.microsoft.com/office/powerpoint/2012/main">
-    <mc:Choice Requires="p15">
-      <p:transition xmlns:p14="http://schemas.microsoft.com/office/powerpoint/2010/main" spd="slow" p14:dur="1250">
-        <p15:prstTrans prst="airplane"/>
-      </p:transition>
-    </mc:Choice>
-    <mc:Fallback xmlns="">
-      <p:transition spd="slow">
-        <p:fade/>
-      </p:transition>
-    </mc:Fallback>
-  </mc:AlternateContent>
+</p:sld>
+</file>
+
+<file path=ppt/slides/slide9.xml><?xml version="1.0" encoding="utf-8"?>
+<p:sld xmlns:a="http://schemas.openxmlformats.org/drawingml/2006/main" xmlns:r="http://schemas.openxmlformats.org/officeDocument/2006/relationships" xmlns:p="http://schemas.openxmlformats.org/presentationml/2006/main">
+  <p:cSld>
+    <p:spTree>
+      <p:nvGrpSpPr>
+        <p:cNvPr id="1" name=""/>
+        <p:cNvGrpSpPr/>
+        <p:nvPr/>
+      </p:nvGrpSpPr>
+      <p:grpSpPr>
+        <a:xfrm>
+          <a:off x="0" y="0"/>
+          <a:ext cx="0" cy="0"/>
+          <a:chOff x="0" y="0"/>
+          <a:chExt cx="0" cy="0"/>
+        </a:xfrm>
+      </p:grpSpPr>
+      <p:sp>
+        <p:nvSpPr>
+          <p:cNvPr id="69" name="Retângulo 68">
+            <a:extLst>
+              <a:ext uri="{FF2B5EF4-FFF2-40B4-BE49-F238E27FC236}">
+                <a16:creationId xmlns:a16="http://schemas.microsoft.com/office/drawing/2014/main" id="{EBFC5BB0-32C0-4A1A-97DB-0C3084894AAF}"/>
+              </a:ext>
+            </a:extLst>
+          </p:cNvPr>
+          <p:cNvSpPr/>
+          <p:nvPr/>
+        </p:nvSpPr>
+        <p:spPr>
+          <a:xfrm>
+            <a:off x="7001302" y="4157821"/>
+            <a:ext cx="1885966" cy="1697069"/>
+          </a:xfrm>
+          <a:prstGeom prst="rect">
+            <a:avLst/>
+          </a:prstGeom>
+          <a:solidFill>
+            <a:schemeClr val="bg1">
+              <a:lumMod val="95000"/>
+            </a:schemeClr>
+          </a:solidFill>
+          <a:ln>
+            <a:noFill/>
+          </a:ln>
+          <a:effectLst>
+            <a:softEdge rad="88900"/>
+          </a:effectLst>
+        </p:spPr>
+        <p:style>
+          <a:lnRef idx="2">
+            <a:schemeClr val="accent1">
+              <a:shade val="50000"/>
+            </a:schemeClr>
+          </a:lnRef>
+          <a:fillRef idx="1">
+            <a:schemeClr val="accent1"/>
+          </a:fillRef>
+          <a:effectRef idx="0">
+            <a:schemeClr val="accent1"/>
+          </a:effectRef>
+          <a:fontRef idx="minor">
+            <a:schemeClr val="lt1"/>
+          </a:fontRef>
+        </p:style>
+        <p:txBody>
+          <a:bodyPr rtlCol="0" anchor="ctr"/>
+          <a:lstStyle/>
+          <a:p>
+            <a:pPr algn="ctr"/>
+            <a:endParaRPr lang="pt-BR"/>
+          </a:p>
+        </p:txBody>
+      </p:sp>
+      <p:sp>
+        <p:nvSpPr>
+          <p:cNvPr id="68" name="Retângulo 67">
+            <a:extLst>
+              <a:ext uri="{FF2B5EF4-FFF2-40B4-BE49-F238E27FC236}">
+                <a16:creationId xmlns:a16="http://schemas.microsoft.com/office/drawing/2014/main" id="{BB15851C-8849-4BB4-A4B8-D54E9BBFFF16}"/>
+              </a:ext>
+            </a:extLst>
+          </p:cNvPr>
+          <p:cNvSpPr/>
+          <p:nvPr/>
+        </p:nvSpPr>
+        <p:spPr>
+          <a:xfrm>
+            <a:off x="3782376" y="2285789"/>
+            <a:ext cx="4732974" cy="1931369"/>
+          </a:xfrm>
+          <a:prstGeom prst="rect">
+            <a:avLst/>
+          </a:prstGeom>
+          <a:solidFill>
+            <a:schemeClr val="bg1">
+              <a:lumMod val="95000"/>
+            </a:schemeClr>
+          </a:solidFill>
+          <a:ln>
+            <a:noFill/>
+          </a:ln>
+          <a:effectLst>
+            <a:softEdge rad="88900"/>
+          </a:effectLst>
+        </p:spPr>
+        <p:style>
+          <a:lnRef idx="2">
+            <a:schemeClr val="accent1">
+              <a:shade val="50000"/>
+            </a:schemeClr>
+          </a:lnRef>
+          <a:fillRef idx="1">
+            <a:schemeClr val="accent1"/>
+          </a:fillRef>
+          <a:effectRef idx="0">
+            <a:schemeClr val="accent1"/>
+          </a:effectRef>
+          <a:fontRef idx="minor">
+            <a:schemeClr val="lt1"/>
+          </a:fontRef>
+        </p:style>
+        <p:txBody>
+          <a:bodyPr rtlCol="0" anchor="ctr"/>
+          <a:lstStyle/>
+          <a:p>
+            <a:pPr algn="ctr"/>
+            <a:endParaRPr lang="pt-BR"/>
+          </a:p>
+        </p:txBody>
+      </p:sp>
+      <p:sp>
+        <p:nvSpPr>
+          <p:cNvPr id="67" name="Retângulo 66">
+            <a:extLst>
+              <a:ext uri="{FF2B5EF4-FFF2-40B4-BE49-F238E27FC236}">
+                <a16:creationId xmlns:a16="http://schemas.microsoft.com/office/drawing/2014/main" id="{AD081554-7BCA-47F9-B04D-057F73A85947}"/>
+              </a:ext>
+            </a:extLst>
+          </p:cNvPr>
+          <p:cNvSpPr/>
+          <p:nvPr/>
+        </p:nvSpPr>
+        <p:spPr>
+          <a:xfrm>
+            <a:off x="518615" y="1323834"/>
+            <a:ext cx="3207224" cy="4217158"/>
+          </a:xfrm>
+          <a:prstGeom prst="rect">
+            <a:avLst/>
+          </a:prstGeom>
+          <a:solidFill>
+            <a:schemeClr val="bg1">
+              <a:lumMod val="95000"/>
+            </a:schemeClr>
+          </a:solidFill>
+          <a:ln>
+            <a:noFill/>
+          </a:ln>
+          <a:effectLst>
+            <a:softEdge rad="88900"/>
+          </a:effectLst>
+        </p:spPr>
+        <p:style>
+          <a:lnRef idx="2">
+            <a:schemeClr val="accent1">
+              <a:shade val="50000"/>
+            </a:schemeClr>
+          </a:lnRef>
+          <a:fillRef idx="1">
+            <a:schemeClr val="accent1"/>
+          </a:fillRef>
+          <a:effectRef idx="0">
+            <a:schemeClr val="accent1"/>
+          </a:effectRef>
+          <a:fontRef idx="minor">
+            <a:schemeClr val="lt1"/>
+          </a:fontRef>
+        </p:style>
+        <p:txBody>
+          <a:bodyPr rtlCol="0" anchor="ctr"/>
+          <a:lstStyle/>
+          <a:p>
+            <a:pPr algn="ctr"/>
+            <a:endParaRPr lang="pt-BR"/>
+          </a:p>
+        </p:txBody>
+      </p:sp>
+      <p:sp>
+        <p:nvSpPr>
+          <p:cNvPr id="2" name="Título 1">
+            <a:extLst>
+              <a:ext uri="{FF2B5EF4-FFF2-40B4-BE49-F238E27FC236}">
+                <a16:creationId xmlns:a16="http://schemas.microsoft.com/office/drawing/2014/main" id="{94C2F05D-26FF-4195-A380-E4834B9609A4}"/>
+              </a:ext>
+            </a:extLst>
+          </p:cNvPr>
+          <p:cNvSpPr>
+            <a:spLocks noGrp="1"/>
+          </p:cNvSpPr>
+          <p:nvPr>
+            <p:ph type="title"/>
+          </p:nvPr>
+        </p:nvSpPr>
+        <p:spPr/>
+        <p:txBody>
+          <a:bodyPr/>
+          <a:lstStyle/>
+          <a:p>
+            <a:r>
+              <a:rPr lang="pt-BR" dirty="0"/>
+              <a:t>Funcionamento</a:t>
+            </a:r>
+          </a:p>
+        </p:txBody>
+      </p:sp>
+      <p:pic>
+        <p:nvPicPr>
+          <p:cNvPr id="9" name="Imagem 8">
+            <a:extLst>
+              <a:ext uri="{FF2B5EF4-FFF2-40B4-BE49-F238E27FC236}">
+                <a16:creationId xmlns:a16="http://schemas.microsoft.com/office/drawing/2014/main" id="{A7F933AF-4903-402C-8C66-83FB8B982337}"/>
+              </a:ext>
+            </a:extLst>
+          </p:cNvPr>
+          <p:cNvPicPr>
+            <a:picLocks noChangeAspect="1"/>
+          </p:cNvPicPr>
+          <p:nvPr/>
+        </p:nvPicPr>
+        <p:blipFill>
+          <a:blip r:embed="rId2" cstate="print">
+            <a:extLst>
+              <a:ext uri="{BEBA8EAE-BF5A-486C-A8C5-ECC9F3942E4B}">
+                <a14:imgProps xmlns:a14="http://schemas.microsoft.com/office/drawing/2010/main">
+                  <a14:imgLayer r:embed="rId3">
+                    <a14:imgEffect>
+                      <a14:backgroundRemoval t="9961" b="89844" l="391" r="98633">
+                        <a14:foregroundMark x1="25977" y1="48242" x2="1367" y2="62500"/>
+                        <a14:foregroundMark x1="1367" y1="62500" x2="24023" y2="83398"/>
+                        <a14:foregroundMark x1="24023" y1="83398" x2="84180" y2="84180"/>
+                        <a14:foregroundMark x1="84180" y1="84180" x2="98633" y2="25781"/>
+                        <a14:foregroundMark x1="98633" y1="25781" x2="69922" y2="26953"/>
+                        <a14:foregroundMark x1="51493" y1="48802" x2="50977" y2="49414"/>
+                        <a14:foregroundMark x1="69922" y1="26953" x2="58424" y2="40585"/>
+                        <a14:foregroundMark x1="50977" y1="49414" x2="24414" y2="47461"/>
+                        <a14:foregroundMark x1="74609" y1="45898" x2="86719" y2="53906"/>
+                        <a14:foregroundMark x1="4492" y1="69727" x2="391" y2="71484"/>
+                        <a14:foregroundMark x1="6836" y1="68164" x2="2148" y2="67383"/>
+                        <a14:backgroundMark x1="34766" y1="33203" x2="59766" y2="50586"/>
+                        <a14:backgroundMark x1="59766" y1="50586" x2="49023" y2="22461"/>
+                        <a14:backgroundMark x1="49023" y1="22461" x2="33984" y2="36328"/>
+                        <a14:backgroundMark x1="55469" y1="42773" x2="57031" y2="42773"/>
+                      </a14:backgroundRemoval>
+                    </a14:imgEffect>
+                  </a14:imgLayer>
+                </a14:imgProps>
+              </a:ext>
+              <a:ext uri="{28A0092B-C50C-407E-A947-70E740481C1C}">
+                <a14:useLocalDpi xmlns:a14="http://schemas.microsoft.com/office/drawing/2010/main" val="0"/>
+              </a:ext>
+            </a:extLst>
+          </a:blip>
+          <a:stretch>
+            <a:fillRect/>
+          </a:stretch>
+        </p:blipFill>
+        <p:spPr>
+          <a:xfrm>
+            <a:off x="1111007" y="1371240"/>
+            <a:ext cx="608611" cy="608611"/>
+          </a:xfrm>
+          <a:prstGeom prst="rect">
+            <a:avLst/>
+          </a:prstGeom>
+        </p:spPr>
+      </p:pic>
+      <p:pic>
+        <p:nvPicPr>
+          <p:cNvPr id="11" name="Imagem 10">
+            <a:extLst>
+              <a:ext uri="{FF2B5EF4-FFF2-40B4-BE49-F238E27FC236}">
+                <a16:creationId xmlns:a16="http://schemas.microsoft.com/office/drawing/2014/main" id="{491B5552-652C-4F0C-8EB5-87567019B9FC}"/>
+              </a:ext>
+            </a:extLst>
+          </p:cNvPr>
+          <p:cNvPicPr>
+            <a:picLocks noChangeAspect="1"/>
+          </p:cNvPicPr>
+          <p:nvPr/>
+        </p:nvPicPr>
+        <p:blipFill>
+          <a:blip r:embed="rId4" cstate="print">
+            <a:extLst>
+              <a:ext uri="{28A0092B-C50C-407E-A947-70E740481C1C}">
+                <a14:useLocalDpi xmlns:a14="http://schemas.microsoft.com/office/drawing/2010/main" val="0"/>
+              </a:ext>
+            </a:extLst>
+          </a:blip>
+          <a:stretch>
+            <a:fillRect/>
+          </a:stretch>
+        </p:blipFill>
+        <p:spPr>
+          <a:xfrm>
+            <a:off x="2880061" y="2997896"/>
+            <a:ext cx="598891" cy="598891"/>
+          </a:xfrm>
+          <a:prstGeom prst="rect">
+            <a:avLst/>
+          </a:prstGeom>
+        </p:spPr>
+      </p:pic>
+      <p:pic>
+        <p:nvPicPr>
+          <p:cNvPr id="12" name="Imagem 11">
+            <a:extLst>
+              <a:ext uri="{FF2B5EF4-FFF2-40B4-BE49-F238E27FC236}">
+                <a16:creationId xmlns:a16="http://schemas.microsoft.com/office/drawing/2014/main" id="{691EB0B0-48A2-4AF6-BD6A-7902A38CF514}"/>
+              </a:ext>
+            </a:extLst>
+          </p:cNvPr>
+          <p:cNvPicPr>
+            <a:picLocks noChangeAspect="1"/>
+          </p:cNvPicPr>
+          <p:nvPr/>
+        </p:nvPicPr>
+        <p:blipFill>
+          <a:blip r:embed="rId2" cstate="print">
+            <a:extLst>
+              <a:ext uri="{BEBA8EAE-BF5A-486C-A8C5-ECC9F3942E4B}">
+                <a14:imgProps xmlns:a14="http://schemas.microsoft.com/office/drawing/2010/main">
+                  <a14:imgLayer r:embed="rId3">
+                    <a14:imgEffect>
+                      <a14:backgroundRemoval t="9961" b="89844" l="391" r="98633">
+                        <a14:foregroundMark x1="25977" y1="48242" x2="1367" y2="62500"/>
+                        <a14:foregroundMark x1="1367" y1="62500" x2="24023" y2="83398"/>
+                        <a14:foregroundMark x1="24023" y1="83398" x2="84180" y2="84180"/>
+                        <a14:foregroundMark x1="84180" y1="84180" x2="98633" y2="25781"/>
+                        <a14:foregroundMark x1="98633" y1="25781" x2="69922" y2="26953"/>
+                        <a14:foregroundMark x1="51493" y1="48802" x2="50977" y2="49414"/>
+                        <a14:foregroundMark x1="69922" y1="26953" x2="58424" y2="40585"/>
+                        <a14:foregroundMark x1="50977" y1="49414" x2="24414" y2="47461"/>
+                        <a14:foregroundMark x1="74609" y1="45898" x2="86719" y2="53906"/>
+                        <a14:foregroundMark x1="4492" y1="69727" x2="391" y2="71484"/>
+                        <a14:foregroundMark x1="6836" y1="68164" x2="2148" y2="67383"/>
+                        <a14:backgroundMark x1="34766" y1="33203" x2="59766" y2="50586"/>
+                        <a14:backgroundMark x1="59766" y1="50586" x2="49023" y2="22461"/>
+                        <a14:backgroundMark x1="49023" y1="22461" x2="33984" y2="36328"/>
+                        <a14:backgroundMark x1="55469" y1="42773" x2="57031" y2="42773"/>
+                      </a14:backgroundRemoval>
+                    </a14:imgEffect>
+                  </a14:imgLayer>
+                </a14:imgProps>
+              </a:ext>
+              <a:ext uri="{28A0092B-C50C-407E-A947-70E740481C1C}">
+                <a14:useLocalDpi xmlns:a14="http://schemas.microsoft.com/office/drawing/2010/main" val="0"/>
+              </a:ext>
+            </a:extLst>
+          </a:blip>
+          <a:stretch>
+            <a:fillRect/>
+          </a:stretch>
+        </p:blipFill>
+        <p:spPr>
+          <a:xfrm>
+            <a:off x="1111007" y="2285789"/>
+            <a:ext cx="608611" cy="608611"/>
+          </a:xfrm>
+          <a:prstGeom prst="rect">
+            <a:avLst/>
+          </a:prstGeom>
+        </p:spPr>
+      </p:pic>
+      <p:pic>
+        <p:nvPicPr>
+          <p:cNvPr id="13" name="Imagem 12">
+            <a:extLst>
+              <a:ext uri="{FF2B5EF4-FFF2-40B4-BE49-F238E27FC236}">
+                <a16:creationId xmlns:a16="http://schemas.microsoft.com/office/drawing/2014/main" id="{BE22B3D0-948A-41CA-8DF4-C7346FB28D85}"/>
+              </a:ext>
+            </a:extLst>
+          </p:cNvPr>
+          <p:cNvPicPr>
+            <a:picLocks noChangeAspect="1"/>
+          </p:cNvPicPr>
+          <p:nvPr/>
+        </p:nvPicPr>
+        <p:blipFill>
+          <a:blip r:embed="rId2" cstate="print">
+            <a:extLst>
+              <a:ext uri="{BEBA8EAE-BF5A-486C-A8C5-ECC9F3942E4B}">
+                <a14:imgProps xmlns:a14="http://schemas.microsoft.com/office/drawing/2010/main">
+                  <a14:imgLayer r:embed="rId3">
+                    <a14:imgEffect>
+                      <a14:backgroundRemoval t="9961" b="89844" l="391" r="98633">
+                        <a14:foregroundMark x1="25977" y1="48242" x2="1367" y2="62500"/>
+                        <a14:foregroundMark x1="1367" y1="62500" x2="24023" y2="83398"/>
+                        <a14:foregroundMark x1="24023" y1="83398" x2="84180" y2="84180"/>
+                        <a14:foregroundMark x1="84180" y1="84180" x2="98633" y2="25781"/>
+                        <a14:foregroundMark x1="98633" y1="25781" x2="69922" y2="26953"/>
+                        <a14:foregroundMark x1="51493" y1="48802" x2="50977" y2="49414"/>
+                        <a14:foregroundMark x1="69922" y1="26953" x2="58424" y2="40585"/>
+                        <a14:foregroundMark x1="50977" y1="49414" x2="24414" y2="47461"/>
+                        <a14:foregroundMark x1="74609" y1="45898" x2="86719" y2="53906"/>
+                        <a14:foregroundMark x1="4492" y1="69727" x2="391" y2="71484"/>
+                        <a14:foregroundMark x1="6836" y1="68164" x2="2148" y2="67383"/>
+                        <a14:backgroundMark x1="34766" y1="33203" x2="59766" y2="50586"/>
+                        <a14:backgroundMark x1="59766" y1="50586" x2="49023" y2="22461"/>
+                        <a14:backgroundMark x1="49023" y1="22461" x2="33984" y2="36328"/>
+                        <a14:backgroundMark x1="55469" y1="42773" x2="57031" y2="42773"/>
+                      </a14:backgroundRemoval>
+                    </a14:imgEffect>
+                  </a14:imgLayer>
+                </a14:imgProps>
+              </a:ext>
+              <a:ext uri="{28A0092B-C50C-407E-A947-70E740481C1C}">
+                <a14:useLocalDpi xmlns:a14="http://schemas.microsoft.com/office/drawing/2010/main" val="0"/>
+              </a:ext>
+            </a:extLst>
+          </a:blip>
+          <a:stretch>
+            <a:fillRect/>
+          </a:stretch>
+        </p:blipFill>
+        <p:spPr>
+          <a:xfrm>
+            <a:off x="1111007" y="3398516"/>
+            <a:ext cx="608611" cy="608611"/>
+          </a:xfrm>
+          <a:prstGeom prst="rect">
+            <a:avLst/>
+          </a:prstGeom>
+        </p:spPr>
+      </p:pic>
+      <p:pic>
+        <p:nvPicPr>
+          <p:cNvPr id="14" name="Imagem 13">
+            <a:extLst>
+              <a:ext uri="{FF2B5EF4-FFF2-40B4-BE49-F238E27FC236}">
+                <a16:creationId xmlns:a16="http://schemas.microsoft.com/office/drawing/2014/main" id="{3E2A16AE-B7FC-439E-AF30-13210930E81E}"/>
+              </a:ext>
+            </a:extLst>
+          </p:cNvPr>
+          <p:cNvPicPr>
+            <a:picLocks noChangeAspect="1"/>
+          </p:cNvPicPr>
+          <p:nvPr/>
+        </p:nvPicPr>
+        <p:blipFill>
+          <a:blip r:embed="rId2" cstate="print">
+            <a:extLst>
+              <a:ext uri="{BEBA8EAE-BF5A-486C-A8C5-ECC9F3942E4B}">
+                <a14:imgProps xmlns:a14="http://schemas.microsoft.com/office/drawing/2010/main">
+                  <a14:imgLayer r:embed="rId3">
+                    <a14:imgEffect>
+                      <a14:backgroundRemoval t="9961" b="89844" l="391" r="98633">
+                        <a14:foregroundMark x1="25977" y1="48242" x2="1367" y2="62500"/>
+                        <a14:foregroundMark x1="1367" y1="62500" x2="24023" y2="83398"/>
+                        <a14:foregroundMark x1="24023" y1="83398" x2="84180" y2="84180"/>
+                        <a14:foregroundMark x1="84180" y1="84180" x2="98633" y2="25781"/>
+                        <a14:foregroundMark x1="98633" y1="25781" x2="69922" y2="26953"/>
+                        <a14:foregroundMark x1="51493" y1="48802" x2="50977" y2="49414"/>
+                        <a14:foregroundMark x1="69922" y1="26953" x2="58424" y2="40585"/>
+                        <a14:foregroundMark x1="50977" y1="49414" x2="24414" y2="47461"/>
+                        <a14:foregroundMark x1="74609" y1="45898" x2="86719" y2="53906"/>
+                        <a14:foregroundMark x1="4492" y1="69727" x2="391" y2="71484"/>
+                        <a14:foregroundMark x1="6836" y1="68164" x2="2148" y2="67383"/>
+                        <a14:backgroundMark x1="34766" y1="33203" x2="59766" y2="50586"/>
+                        <a14:backgroundMark x1="59766" y1="50586" x2="49023" y2="22461"/>
+                        <a14:backgroundMark x1="49023" y1="22461" x2="33984" y2="36328"/>
+                        <a14:backgroundMark x1="55469" y1="42773" x2="57031" y2="42773"/>
+                      </a14:backgroundRemoval>
+                    </a14:imgEffect>
+                  </a14:imgLayer>
+                </a14:imgProps>
+              </a:ext>
+              <a:ext uri="{28A0092B-C50C-407E-A947-70E740481C1C}">
+                <a14:useLocalDpi xmlns:a14="http://schemas.microsoft.com/office/drawing/2010/main" val="0"/>
+              </a:ext>
+            </a:extLst>
+          </a:blip>
+          <a:stretch>
+            <a:fillRect/>
+          </a:stretch>
+        </p:blipFill>
+        <p:spPr>
+          <a:xfrm>
+            <a:off x="1111007" y="4438020"/>
+            <a:ext cx="608611" cy="608611"/>
+          </a:xfrm>
+          <a:prstGeom prst="rect">
+            <a:avLst/>
+          </a:prstGeom>
+        </p:spPr>
+      </p:pic>
+      <p:pic>
+        <p:nvPicPr>
+          <p:cNvPr id="18" name="Imagem 17" descr="Uma imagem contendo gráficos vetoriais&#10;&#10;Descrição gerada com alta confiança">
+            <a:extLst>
+              <a:ext uri="{FF2B5EF4-FFF2-40B4-BE49-F238E27FC236}">
+                <a16:creationId xmlns:a16="http://schemas.microsoft.com/office/drawing/2014/main" id="{1803E050-861B-452D-A073-BB379ED3AE9C}"/>
+              </a:ext>
+            </a:extLst>
+          </p:cNvPr>
+          <p:cNvPicPr>
+            <a:picLocks noChangeAspect="1"/>
+          </p:cNvPicPr>
+          <p:nvPr/>
+        </p:nvPicPr>
+        <p:blipFill>
+          <a:blip r:embed="rId5" cstate="print">
+            <a:extLst>
+              <a:ext uri="{28A0092B-C50C-407E-A947-70E740481C1C}">
+                <a14:useLocalDpi xmlns:a14="http://schemas.microsoft.com/office/drawing/2010/main" val="0"/>
+              </a:ext>
+            </a:extLst>
+          </a:blip>
+          <a:stretch>
+            <a:fillRect/>
+          </a:stretch>
+        </p:blipFill>
+        <p:spPr>
+          <a:xfrm>
+            <a:off x="4120529" y="2890591"/>
+            <a:ext cx="840624" cy="840624"/>
+          </a:xfrm>
+          <a:prstGeom prst="rect">
+            <a:avLst/>
+          </a:prstGeom>
+        </p:spPr>
+      </p:pic>
+      <p:pic>
+        <p:nvPicPr>
+          <p:cNvPr id="20" name="Imagem 19">
+            <a:extLst>
+              <a:ext uri="{FF2B5EF4-FFF2-40B4-BE49-F238E27FC236}">
+                <a16:creationId xmlns:a16="http://schemas.microsoft.com/office/drawing/2014/main" id="{3450EB97-9EA4-49C8-813B-5B21F90BF2CC}"/>
+              </a:ext>
+            </a:extLst>
+          </p:cNvPr>
+          <p:cNvPicPr>
+            <a:picLocks noChangeAspect="1"/>
+          </p:cNvPicPr>
+          <p:nvPr/>
+        </p:nvPicPr>
+        <p:blipFill>
+          <a:blip r:embed="rId6" cstate="print">
+            <a:extLst>
+              <a:ext uri="{28A0092B-C50C-407E-A947-70E740481C1C}">
+                <a14:useLocalDpi xmlns:a14="http://schemas.microsoft.com/office/drawing/2010/main" val="0"/>
+              </a:ext>
+            </a:extLst>
+          </a:blip>
+          <a:stretch>
+            <a:fillRect/>
+          </a:stretch>
+        </p:blipFill>
+        <p:spPr>
+          <a:xfrm>
+            <a:off x="5756587" y="2863296"/>
+            <a:ext cx="867919" cy="867919"/>
+          </a:xfrm>
+          <a:prstGeom prst="rect">
+            <a:avLst/>
+          </a:prstGeom>
+        </p:spPr>
+      </p:pic>
+      <p:pic>
+        <p:nvPicPr>
+          <p:cNvPr id="23" name="Imagem 22" descr="Uma imagem contendo gráficos vetoriais&#10;&#10;Descrição gerada com alta confiança">
+            <a:extLst>
+              <a:ext uri="{FF2B5EF4-FFF2-40B4-BE49-F238E27FC236}">
+                <a16:creationId xmlns:a16="http://schemas.microsoft.com/office/drawing/2014/main" id="{5F68E8C8-EE65-416D-A554-3773142907A9}"/>
+              </a:ext>
+            </a:extLst>
+          </p:cNvPr>
+          <p:cNvPicPr>
+            <a:picLocks noChangeAspect="1"/>
+          </p:cNvPicPr>
+          <p:nvPr/>
+        </p:nvPicPr>
+        <p:blipFill>
+          <a:blip r:embed="rId5" cstate="print">
+            <a:extLst>
+              <a:ext uri="{28A0092B-C50C-407E-A947-70E740481C1C}">
+                <a14:useLocalDpi xmlns:a14="http://schemas.microsoft.com/office/drawing/2010/main" val="0"/>
+              </a:ext>
+            </a:extLst>
+          </a:blip>
+          <a:stretch>
+            <a:fillRect/>
+          </a:stretch>
+        </p:blipFill>
+        <p:spPr>
+          <a:xfrm>
+            <a:off x="7419940" y="2890591"/>
+            <a:ext cx="840624" cy="840624"/>
+          </a:xfrm>
+          <a:prstGeom prst="rect">
+            <a:avLst/>
+          </a:prstGeom>
+        </p:spPr>
+      </p:pic>
+      <p:pic>
+        <p:nvPicPr>
+          <p:cNvPr id="25" name="Imagem 24">
+            <a:extLst>
+              <a:ext uri="{FF2B5EF4-FFF2-40B4-BE49-F238E27FC236}">
+                <a16:creationId xmlns:a16="http://schemas.microsoft.com/office/drawing/2014/main" id="{8D4B34B1-D757-41D2-BA0B-696C00F753C4}"/>
+              </a:ext>
+            </a:extLst>
+          </p:cNvPr>
+          <p:cNvPicPr>
+            <a:picLocks noChangeAspect="1"/>
+          </p:cNvPicPr>
+          <p:nvPr/>
+        </p:nvPicPr>
+        <p:blipFill>
+          <a:blip r:embed="rId7" cstate="print">
+            <a:extLst>
+              <a:ext uri="{28A0092B-C50C-407E-A947-70E740481C1C}">
+                <a14:useLocalDpi xmlns:a14="http://schemas.microsoft.com/office/drawing/2010/main" val="0"/>
+              </a:ext>
+            </a:extLst>
+          </a:blip>
+          <a:stretch>
+            <a:fillRect/>
+          </a:stretch>
+        </p:blipFill>
+        <p:spPr>
+          <a:xfrm>
+            <a:off x="7333612" y="4584427"/>
+            <a:ext cx="1058988" cy="1058988"/>
+          </a:xfrm>
+          <a:prstGeom prst="rect">
+            <a:avLst/>
+          </a:prstGeom>
+        </p:spPr>
+      </p:pic>
+      <p:cxnSp>
+        <p:nvCxnSpPr>
+          <p:cNvPr id="29" name="Conector: Angulado 28">
+            <a:extLst>
+              <a:ext uri="{FF2B5EF4-FFF2-40B4-BE49-F238E27FC236}">
+                <a16:creationId xmlns:a16="http://schemas.microsoft.com/office/drawing/2014/main" id="{6FB5DBA4-DE35-457C-ABF4-5710F0FA9ADC}"/>
+              </a:ext>
+            </a:extLst>
+          </p:cNvPr>
+          <p:cNvCxnSpPr>
+            <a:cxnSpLocks/>
+            <a:stCxn id="9" idx="3"/>
+          </p:cNvCxnSpPr>
+          <p:nvPr/>
+        </p:nvCxnSpPr>
+        <p:spPr>
+          <a:xfrm>
+            <a:off x="1719618" y="1675546"/>
+            <a:ext cx="1392072" cy="1292077"/>
+          </a:xfrm>
+          <a:prstGeom prst="bentConnector3">
+            <a:avLst>
+              <a:gd name="adj1" fmla="val 100000"/>
+            </a:avLst>
+          </a:prstGeom>
+          <a:ln>
+            <a:tailEnd type="triangle"/>
+          </a:ln>
+        </p:spPr>
+        <p:style>
+          <a:lnRef idx="1">
+            <a:schemeClr val="accent1"/>
+          </a:lnRef>
+          <a:fillRef idx="0">
+            <a:schemeClr val="accent1"/>
+          </a:fillRef>
+          <a:effectRef idx="0">
+            <a:schemeClr val="accent1"/>
+          </a:effectRef>
+          <a:fontRef idx="minor">
+            <a:schemeClr val="tx1"/>
+          </a:fontRef>
+        </p:style>
+      </p:cxnSp>
+      <p:cxnSp>
+        <p:nvCxnSpPr>
+          <p:cNvPr id="31" name="Conector: Angulado 30">
+            <a:extLst>
+              <a:ext uri="{FF2B5EF4-FFF2-40B4-BE49-F238E27FC236}">
+                <a16:creationId xmlns:a16="http://schemas.microsoft.com/office/drawing/2014/main" id="{97FD1CDA-E8E3-4D2D-9F4E-A6F9799DA8BE}"/>
+              </a:ext>
+            </a:extLst>
+          </p:cNvPr>
+          <p:cNvCxnSpPr>
+            <a:cxnSpLocks/>
+            <a:stCxn id="12" idx="3"/>
+          </p:cNvCxnSpPr>
+          <p:nvPr/>
+        </p:nvCxnSpPr>
+        <p:spPr>
+          <a:xfrm>
+            <a:off x="1719618" y="2590095"/>
+            <a:ext cx="1160443" cy="600992"/>
+          </a:xfrm>
+          <a:prstGeom prst="bentConnector3">
+            <a:avLst/>
+          </a:prstGeom>
+          <a:ln>
+            <a:tailEnd type="triangle"/>
+          </a:ln>
+        </p:spPr>
+        <p:style>
+          <a:lnRef idx="1">
+            <a:schemeClr val="accent1"/>
+          </a:lnRef>
+          <a:fillRef idx="0">
+            <a:schemeClr val="accent1"/>
+          </a:fillRef>
+          <a:effectRef idx="0">
+            <a:schemeClr val="accent1"/>
+          </a:effectRef>
+          <a:fontRef idx="minor">
+            <a:schemeClr val="tx1"/>
+          </a:fontRef>
+        </p:style>
+      </p:cxnSp>
+      <p:cxnSp>
+        <p:nvCxnSpPr>
+          <p:cNvPr id="33" name="Conector: Angulado 32">
+            <a:extLst>
+              <a:ext uri="{FF2B5EF4-FFF2-40B4-BE49-F238E27FC236}">
+                <a16:creationId xmlns:a16="http://schemas.microsoft.com/office/drawing/2014/main" id="{7E1B90CA-7E2F-4D7E-84FA-AAD793D017AD}"/>
+              </a:ext>
+            </a:extLst>
+          </p:cNvPr>
+          <p:cNvCxnSpPr>
+            <a:cxnSpLocks/>
+            <a:stCxn id="13" idx="3"/>
+          </p:cNvCxnSpPr>
+          <p:nvPr/>
+        </p:nvCxnSpPr>
+        <p:spPr>
+          <a:xfrm flipV="1">
+            <a:off x="1719618" y="3428789"/>
+            <a:ext cx="1160443" cy="274033"/>
+          </a:xfrm>
+          <a:prstGeom prst="bentConnector3">
+            <a:avLst/>
+          </a:prstGeom>
+          <a:ln>
+            <a:tailEnd type="triangle"/>
+          </a:ln>
+        </p:spPr>
+        <p:style>
+          <a:lnRef idx="1">
+            <a:schemeClr val="accent1"/>
+          </a:lnRef>
+          <a:fillRef idx="0">
+            <a:schemeClr val="accent1"/>
+          </a:fillRef>
+          <a:effectRef idx="0">
+            <a:schemeClr val="accent1"/>
+          </a:effectRef>
+          <a:fontRef idx="minor">
+            <a:schemeClr val="tx1"/>
+          </a:fontRef>
+        </p:style>
+      </p:cxnSp>
+      <p:cxnSp>
+        <p:nvCxnSpPr>
+          <p:cNvPr id="35" name="Conector: Angulado 34">
+            <a:extLst>
+              <a:ext uri="{FF2B5EF4-FFF2-40B4-BE49-F238E27FC236}">
+                <a16:creationId xmlns:a16="http://schemas.microsoft.com/office/drawing/2014/main" id="{C714BA67-EC25-40E9-BD08-2949E22A0C86}"/>
+              </a:ext>
+            </a:extLst>
+          </p:cNvPr>
+          <p:cNvCxnSpPr>
+            <a:cxnSpLocks/>
+          </p:cNvCxnSpPr>
+          <p:nvPr/>
+        </p:nvCxnSpPr>
+        <p:spPr>
+          <a:xfrm flipV="1">
+            <a:off x="1719618" y="3657541"/>
+            <a:ext cx="1392072" cy="952348"/>
+          </a:xfrm>
+          <a:prstGeom prst="bentConnector3">
+            <a:avLst>
+              <a:gd name="adj1" fmla="val 100000"/>
+            </a:avLst>
+          </a:prstGeom>
+          <a:ln>
+            <a:tailEnd type="triangle"/>
+          </a:ln>
+        </p:spPr>
+        <p:style>
+          <a:lnRef idx="1">
+            <a:schemeClr val="accent1"/>
+          </a:lnRef>
+          <a:fillRef idx="0">
+            <a:schemeClr val="accent1"/>
+          </a:fillRef>
+          <a:effectRef idx="0">
+            <a:schemeClr val="accent1"/>
+          </a:effectRef>
+          <a:fontRef idx="minor">
+            <a:schemeClr val="tx1"/>
+          </a:fontRef>
+        </p:style>
+      </p:cxnSp>
+      <p:cxnSp>
+        <p:nvCxnSpPr>
+          <p:cNvPr id="44" name="Conector de Seta Reta 43">
+            <a:extLst>
+              <a:ext uri="{FF2B5EF4-FFF2-40B4-BE49-F238E27FC236}">
+                <a16:creationId xmlns:a16="http://schemas.microsoft.com/office/drawing/2014/main" id="{7B4DE83B-2C0E-4EAD-945F-9E47B26205A0}"/>
+              </a:ext>
+            </a:extLst>
+          </p:cNvPr>
+          <p:cNvCxnSpPr>
+            <a:cxnSpLocks/>
+          </p:cNvCxnSpPr>
+          <p:nvPr/>
+        </p:nvCxnSpPr>
+        <p:spPr>
+          <a:xfrm>
+            <a:off x="3478952" y="3379365"/>
+            <a:ext cx="641577" cy="13561"/>
+          </a:xfrm>
+          <a:prstGeom prst="straightConnector1">
+            <a:avLst/>
+          </a:prstGeom>
+          <a:ln>
+            <a:tailEnd type="triangle"/>
+          </a:ln>
+        </p:spPr>
+        <p:style>
+          <a:lnRef idx="1">
+            <a:schemeClr val="accent1"/>
+          </a:lnRef>
+          <a:fillRef idx="0">
+            <a:schemeClr val="accent1"/>
+          </a:fillRef>
+          <a:effectRef idx="0">
+            <a:schemeClr val="accent1"/>
+          </a:effectRef>
+          <a:fontRef idx="minor">
+            <a:schemeClr val="tx1"/>
+          </a:fontRef>
+        </p:style>
+      </p:cxnSp>
+      <p:cxnSp>
+        <p:nvCxnSpPr>
+          <p:cNvPr id="46" name="Conector de Seta Reta 45">
+            <a:extLst>
+              <a:ext uri="{FF2B5EF4-FFF2-40B4-BE49-F238E27FC236}">
+                <a16:creationId xmlns:a16="http://schemas.microsoft.com/office/drawing/2014/main" id="{612137DD-B838-4FFA-8A7D-B094EA1EC866}"/>
+              </a:ext>
+            </a:extLst>
+          </p:cNvPr>
+          <p:cNvCxnSpPr/>
+          <p:nvPr/>
+        </p:nvCxnSpPr>
+        <p:spPr>
+          <a:xfrm flipH="1">
+            <a:off x="3478952" y="3191087"/>
+            <a:ext cx="634398" cy="0"/>
+          </a:xfrm>
+          <a:prstGeom prst="straightConnector1">
+            <a:avLst/>
+          </a:prstGeom>
+          <a:ln>
+            <a:solidFill>
+              <a:srgbClr val="9CE169"/>
+            </a:solidFill>
+            <a:tailEnd type="triangle"/>
+          </a:ln>
+        </p:spPr>
+        <p:style>
+          <a:lnRef idx="1">
+            <a:schemeClr val="accent1"/>
+          </a:lnRef>
+          <a:fillRef idx="0">
+            <a:schemeClr val="accent1"/>
+          </a:fillRef>
+          <a:effectRef idx="0">
+            <a:schemeClr val="accent1"/>
+          </a:effectRef>
+          <a:fontRef idx="minor">
+            <a:schemeClr val="tx1"/>
+          </a:fontRef>
+        </p:style>
+      </p:cxnSp>
+      <p:cxnSp>
+        <p:nvCxnSpPr>
+          <p:cNvPr id="47" name="Conector de Seta Reta 46">
+            <a:extLst>
+              <a:ext uri="{FF2B5EF4-FFF2-40B4-BE49-F238E27FC236}">
+                <a16:creationId xmlns:a16="http://schemas.microsoft.com/office/drawing/2014/main" id="{5BB12B19-DC04-4757-95E6-A57413711FCA}"/>
+              </a:ext>
+            </a:extLst>
+          </p:cNvPr>
+          <p:cNvCxnSpPr>
+            <a:cxnSpLocks/>
+          </p:cNvCxnSpPr>
+          <p:nvPr/>
+        </p:nvCxnSpPr>
+        <p:spPr>
+          <a:xfrm flipH="1">
+            <a:off x="4964485" y="3190873"/>
+            <a:ext cx="685689" cy="0"/>
+          </a:xfrm>
+          <a:prstGeom prst="straightConnector1">
+            <a:avLst/>
+          </a:prstGeom>
+          <a:ln>
+            <a:solidFill>
+              <a:srgbClr val="9CE169"/>
+            </a:solidFill>
+            <a:tailEnd type="triangle"/>
+          </a:ln>
+        </p:spPr>
+        <p:style>
+          <a:lnRef idx="1">
+            <a:schemeClr val="accent1"/>
+          </a:lnRef>
+          <a:fillRef idx="0">
+            <a:schemeClr val="accent1"/>
+          </a:fillRef>
+          <a:effectRef idx="0">
+            <a:schemeClr val="accent1"/>
+          </a:effectRef>
+          <a:fontRef idx="minor">
+            <a:schemeClr val="tx1"/>
+          </a:fontRef>
+        </p:style>
+      </p:cxnSp>
+      <p:cxnSp>
+        <p:nvCxnSpPr>
+          <p:cNvPr id="49" name="Conector de Seta Reta 48">
+            <a:extLst>
+              <a:ext uri="{FF2B5EF4-FFF2-40B4-BE49-F238E27FC236}">
+                <a16:creationId xmlns:a16="http://schemas.microsoft.com/office/drawing/2014/main" id="{E9E2023B-3896-4FBB-AF1B-F0C072E404C9}"/>
+              </a:ext>
+            </a:extLst>
+          </p:cNvPr>
+          <p:cNvCxnSpPr>
+            <a:cxnSpLocks/>
+          </p:cNvCxnSpPr>
+          <p:nvPr/>
+        </p:nvCxnSpPr>
+        <p:spPr>
+          <a:xfrm>
+            <a:off x="4974801" y="3428789"/>
+            <a:ext cx="689021" cy="0"/>
+          </a:xfrm>
+          <a:prstGeom prst="straightConnector1">
+            <a:avLst/>
+          </a:prstGeom>
+          <a:ln>
+            <a:solidFill>
+              <a:srgbClr val="9CE169"/>
+            </a:solidFill>
+            <a:tailEnd type="triangle"/>
+          </a:ln>
+        </p:spPr>
+        <p:style>
+          <a:lnRef idx="1">
+            <a:schemeClr val="accent1"/>
+          </a:lnRef>
+          <a:fillRef idx="0">
+            <a:schemeClr val="accent1"/>
+          </a:fillRef>
+          <a:effectRef idx="0">
+            <a:schemeClr val="accent1"/>
+          </a:effectRef>
+          <a:fontRef idx="minor">
+            <a:schemeClr val="tx1"/>
+          </a:fontRef>
+        </p:style>
+      </p:cxnSp>
+      <p:cxnSp>
+        <p:nvCxnSpPr>
+          <p:cNvPr id="53" name="Conector de Seta Reta 52">
+            <a:extLst>
+              <a:ext uri="{FF2B5EF4-FFF2-40B4-BE49-F238E27FC236}">
+                <a16:creationId xmlns:a16="http://schemas.microsoft.com/office/drawing/2014/main" id="{B1ADFABE-3FD3-4E1F-8CCE-27AB82A428A9}"/>
+              </a:ext>
+            </a:extLst>
+          </p:cNvPr>
+          <p:cNvCxnSpPr>
+            <a:cxnSpLocks/>
+          </p:cNvCxnSpPr>
+          <p:nvPr/>
+        </p:nvCxnSpPr>
+        <p:spPr>
+          <a:xfrm flipH="1">
+            <a:off x="6668782" y="3196349"/>
+            <a:ext cx="685689" cy="0"/>
+          </a:xfrm>
+          <a:prstGeom prst="straightConnector1">
+            <a:avLst/>
+          </a:prstGeom>
+          <a:ln>
+            <a:solidFill>
+              <a:srgbClr val="9CE169"/>
+            </a:solidFill>
+            <a:tailEnd type="triangle"/>
+          </a:ln>
+        </p:spPr>
+        <p:style>
+          <a:lnRef idx="1">
+            <a:schemeClr val="accent1"/>
+          </a:lnRef>
+          <a:fillRef idx="0">
+            <a:schemeClr val="accent1"/>
+          </a:fillRef>
+          <a:effectRef idx="0">
+            <a:schemeClr val="accent1"/>
+          </a:effectRef>
+          <a:fontRef idx="minor">
+            <a:schemeClr val="tx1"/>
+          </a:fontRef>
+        </p:style>
+      </p:cxnSp>
+      <p:cxnSp>
+        <p:nvCxnSpPr>
+          <p:cNvPr id="54" name="Conector de Seta Reta 53">
+            <a:extLst>
+              <a:ext uri="{FF2B5EF4-FFF2-40B4-BE49-F238E27FC236}">
+                <a16:creationId xmlns:a16="http://schemas.microsoft.com/office/drawing/2014/main" id="{93E11A4D-EBCB-4B25-8336-315F504CD1CB}"/>
+              </a:ext>
+            </a:extLst>
+          </p:cNvPr>
+          <p:cNvCxnSpPr>
+            <a:cxnSpLocks/>
+          </p:cNvCxnSpPr>
+          <p:nvPr/>
+        </p:nvCxnSpPr>
+        <p:spPr>
+          <a:xfrm>
+            <a:off x="6679098" y="3434265"/>
+            <a:ext cx="689021" cy="0"/>
+          </a:xfrm>
+          <a:prstGeom prst="straightConnector1">
+            <a:avLst/>
+          </a:prstGeom>
+          <a:ln>
+            <a:solidFill>
+              <a:srgbClr val="9CE169"/>
+            </a:solidFill>
+            <a:tailEnd type="triangle"/>
+          </a:ln>
+        </p:spPr>
+        <p:style>
+          <a:lnRef idx="1">
+            <a:schemeClr val="accent1"/>
+          </a:lnRef>
+          <a:fillRef idx="0">
+            <a:schemeClr val="accent1"/>
+          </a:fillRef>
+          <a:effectRef idx="0">
+            <a:schemeClr val="accent1"/>
+          </a:effectRef>
+          <a:fontRef idx="minor">
+            <a:schemeClr val="tx1"/>
+          </a:fontRef>
+        </p:style>
+      </p:cxnSp>
+      <p:cxnSp>
+        <p:nvCxnSpPr>
+          <p:cNvPr id="55" name="Conector de Seta Reta 54">
+            <a:extLst>
+              <a:ext uri="{FF2B5EF4-FFF2-40B4-BE49-F238E27FC236}">
+                <a16:creationId xmlns:a16="http://schemas.microsoft.com/office/drawing/2014/main" id="{1D74C6EA-6D79-4D24-8E7E-7C460F82ADF3}"/>
+              </a:ext>
+            </a:extLst>
+          </p:cNvPr>
+          <p:cNvCxnSpPr>
+            <a:cxnSpLocks/>
+          </p:cNvCxnSpPr>
+          <p:nvPr/>
+        </p:nvCxnSpPr>
+        <p:spPr>
+          <a:xfrm flipV="1">
+            <a:off x="7779591" y="3852160"/>
+            <a:ext cx="1" cy="585860"/>
+          </a:xfrm>
+          <a:prstGeom prst="straightConnector1">
+            <a:avLst/>
+          </a:prstGeom>
+          <a:ln>
+            <a:solidFill>
+              <a:srgbClr val="9940CC"/>
+            </a:solidFill>
+            <a:tailEnd type="triangle"/>
+          </a:ln>
+        </p:spPr>
+        <p:style>
+          <a:lnRef idx="1">
+            <a:schemeClr val="accent1"/>
+          </a:lnRef>
+          <a:fillRef idx="0">
+            <a:schemeClr val="accent1"/>
+          </a:fillRef>
+          <a:effectRef idx="0">
+            <a:schemeClr val="accent1"/>
+          </a:effectRef>
+          <a:fontRef idx="minor">
+            <a:schemeClr val="tx1"/>
+          </a:fontRef>
+        </p:style>
+      </p:cxnSp>
+      <p:cxnSp>
+        <p:nvCxnSpPr>
+          <p:cNvPr id="56" name="Conector de Seta Reta 55">
+            <a:extLst>
+              <a:ext uri="{FF2B5EF4-FFF2-40B4-BE49-F238E27FC236}">
+                <a16:creationId xmlns:a16="http://schemas.microsoft.com/office/drawing/2014/main" id="{72778425-BC2E-4152-955C-2C2950385313}"/>
+              </a:ext>
+            </a:extLst>
+          </p:cNvPr>
+          <p:cNvCxnSpPr>
+            <a:cxnSpLocks/>
+          </p:cNvCxnSpPr>
+          <p:nvPr/>
+        </p:nvCxnSpPr>
+        <p:spPr>
+          <a:xfrm>
+            <a:off x="7949434" y="3877622"/>
+            <a:ext cx="0" cy="560398"/>
+          </a:xfrm>
+          <a:prstGeom prst="straightConnector1">
+            <a:avLst/>
+          </a:prstGeom>
+          <a:ln>
+            <a:solidFill>
+              <a:srgbClr val="9CE169"/>
+            </a:solidFill>
+            <a:tailEnd type="triangle"/>
+          </a:ln>
+        </p:spPr>
+        <p:style>
+          <a:lnRef idx="1">
+            <a:schemeClr val="accent1"/>
+          </a:lnRef>
+          <a:fillRef idx="0">
+            <a:schemeClr val="accent1"/>
+          </a:fillRef>
+          <a:effectRef idx="0">
+            <a:schemeClr val="accent1"/>
+          </a:effectRef>
+          <a:fontRef idx="minor">
+            <a:schemeClr val="tx1"/>
+          </a:fontRef>
+        </p:style>
+      </p:cxnSp>
+      <p:sp>
+        <p:nvSpPr>
+          <p:cNvPr id="70" name="CaixaDeTexto 69">
+            <a:extLst>
+              <a:ext uri="{FF2B5EF4-FFF2-40B4-BE49-F238E27FC236}">
+                <a16:creationId xmlns:a16="http://schemas.microsoft.com/office/drawing/2014/main" id="{1AB27E2A-5487-42F4-B538-DD085A524F21}"/>
+              </a:ext>
+            </a:extLst>
+          </p:cNvPr>
+          <p:cNvSpPr txBox="1"/>
+          <p:nvPr/>
+        </p:nvSpPr>
+        <p:spPr>
+          <a:xfrm>
+            <a:off x="627798" y="5046631"/>
+            <a:ext cx="3098041" cy="369332"/>
+          </a:xfrm>
+          <a:prstGeom prst="rect">
+            <a:avLst/>
+          </a:prstGeom>
+          <a:noFill/>
+        </p:spPr>
+        <p:txBody>
+          <a:bodyPr wrap="square" rtlCol="0">
+            <a:spAutoFit/>
+          </a:bodyPr>
+          <a:lstStyle/>
+          <a:p>
+            <a:pPr algn="ctr"/>
+            <a:r>
+              <a:rPr lang="pt-BR" dirty="0">
+                <a:solidFill>
+                  <a:schemeClr val="bg1">
+                    <a:lumMod val="50000"/>
+                  </a:schemeClr>
+                </a:solidFill>
+              </a:rPr>
+              <a:t>Estacionamento</a:t>
+            </a:r>
+          </a:p>
+        </p:txBody>
+      </p:sp>
+      <p:sp>
+        <p:nvSpPr>
+          <p:cNvPr id="71" name="CaixaDeTexto 70">
+            <a:extLst>
+              <a:ext uri="{FF2B5EF4-FFF2-40B4-BE49-F238E27FC236}">
+                <a16:creationId xmlns:a16="http://schemas.microsoft.com/office/drawing/2014/main" id="{0FB48185-6889-4311-B14D-D131115A9F0C}"/>
+              </a:ext>
+            </a:extLst>
+          </p:cNvPr>
+          <p:cNvSpPr txBox="1"/>
+          <p:nvPr/>
+        </p:nvSpPr>
+        <p:spPr>
+          <a:xfrm>
+            <a:off x="4540841" y="2359936"/>
+            <a:ext cx="3098041" cy="369332"/>
+          </a:xfrm>
+          <a:prstGeom prst="rect">
+            <a:avLst/>
+          </a:prstGeom>
+          <a:noFill/>
+        </p:spPr>
+        <p:txBody>
+          <a:bodyPr wrap="square" rtlCol="0">
+            <a:spAutoFit/>
+          </a:bodyPr>
+          <a:lstStyle/>
+          <a:p>
+            <a:pPr algn="ctr"/>
+            <a:r>
+              <a:rPr lang="pt-BR" dirty="0">
+                <a:solidFill>
+                  <a:schemeClr val="bg1">
+                    <a:lumMod val="50000"/>
+                  </a:schemeClr>
+                </a:solidFill>
+              </a:rPr>
+              <a:t>Servidor</a:t>
+            </a:r>
+          </a:p>
+        </p:txBody>
+      </p:sp>
+      <p:sp>
+        <p:nvSpPr>
+          <p:cNvPr id="72" name="CaixaDeTexto 71">
+            <a:extLst>
+              <a:ext uri="{FF2B5EF4-FFF2-40B4-BE49-F238E27FC236}">
+                <a16:creationId xmlns:a16="http://schemas.microsoft.com/office/drawing/2014/main" id="{DC1198D3-D02E-412E-ABD2-4BAEE048E467}"/>
+              </a:ext>
+            </a:extLst>
+          </p:cNvPr>
+          <p:cNvSpPr txBox="1"/>
+          <p:nvPr/>
+        </p:nvSpPr>
+        <p:spPr>
+          <a:xfrm>
+            <a:off x="6395264" y="5627047"/>
+            <a:ext cx="3098041" cy="369332"/>
+          </a:xfrm>
+          <a:prstGeom prst="rect">
+            <a:avLst/>
+          </a:prstGeom>
+          <a:noFill/>
+        </p:spPr>
+        <p:txBody>
+          <a:bodyPr wrap="square" rtlCol="0">
+            <a:spAutoFit/>
+          </a:bodyPr>
+          <a:lstStyle/>
+          <a:p>
+            <a:pPr algn="ctr"/>
+            <a:r>
+              <a:rPr lang="pt-BR" dirty="0">
+                <a:solidFill>
+                  <a:schemeClr val="bg1">
+                    <a:lumMod val="50000"/>
+                  </a:schemeClr>
+                </a:solidFill>
+              </a:rPr>
+              <a:t>Aplicativo/Web</a:t>
+            </a:r>
+          </a:p>
+        </p:txBody>
+      </p:sp>
+      <p:sp>
+        <p:nvSpPr>
+          <p:cNvPr id="73" name="CaixaDeTexto 72">
+            <a:extLst>
+              <a:ext uri="{FF2B5EF4-FFF2-40B4-BE49-F238E27FC236}">
+                <a16:creationId xmlns:a16="http://schemas.microsoft.com/office/drawing/2014/main" id="{5985F4F9-1D2D-4676-9572-42F6606AF5AC}"/>
+              </a:ext>
+            </a:extLst>
+          </p:cNvPr>
+          <p:cNvSpPr txBox="1"/>
+          <p:nvPr/>
+        </p:nvSpPr>
+        <p:spPr>
+          <a:xfrm>
+            <a:off x="947877" y="1825473"/>
+            <a:ext cx="934872" cy="276999"/>
+          </a:xfrm>
+          <a:prstGeom prst="rect">
+            <a:avLst/>
+          </a:prstGeom>
+          <a:noFill/>
+        </p:spPr>
+        <p:txBody>
+          <a:bodyPr wrap="square" rtlCol="0">
+            <a:spAutoFit/>
+          </a:bodyPr>
+          <a:lstStyle/>
+          <a:p>
+            <a:pPr algn="ctr"/>
+            <a:r>
+              <a:rPr lang="pt-BR" sz="1200" dirty="0">
+                <a:solidFill>
+                  <a:schemeClr val="bg1">
+                    <a:lumMod val="50000"/>
+                  </a:schemeClr>
+                </a:solidFill>
+              </a:rPr>
+              <a:t>Vaga 1</a:t>
+            </a:r>
+          </a:p>
+        </p:txBody>
+      </p:sp>
+      <p:sp>
+        <p:nvSpPr>
+          <p:cNvPr id="74" name="CaixaDeTexto 73">
+            <a:extLst>
+              <a:ext uri="{FF2B5EF4-FFF2-40B4-BE49-F238E27FC236}">
+                <a16:creationId xmlns:a16="http://schemas.microsoft.com/office/drawing/2014/main" id="{071F00D1-E92B-4E7F-B306-3747FDB76631}"/>
+              </a:ext>
+            </a:extLst>
+          </p:cNvPr>
+          <p:cNvSpPr txBox="1"/>
+          <p:nvPr/>
+        </p:nvSpPr>
+        <p:spPr>
+          <a:xfrm>
+            <a:off x="989217" y="2729268"/>
+            <a:ext cx="934872" cy="276999"/>
+          </a:xfrm>
+          <a:prstGeom prst="rect">
+            <a:avLst/>
+          </a:prstGeom>
+          <a:noFill/>
+        </p:spPr>
+        <p:txBody>
+          <a:bodyPr wrap="square" rtlCol="0">
+            <a:spAutoFit/>
+          </a:bodyPr>
+          <a:lstStyle/>
+          <a:p>
+            <a:pPr algn="ctr"/>
+            <a:r>
+              <a:rPr lang="pt-BR" sz="1200" dirty="0">
+                <a:solidFill>
+                  <a:schemeClr val="bg1">
+                    <a:lumMod val="50000"/>
+                  </a:schemeClr>
+                </a:solidFill>
+              </a:rPr>
+              <a:t>Vaga 2</a:t>
+            </a:r>
+          </a:p>
+        </p:txBody>
+      </p:sp>
+      <p:sp>
+        <p:nvSpPr>
+          <p:cNvPr id="75" name="CaixaDeTexto 74">
+            <a:extLst>
+              <a:ext uri="{FF2B5EF4-FFF2-40B4-BE49-F238E27FC236}">
+                <a16:creationId xmlns:a16="http://schemas.microsoft.com/office/drawing/2014/main" id="{44C1203A-7912-4C22-9AC1-60C6BDBCA686}"/>
+              </a:ext>
+            </a:extLst>
+          </p:cNvPr>
+          <p:cNvSpPr txBox="1"/>
+          <p:nvPr/>
+        </p:nvSpPr>
+        <p:spPr>
+          <a:xfrm>
+            <a:off x="989217" y="3850326"/>
+            <a:ext cx="934872" cy="276999"/>
+          </a:xfrm>
+          <a:prstGeom prst="rect">
+            <a:avLst/>
+          </a:prstGeom>
+          <a:noFill/>
+        </p:spPr>
+        <p:txBody>
+          <a:bodyPr wrap="square" rtlCol="0">
+            <a:spAutoFit/>
+          </a:bodyPr>
+          <a:lstStyle/>
+          <a:p>
+            <a:pPr algn="ctr"/>
+            <a:r>
+              <a:rPr lang="pt-BR" sz="1200" dirty="0">
+                <a:solidFill>
+                  <a:srgbClr val="9940CC"/>
+                </a:solidFill>
+              </a:rPr>
+              <a:t>Vaga 3</a:t>
+            </a:r>
+          </a:p>
+        </p:txBody>
+      </p:sp>
+      <p:sp>
+        <p:nvSpPr>
+          <p:cNvPr id="76" name="CaixaDeTexto 75">
+            <a:extLst>
+              <a:ext uri="{FF2B5EF4-FFF2-40B4-BE49-F238E27FC236}">
+                <a16:creationId xmlns:a16="http://schemas.microsoft.com/office/drawing/2014/main" id="{930B661D-33E0-42E1-A86A-A0A19FAD5CF7}"/>
+              </a:ext>
+            </a:extLst>
+          </p:cNvPr>
+          <p:cNvSpPr txBox="1"/>
+          <p:nvPr/>
+        </p:nvSpPr>
+        <p:spPr>
+          <a:xfrm>
+            <a:off x="991489" y="4862536"/>
+            <a:ext cx="934872" cy="276999"/>
+          </a:xfrm>
+          <a:prstGeom prst="rect">
+            <a:avLst/>
+          </a:prstGeom>
+          <a:noFill/>
+        </p:spPr>
+        <p:txBody>
+          <a:bodyPr wrap="square" rtlCol="0">
+            <a:spAutoFit/>
+          </a:bodyPr>
+          <a:lstStyle/>
+          <a:p>
+            <a:pPr algn="ctr"/>
+            <a:r>
+              <a:rPr lang="pt-BR" sz="1200" dirty="0">
+                <a:solidFill>
+                  <a:schemeClr val="bg1">
+                    <a:lumMod val="50000"/>
+                  </a:schemeClr>
+                </a:solidFill>
+              </a:rPr>
+              <a:t>Vaga 4</a:t>
+            </a:r>
+          </a:p>
+        </p:txBody>
+      </p:sp>
+      <p:pic>
+        <p:nvPicPr>
+          <p:cNvPr id="78" name="Imagem 77">
+            <a:extLst>
+              <a:ext uri="{FF2B5EF4-FFF2-40B4-BE49-F238E27FC236}">
+                <a16:creationId xmlns:a16="http://schemas.microsoft.com/office/drawing/2014/main" id="{DAB752EC-1E0A-4E45-B83F-A5080EE1615B}"/>
+              </a:ext>
+            </a:extLst>
+          </p:cNvPr>
+          <p:cNvPicPr>
+            <a:picLocks noChangeAspect="1"/>
+          </p:cNvPicPr>
+          <p:nvPr/>
+        </p:nvPicPr>
+        <p:blipFill>
+          <a:blip r:embed="rId8" cstate="print">
+            <a:duotone>
+              <a:prstClr val="black"/>
+              <a:schemeClr val="accent1">
+                <a:lumMod val="50000"/>
+                <a:tint val="45000"/>
+                <a:satMod val="400000"/>
+              </a:schemeClr>
+            </a:duotone>
+            <a:extLst>
+              <a:ext uri="{28A0092B-C50C-407E-A947-70E740481C1C}">
+                <a14:useLocalDpi xmlns:a14="http://schemas.microsoft.com/office/drawing/2010/main" val="0"/>
+              </a:ext>
+            </a:extLst>
+          </a:blip>
+          <a:stretch>
+            <a:fillRect/>
+          </a:stretch>
+        </p:blipFill>
+        <p:spPr>
+          <a:xfrm flipH="1">
+            <a:off x="749824" y="3101829"/>
+            <a:ext cx="806779" cy="806779"/>
+          </a:xfrm>
+          <a:prstGeom prst="rect">
+            <a:avLst/>
+          </a:prstGeom>
+        </p:spPr>
+      </p:pic>
+      <p:sp>
+        <p:nvSpPr>
+          <p:cNvPr id="79" name="CaixaDeTexto 78">
+            <a:extLst>
+              <a:ext uri="{FF2B5EF4-FFF2-40B4-BE49-F238E27FC236}">
+                <a16:creationId xmlns:a16="http://schemas.microsoft.com/office/drawing/2014/main" id="{C0EEAE68-548B-4597-B9C3-49E70F4D45D6}"/>
+              </a:ext>
+            </a:extLst>
+          </p:cNvPr>
+          <p:cNvSpPr txBox="1"/>
+          <p:nvPr/>
+        </p:nvSpPr>
+        <p:spPr>
+          <a:xfrm>
+            <a:off x="3029004" y="3690147"/>
+            <a:ext cx="1228225" cy="830997"/>
+          </a:xfrm>
+          <a:prstGeom prst="rect">
+            <a:avLst/>
+          </a:prstGeom>
+          <a:noFill/>
+        </p:spPr>
+        <p:txBody>
+          <a:bodyPr wrap="square" rtlCol="0">
+            <a:spAutoFit/>
+          </a:bodyPr>
+          <a:lstStyle/>
+          <a:p>
+            <a:pPr algn="ctr"/>
+            <a:r>
+              <a:rPr lang="pt-BR" sz="1200" dirty="0">
+                <a:solidFill>
+                  <a:schemeClr val="accent1">
+                    <a:lumMod val="75000"/>
+                  </a:schemeClr>
+                </a:solidFill>
+              </a:rPr>
+              <a:t>Informa Vagas Livres e Ocupadas na Região</a:t>
+            </a:r>
+          </a:p>
+        </p:txBody>
+      </p:sp>
+      <p:sp>
+        <p:nvSpPr>
+          <p:cNvPr id="80" name="CaixaDeTexto 79">
+            <a:extLst>
+              <a:ext uri="{FF2B5EF4-FFF2-40B4-BE49-F238E27FC236}">
+                <a16:creationId xmlns:a16="http://schemas.microsoft.com/office/drawing/2014/main" id="{3FAAB88B-FE87-489D-8A1D-8CAECDC8B794}"/>
+              </a:ext>
+            </a:extLst>
+          </p:cNvPr>
+          <p:cNvSpPr txBox="1"/>
+          <p:nvPr/>
+        </p:nvSpPr>
+        <p:spPr>
+          <a:xfrm>
+            <a:off x="5380145" y="3718216"/>
+            <a:ext cx="1579626" cy="830997"/>
+          </a:xfrm>
+          <a:prstGeom prst="rect">
+            <a:avLst/>
+          </a:prstGeom>
+          <a:noFill/>
+        </p:spPr>
+        <p:txBody>
+          <a:bodyPr wrap="square" rtlCol="0">
+            <a:spAutoFit/>
+          </a:bodyPr>
+          <a:lstStyle/>
+          <a:p>
+            <a:pPr algn="ctr"/>
+            <a:r>
+              <a:rPr lang="pt-BR" sz="1200" dirty="0">
+                <a:solidFill>
+                  <a:schemeClr val="accent1">
+                    <a:lumMod val="75000"/>
+                  </a:schemeClr>
+                </a:solidFill>
+              </a:rPr>
+              <a:t>Processa a informação e classifica o local, tipo e disponibilidade da vaga na região</a:t>
+            </a:r>
+          </a:p>
+        </p:txBody>
+      </p:sp>
+      <p:sp>
+        <p:nvSpPr>
+          <p:cNvPr id="81" name="CaixaDeTexto 80">
+            <a:extLst>
+              <a:ext uri="{FF2B5EF4-FFF2-40B4-BE49-F238E27FC236}">
+                <a16:creationId xmlns:a16="http://schemas.microsoft.com/office/drawing/2014/main" id="{D3DCCC21-4535-44B3-A443-CE9147DE0325}"/>
+              </a:ext>
+            </a:extLst>
+          </p:cNvPr>
+          <p:cNvSpPr txBox="1"/>
+          <p:nvPr/>
+        </p:nvSpPr>
+        <p:spPr>
+          <a:xfrm>
+            <a:off x="8004008" y="3310903"/>
+            <a:ext cx="1208214" cy="1200329"/>
+          </a:xfrm>
+          <a:prstGeom prst="rect">
+            <a:avLst/>
+          </a:prstGeom>
+          <a:noFill/>
+        </p:spPr>
+        <p:txBody>
+          <a:bodyPr wrap="square" rtlCol="0">
+            <a:spAutoFit/>
+          </a:bodyPr>
+          <a:lstStyle/>
+          <a:p>
+            <a:pPr algn="ctr"/>
+            <a:r>
+              <a:rPr lang="pt-BR" sz="1200" dirty="0">
+                <a:solidFill>
+                  <a:schemeClr val="accent1">
+                    <a:lumMod val="75000"/>
+                  </a:schemeClr>
+                </a:solidFill>
+              </a:rPr>
+              <a:t>Informa o resultado do processamento e recebe solicitações de reservas</a:t>
+            </a:r>
+          </a:p>
+        </p:txBody>
+      </p:sp>
+      <p:sp>
+        <p:nvSpPr>
+          <p:cNvPr id="82" name="CaixaDeTexto 81">
+            <a:extLst>
+              <a:ext uri="{FF2B5EF4-FFF2-40B4-BE49-F238E27FC236}">
+                <a16:creationId xmlns:a16="http://schemas.microsoft.com/office/drawing/2014/main" id="{64A47887-1341-4502-B4AC-9246A6AB33A0}"/>
+              </a:ext>
+            </a:extLst>
+          </p:cNvPr>
+          <p:cNvSpPr txBox="1"/>
+          <p:nvPr/>
+        </p:nvSpPr>
+        <p:spPr>
+          <a:xfrm>
+            <a:off x="3177195" y="2340895"/>
+            <a:ext cx="1228225" cy="646331"/>
+          </a:xfrm>
+          <a:prstGeom prst="rect">
+            <a:avLst/>
+          </a:prstGeom>
+          <a:noFill/>
+        </p:spPr>
+        <p:txBody>
+          <a:bodyPr wrap="square" rtlCol="0">
+            <a:spAutoFit/>
+          </a:bodyPr>
+          <a:lstStyle/>
+          <a:p>
+            <a:pPr algn="ctr"/>
+            <a:r>
+              <a:rPr lang="pt-BR" sz="1200" dirty="0">
+                <a:solidFill>
+                  <a:schemeClr val="accent1">
+                    <a:lumMod val="75000"/>
+                  </a:schemeClr>
+                </a:solidFill>
+              </a:rPr>
+              <a:t>Reserva/Libera Virtualmente uma Vaga</a:t>
+            </a:r>
+          </a:p>
+        </p:txBody>
+      </p:sp>
+      <p:sp>
+        <p:nvSpPr>
+          <p:cNvPr id="83" name="CaixaDeTexto 82">
+            <a:extLst>
+              <a:ext uri="{FF2B5EF4-FFF2-40B4-BE49-F238E27FC236}">
+                <a16:creationId xmlns:a16="http://schemas.microsoft.com/office/drawing/2014/main" id="{30A195DC-010E-4889-93F8-85BBA98E6830}"/>
+              </a:ext>
+            </a:extLst>
+          </p:cNvPr>
+          <p:cNvSpPr txBox="1"/>
+          <p:nvPr/>
+        </p:nvSpPr>
+        <p:spPr>
+          <a:xfrm>
+            <a:off x="5733866" y="5287487"/>
+            <a:ext cx="1634253" cy="646331"/>
+          </a:xfrm>
+          <a:prstGeom prst="rect">
+            <a:avLst/>
+          </a:prstGeom>
+          <a:noFill/>
+        </p:spPr>
+        <p:txBody>
+          <a:bodyPr wrap="square" rtlCol="0">
+            <a:spAutoFit/>
+          </a:bodyPr>
+          <a:lstStyle/>
+          <a:p>
+            <a:pPr algn="ctr"/>
+            <a:r>
+              <a:rPr lang="pt-BR" sz="1200" dirty="0">
+                <a:solidFill>
+                  <a:schemeClr val="accent1">
+                    <a:lumMod val="75000"/>
+                  </a:schemeClr>
+                </a:solidFill>
+              </a:rPr>
+              <a:t>Vê vagas e informações/Solicita reservas</a:t>
+            </a:r>
+          </a:p>
+        </p:txBody>
+      </p:sp>
+    </p:spTree>
+    <p:extLst>
+      <p:ext uri="{BB962C8B-B14F-4D97-AF65-F5344CB8AC3E}">
+        <p14:creationId xmlns:p14="http://schemas.microsoft.com/office/powerpoint/2010/main" val="1228936730"/>
+      </p:ext>
+    </p:extLst>
+  </p:cSld>
+  <p:clrMapOvr>
+    <a:masterClrMapping/>
+  </p:clrMapOvr>
 </p:sld>
 </file>
 

</xml_diff>

<commit_message>
Adição da segunda apresentação do projeto
</commit_message>
<xml_diff>
--- a/Apresentação - Projeto.pptx
+++ b/Apresentação - Projeto.pptx
@@ -11,10 +11,11 @@
     <p:sldId id="266" r:id="rId5"/>
     <p:sldId id="268" r:id="rId6"/>
     <p:sldId id="267" r:id="rId7"/>
-    <p:sldId id="259" r:id="rId8"/>
-    <p:sldId id="269" r:id="rId9"/>
-    <p:sldId id="261" r:id="rId10"/>
-    <p:sldId id="262" r:id="rId11"/>
+    <p:sldId id="270" r:id="rId8"/>
+    <p:sldId id="259" r:id="rId9"/>
+    <p:sldId id="269" r:id="rId10"/>
+    <p:sldId id="261" r:id="rId11"/>
+    <p:sldId id="262" r:id="rId12"/>
   </p:sldIdLst>
   <p:sldSz cx="9144000" cy="6858000" type="screen4x3"/>
   <p:notesSz cx="6858000" cy="9144000"/>
@@ -256,7 +257,7 @@
           <a:p>
             <a:fld id="{10FE5BFE-EBFF-4D6E-8C56-06511E61A9FB}" type="datetimeFigureOut">
               <a:rPr lang="pt-BR" smtClean="0"/>
-              <a:t>31/08/2017</a:t>
+              <a:t>01/09/2017</a:t>
             </a:fld>
             <a:endParaRPr lang="pt-BR"/>
           </a:p>
@@ -426,7 +427,7 @@
           <a:p>
             <a:fld id="{10FE5BFE-EBFF-4D6E-8C56-06511E61A9FB}" type="datetimeFigureOut">
               <a:rPr lang="pt-BR" smtClean="0"/>
-              <a:t>31/08/2017</a:t>
+              <a:t>01/09/2017</a:t>
             </a:fld>
             <a:endParaRPr lang="pt-BR"/>
           </a:p>
@@ -606,7 +607,7 @@
           <a:p>
             <a:fld id="{10FE5BFE-EBFF-4D6E-8C56-06511E61A9FB}" type="datetimeFigureOut">
               <a:rPr lang="pt-BR" smtClean="0"/>
-              <a:t>31/08/2017</a:t>
+              <a:t>01/09/2017</a:t>
             </a:fld>
             <a:endParaRPr lang="pt-BR"/>
           </a:p>
@@ -776,7 +777,7 @@
           <a:p>
             <a:fld id="{10FE5BFE-EBFF-4D6E-8C56-06511E61A9FB}" type="datetimeFigureOut">
               <a:rPr lang="pt-BR" smtClean="0"/>
-              <a:t>31/08/2017</a:t>
+              <a:t>01/09/2017</a:t>
             </a:fld>
             <a:endParaRPr lang="pt-BR"/>
           </a:p>
@@ -1020,7 +1021,7 @@
           <a:p>
             <a:fld id="{10FE5BFE-EBFF-4D6E-8C56-06511E61A9FB}" type="datetimeFigureOut">
               <a:rPr lang="pt-BR" smtClean="0"/>
-              <a:t>31/08/2017</a:t>
+              <a:t>01/09/2017</a:t>
             </a:fld>
             <a:endParaRPr lang="pt-BR"/>
           </a:p>
@@ -1252,7 +1253,7 @@
           <a:p>
             <a:fld id="{10FE5BFE-EBFF-4D6E-8C56-06511E61A9FB}" type="datetimeFigureOut">
               <a:rPr lang="pt-BR" smtClean="0"/>
-              <a:t>31/08/2017</a:t>
+              <a:t>01/09/2017</a:t>
             </a:fld>
             <a:endParaRPr lang="pt-BR"/>
           </a:p>
@@ -1619,7 +1620,7 @@
           <a:p>
             <a:fld id="{10FE5BFE-EBFF-4D6E-8C56-06511E61A9FB}" type="datetimeFigureOut">
               <a:rPr lang="pt-BR" smtClean="0"/>
-              <a:t>31/08/2017</a:t>
+              <a:t>01/09/2017</a:t>
             </a:fld>
             <a:endParaRPr lang="pt-BR"/>
           </a:p>
@@ -1737,7 +1738,7 @@
           <a:p>
             <a:fld id="{10FE5BFE-EBFF-4D6E-8C56-06511E61A9FB}" type="datetimeFigureOut">
               <a:rPr lang="pt-BR" smtClean="0"/>
-              <a:t>31/08/2017</a:t>
+              <a:t>01/09/2017</a:t>
             </a:fld>
             <a:endParaRPr lang="pt-BR"/>
           </a:p>
@@ -1832,7 +1833,7 @@
           <a:p>
             <a:fld id="{10FE5BFE-EBFF-4D6E-8C56-06511E61A9FB}" type="datetimeFigureOut">
               <a:rPr lang="pt-BR" smtClean="0"/>
-              <a:t>31/08/2017</a:t>
+              <a:t>01/09/2017</a:t>
             </a:fld>
             <a:endParaRPr lang="pt-BR"/>
           </a:p>
@@ -2109,7 +2110,7 @@
           <a:p>
             <a:fld id="{10FE5BFE-EBFF-4D6E-8C56-06511E61A9FB}" type="datetimeFigureOut">
               <a:rPr lang="pt-BR" smtClean="0"/>
-              <a:t>31/08/2017</a:t>
+              <a:t>01/09/2017</a:t>
             </a:fld>
             <a:endParaRPr lang="pt-BR"/>
           </a:p>
@@ -2366,7 +2367,7 @@
           <a:p>
             <a:fld id="{10FE5BFE-EBFF-4D6E-8C56-06511E61A9FB}" type="datetimeFigureOut">
               <a:rPr lang="pt-BR" smtClean="0"/>
-              <a:t>31/08/2017</a:t>
+              <a:t>01/09/2017</a:t>
             </a:fld>
             <a:endParaRPr lang="pt-BR"/>
           </a:p>
@@ -2588,7 +2589,7 @@
           <a:p>
             <a:fld id="{10FE5BFE-EBFF-4D6E-8C56-06511E61A9FB}" type="datetimeFigureOut">
               <a:rPr lang="pt-BR" smtClean="0"/>
-              <a:t>31/08/2017</a:t>
+              <a:t>01/09/2017</a:t>
             </a:fld>
             <a:endParaRPr lang="pt-BR"/>
           </a:p>
@@ -3130,7 +3131,129 @@
           <p:cNvPr id="2" name="Título 1">
             <a:extLst>
               <a:ext uri="{FF2B5EF4-FFF2-40B4-BE49-F238E27FC236}">
-                <a16:creationId xmlns:a16="http://schemas.microsoft.com/office/drawing/2014/main" xmlns="" id="{BE07E189-A6F3-40C3-A7BD-0FE653BF89F2}"/>
+                <a16:creationId xmlns:a16="http://schemas.microsoft.com/office/drawing/2014/main" id="{F2B947D0-576F-47F6-8609-E9C08D781D29}"/>
+              </a:ext>
+            </a:extLst>
+          </p:cNvPr>
+          <p:cNvSpPr>
+            <a:spLocks noGrp="1"/>
+          </p:cNvSpPr>
+          <p:nvPr>
+            <p:ph type="title"/>
+          </p:nvPr>
+        </p:nvSpPr>
+        <p:spPr/>
+        <p:txBody>
+          <a:bodyPr/>
+          <a:lstStyle/>
+          <a:p>
+            <a:r>
+              <a:rPr lang="pt-BR" dirty="0"/>
+              <a:t>Considerações finais</a:t>
+            </a:r>
+          </a:p>
+        </p:txBody>
+      </p:sp>
+      <p:sp>
+        <p:nvSpPr>
+          <p:cNvPr id="3" name="Espaço Reservado para Conteúdo 2">
+            <a:extLst>
+              <a:ext uri="{FF2B5EF4-FFF2-40B4-BE49-F238E27FC236}">
+                <a16:creationId xmlns:a16="http://schemas.microsoft.com/office/drawing/2014/main" id="{AE4E2037-6713-40C8-B78D-FF89A0C6A191}"/>
+              </a:ext>
+            </a:extLst>
+          </p:cNvPr>
+          <p:cNvSpPr>
+            <a:spLocks noGrp="1"/>
+          </p:cNvSpPr>
+          <p:nvPr>
+            <p:ph idx="1"/>
+          </p:nvPr>
+        </p:nvSpPr>
+        <p:spPr/>
+        <p:txBody>
+          <a:bodyPr/>
+          <a:lstStyle/>
+          <a:p>
+            <a:r>
+              <a:rPr lang="pt-BR" dirty="0"/>
+              <a:t>Extensão da ideia</a:t>
+            </a:r>
+          </a:p>
+          <a:p>
+            <a:pPr lvl="1"/>
+            <a:r>
+              <a:rPr lang="pt-BR" dirty="0"/>
+              <a:t>Vagas públicas em shoppings</a:t>
+            </a:r>
+          </a:p>
+          <a:p>
+            <a:pPr lvl="1"/>
+            <a:r>
+              <a:rPr lang="pt-BR" dirty="0"/>
+              <a:t>Reservar estacionamento particular de outros usuários</a:t>
+            </a:r>
+          </a:p>
+          <a:p>
+            <a:pPr lvl="1"/>
+            <a:endParaRPr lang="pt-BR" dirty="0"/>
+          </a:p>
+          <a:p>
+            <a:pPr marL="0" indent="0">
+              <a:buNone/>
+            </a:pPr>
+            <a:endParaRPr lang="pt-BR" dirty="0"/>
+          </a:p>
+        </p:txBody>
+      </p:sp>
+    </p:spTree>
+    <p:extLst>
+      <p:ext uri="{BB962C8B-B14F-4D97-AF65-F5344CB8AC3E}">
+        <p14:creationId xmlns:p14="http://schemas.microsoft.com/office/powerpoint/2010/main" val="1836809286"/>
+      </p:ext>
+    </p:extLst>
+  </p:cSld>
+  <p:clrMapOvr>
+    <a:masterClrMapping/>
+  </p:clrMapOvr>
+  <mc:AlternateContent xmlns:mc="http://schemas.openxmlformats.org/markup-compatibility/2006" xmlns:p14="http://schemas.microsoft.com/office/powerpoint/2010/main">
+    <mc:Choice Requires="p14">
+      <p:transition spd="med" p14:dur="700">
+        <p:fade/>
+      </p:transition>
+    </mc:Choice>
+    <mc:Fallback xmlns="">
+      <p:transition spd="med">
+        <p:fade/>
+      </p:transition>
+    </mc:Fallback>
+  </mc:AlternateContent>
+</p:sld>
+</file>
+
+<file path=ppt/slides/slide11.xml><?xml version="1.0" encoding="utf-8"?>
+<p:sld xmlns:a="http://schemas.openxmlformats.org/drawingml/2006/main" xmlns:r="http://schemas.openxmlformats.org/officeDocument/2006/relationships" xmlns:p="http://schemas.openxmlformats.org/presentationml/2006/main">
+  <p:cSld>
+    <p:spTree>
+      <p:nvGrpSpPr>
+        <p:cNvPr id="1" name=""/>
+        <p:cNvGrpSpPr/>
+        <p:nvPr/>
+      </p:nvGrpSpPr>
+      <p:grpSpPr>
+        <a:xfrm>
+          <a:off x="0" y="0"/>
+          <a:ext cx="0" cy="0"/>
+          <a:chOff x="0" y="0"/>
+          <a:chExt cx="0" cy="0"/>
+        </a:xfrm>
+      </p:grpSpPr>
+      <p:sp>
+        <p:nvSpPr>
+          <p:cNvPr id="2" name="Título 1">
+            <a:extLst>
+              <a:ext uri="{FF2B5EF4-FFF2-40B4-BE49-F238E27FC236}">
+                <a16:creationId xmlns:a16="http://schemas.microsoft.com/office/drawing/2014/main" id="{BE07E189-A6F3-40C3-A7BD-0FE653BF89F2}"/>
               </a:ext>
             </a:extLst>
           </p:cNvPr>
@@ -3333,7 +3456,7 @@
           <p:cNvPr id="2" name="Título 1">
             <a:extLst>
               <a:ext uri="{FF2B5EF4-FFF2-40B4-BE49-F238E27FC236}">
-                <a16:creationId xmlns:a16="http://schemas.microsoft.com/office/drawing/2014/main" xmlns="" id="{D08976B5-9E57-4C41-948A-A2B364481CF8}"/>
+                <a16:creationId xmlns:a16="http://schemas.microsoft.com/office/drawing/2014/main" id="{D08976B5-9E57-4C41-948A-A2B364481CF8}"/>
               </a:ext>
             </a:extLst>
           </p:cNvPr>
@@ -3361,7 +3484,7 @@
           <p:cNvPr id="3" name="Espaço Reservado para Conteúdo 2">
             <a:extLst>
               <a:ext uri="{FF2B5EF4-FFF2-40B4-BE49-F238E27FC236}">
-                <a16:creationId xmlns:a16="http://schemas.microsoft.com/office/drawing/2014/main" xmlns="" id="{645333F7-299B-4BBD-BF58-650F0B644CAF}"/>
+                <a16:creationId xmlns:a16="http://schemas.microsoft.com/office/drawing/2014/main" id="{645333F7-299B-4BBD-BF58-650F0B644CAF}"/>
               </a:ext>
             </a:extLst>
           </p:cNvPr>
@@ -3449,7 +3572,7 @@
           <p:cNvPr id="2" name="Título 1">
             <a:extLst>
               <a:ext uri="{FF2B5EF4-FFF2-40B4-BE49-F238E27FC236}">
-                <a16:creationId xmlns:a16="http://schemas.microsoft.com/office/drawing/2014/main" xmlns="" id="{E2FFB0C0-CE0F-44F3-8F45-0C15B0F2CED4}"/>
+                <a16:creationId xmlns:a16="http://schemas.microsoft.com/office/drawing/2014/main" id="{E2FFB0C0-CE0F-44F3-8F45-0C15B0F2CED4}"/>
               </a:ext>
             </a:extLst>
           </p:cNvPr>
@@ -3477,7 +3600,7 @@
           <p:cNvPr id="3" name="Espaço Reservado para Conteúdo 2">
             <a:extLst>
               <a:ext uri="{FF2B5EF4-FFF2-40B4-BE49-F238E27FC236}">
-                <a16:creationId xmlns:a16="http://schemas.microsoft.com/office/drawing/2014/main" xmlns="" id="{7CBE2034-0293-4F1B-A35D-C330239EDAB1}"/>
+                <a16:creationId xmlns:a16="http://schemas.microsoft.com/office/drawing/2014/main" id="{7CBE2034-0293-4F1B-A35D-C330239EDAB1}"/>
               </a:ext>
             </a:extLst>
           </p:cNvPr>
@@ -3508,7 +3631,7 @@
           <p:cNvPr id="5" name="Imagem 4" descr="Uma imagem contendo equipamentos eletrônicos&#10;&#10;Descrição gerada com alta confiança">
             <a:extLst>
               <a:ext uri="{FF2B5EF4-FFF2-40B4-BE49-F238E27FC236}">
-                <a16:creationId xmlns:a16="http://schemas.microsoft.com/office/drawing/2014/main" xmlns="" id="{4C7D3967-0549-4A4E-96E4-160A28CA4307}"/>
+                <a16:creationId xmlns:a16="http://schemas.microsoft.com/office/drawing/2014/main" id="{4C7D3967-0549-4A4E-96E4-160A28CA4307}"/>
               </a:ext>
             </a:extLst>
           </p:cNvPr>
@@ -3586,7 +3709,7 @@
           <p:cNvPr id="2" name="Título 1">
             <a:extLst>
               <a:ext uri="{FF2B5EF4-FFF2-40B4-BE49-F238E27FC236}">
-                <a16:creationId xmlns:a16="http://schemas.microsoft.com/office/drawing/2014/main" xmlns="" id="{E2FFB0C0-CE0F-44F3-8F45-0C15B0F2CED4}"/>
+                <a16:creationId xmlns:a16="http://schemas.microsoft.com/office/drawing/2014/main" id="{E2FFB0C0-CE0F-44F3-8F45-0C15B0F2CED4}"/>
               </a:ext>
             </a:extLst>
           </p:cNvPr>
@@ -3614,7 +3737,7 @@
           <p:cNvPr id="3" name="Espaço Reservado para Conteúdo 2">
             <a:extLst>
               <a:ext uri="{FF2B5EF4-FFF2-40B4-BE49-F238E27FC236}">
-                <a16:creationId xmlns:a16="http://schemas.microsoft.com/office/drawing/2014/main" xmlns="" id="{7CBE2034-0293-4F1B-A35D-C330239EDAB1}"/>
+                <a16:creationId xmlns:a16="http://schemas.microsoft.com/office/drawing/2014/main" id="{7CBE2034-0293-4F1B-A35D-C330239EDAB1}"/>
               </a:ext>
             </a:extLst>
           </p:cNvPr>
@@ -3729,7 +3852,7 @@
           <p:cNvPr id="2" name="Título 1">
             <a:extLst>
               <a:ext uri="{FF2B5EF4-FFF2-40B4-BE49-F238E27FC236}">
-                <a16:creationId xmlns:a16="http://schemas.microsoft.com/office/drawing/2014/main" xmlns="" id="{E2FFB0C0-CE0F-44F3-8F45-0C15B0F2CED4}"/>
+                <a16:creationId xmlns:a16="http://schemas.microsoft.com/office/drawing/2014/main" id="{E2FFB0C0-CE0F-44F3-8F45-0C15B0F2CED4}"/>
               </a:ext>
             </a:extLst>
           </p:cNvPr>
@@ -3757,7 +3880,7 @@
           <p:cNvPr id="3" name="Espaço Reservado para Conteúdo 2">
             <a:extLst>
               <a:ext uri="{FF2B5EF4-FFF2-40B4-BE49-F238E27FC236}">
-                <a16:creationId xmlns:a16="http://schemas.microsoft.com/office/drawing/2014/main" xmlns="" id="{7CBE2034-0293-4F1B-A35D-C330239EDAB1}"/>
+                <a16:creationId xmlns:a16="http://schemas.microsoft.com/office/drawing/2014/main" id="{7CBE2034-0293-4F1B-A35D-C330239EDAB1}"/>
               </a:ext>
             </a:extLst>
           </p:cNvPr>
@@ -3788,7 +3911,7 @@
           <p:cNvPr id="4" name="CaixaDeTexto 3">
             <a:extLst>
               <a:ext uri="{FF2B5EF4-FFF2-40B4-BE49-F238E27FC236}">
-                <a16:creationId xmlns:a16="http://schemas.microsoft.com/office/drawing/2014/main" xmlns="" id="{563D8BF8-3563-4B51-A979-B111C5CDB0D3}"/>
+                <a16:creationId xmlns:a16="http://schemas.microsoft.com/office/drawing/2014/main" id="{563D8BF8-3563-4B51-A979-B111C5CDB0D3}"/>
               </a:ext>
             </a:extLst>
           </p:cNvPr>
@@ -3825,7 +3948,7 @@
           <p:cNvPr id="1028" name="Picture 4" descr="prosiga908">
             <a:extLst>
               <a:ext uri="{FF2B5EF4-FFF2-40B4-BE49-F238E27FC236}">
-                <a16:creationId xmlns:a16="http://schemas.microsoft.com/office/drawing/2014/main" xmlns="" id="{364BD2E8-E38B-4835-B2FE-E0F74D54AFAE}"/>
+                <a16:creationId xmlns:a16="http://schemas.microsoft.com/office/drawing/2014/main" id="{364BD2E8-E38B-4835-B2FE-E0F74D54AFAE}"/>
               </a:ext>
             </a:extLst>
           </p:cNvPr>
@@ -3872,7 +3995,7 @@
           <p:cNvPr id="1030" name="Picture 6" descr="sljpg">
             <a:extLst>
               <a:ext uri="{FF2B5EF4-FFF2-40B4-BE49-F238E27FC236}">
-                <a16:creationId xmlns:a16="http://schemas.microsoft.com/office/drawing/2014/main" xmlns="" id="{F1B309E9-EDCF-43F7-BE1F-F7F9C22FA12B}"/>
+                <a16:creationId xmlns:a16="http://schemas.microsoft.com/office/drawing/2014/main" id="{F1B309E9-EDCF-43F7-BE1F-F7F9C22FA12B}"/>
               </a:ext>
             </a:extLst>
           </p:cNvPr>
@@ -3919,7 +4042,7 @@
           <p:cNvPr id="1032" name="Picture 8" descr="sc">
             <a:extLst>
               <a:ext uri="{FF2B5EF4-FFF2-40B4-BE49-F238E27FC236}">
-                <a16:creationId xmlns:a16="http://schemas.microsoft.com/office/drawing/2014/main" xmlns="" id="{5A96E752-C90C-405E-AA84-A4B55684CDAD}"/>
+                <a16:creationId xmlns:a16="http://schemas.microsoft.com/office/drawing/2014/main" id="{5A96E752-C90C-405E-AA84-A4B55684CDAD}"/>
               </a:ext>
             </a:extLst>
           </p:cNvPr>
@@ -4008,7 +4131,7 @@
           <p:cNvPr id="2" name="Título 1">
             <a:extLst>
               <a:ext uri="{FF2B5EF4-FFF2-40B4-BE49-F238E27FC236}">
-                <a16:creationId xmlns:a16="http://schemas.microsoft.com/office/drawing/2014/main" xmlns="" id="{1DBDCC19-41A4-43AA-B20A-425069423CAD}"/>
+                <a16:creationId xmlns:a16="http://schemas.microsoft.com/office/drawing/2014/main" id="{871A7A3B-6176-421C-B412-4CF2787FAEB4}"/>
               </a:ext>
             </a:extLst>
           </p:cNvPr>
@@ -4026,7 +4149,7 @@
           <a:p>
             <a:r>
               <a:rPr lang="pt-BR" dirty="0"/>
-              <a:t>Desenvolvimento da ideia</a:t>
+              <a:t>Trabalhos Relacionados </a:t>
             </a:r>
           </a:p>
         </p:txBody>
@@ -4036,7 +4159,7 @@
           <p:cNvPr id="3" name="Espaço Reservado para Conteúdo 2">
             <a:extLst>
               <a:ext uri="{FF2B5EF4-FFF2-40B4-BE49-F238E27FC236}">
-                <a16:creationId xmlns:a16="http://schemas.microsoft.com/office/drawing/2014/main" xmlns="" id="{30C3EF9A-9A91-4C09-9FDE-6CF0EDC35FEF}"/>
+                <a16:creationId xmlns:a16="http://schemas.microsoft.com/office/drawing/2014/main" id="{6EA976E8-AE02-459D-A516-130460489351}"/>
               </a:ext>
             </a:extLst>
           </p:cNvPr>
@@ -4047,72 +4170,75 @@
             <p:ph idx="1"/>
           </p:nvPr>
         </p:nvSpPr>
-        <p:spPr/>
+        <p:spPr>
+          <a:xfrm>
+            <a:off x="628650" y="1410789"/>
+            <a:ext cx="7886700" cy="4766174"/>
+          </a:xfrm>
+        </p:spPr>
         <p:txBody>
           <a:bodyPr/>
           <a:lstStyle/>
           <a:p>
             <a:r>
               <a:rPr lang="pt-BR" dirty="0"/>
-              <a:t>Sensor de presença em cada vaga</a:t>
-            </a:r>
-          </a:p>
-          <a:p>
-            <a:r>
-              <a:rPr lang="pt-BR" dirty="0"/>
-              <a:t>Servidor para processar as informações e oferecer dados</a:t>
-            </a:r>
-          </a:p>
-          <a:p>
-            <a:r>
-              <a:rPr lang="pt-BR" dirty="0"/>
-              <a:t>Aplicativo </a:t>
-            </a:r>
-            <a:r>
-              <a:rPr lang="pt-BR" dirty="0" err="1"/>
-              <a:t>Android</a:t>
-            </a:r>
+              <a:t>Demarcação inteligente de Vagas Publicas Na instancia turística de Aguas de São Pedro.</a:t>
+            </a:r>
+          </a:p>
+          <a:p>
             <a:endParaRPr lang="pt-BR" dirty="0"/>
           </a:p>
           <a:p>
-            <a:r>
-              <a:rPr lang="pt-BR" dirty="0"/>
-              <a:t>Arduino e PIR DYP-ME003 </a:t>
-            </a:r>
-          </a:p>
-          <a:p>
             <a:endParaRPr lang="pt-BR" dirty="0"/>
           </a:p>
-          <a:p>
-            <a:endParaRPr lang="pt-BR" dirty="0"/>
-          </a:p>
-          <a:p>
-            <a:endParaRPr lang="pt-BR" dirty="0"/>
-          </a:p>
-        </p:txBody>
-      </p:sp>
+        </p:txBody>
+      </p:sp>
+      <p:pic>
+        <p:nvPicPr>
+          <p:cNvPr id="5" name="Imagem 4">
+            <a:extLst>
+              <a:ext uri="{FF2B5EF4-FFF2-40B4-BE49-F238E27FC236}">
+                <a16:creationId xmlns:a16="http://schemas.microsoft.com/office/drawing/2014/main" id="{6F2BAFCD-D93C-4B2E-9D56-0BE5F59E1F2A}"/>
+              </a:ext>
+            </a:extLst>
+          </p:cNvPr>
+          <p:cNvPicPr>
+            <a:picLocks noChangeAspect="1"/>
+          </p:cNvPicPr>
+          <p:nvPr/>
+        </p:nvPicPr>
+        <p:blipFill>
+          <a:blip r:embed="rId2">
+            <a:extLst>
+              <a:ext uri="{28A0092B-C50C-407E-A947-70E740481C1C}">
+                <a14:useLocalDpi xmlns:a14="http://schemas.microsoft.com/office/drawing/2010/main" val="0"/>
+              </a:ext>
+            </a:extLst>
+          </a:blip>
+          <a:stretch>
+            <a:fillRect/>
+          </a:stretch>
+        </p:blipFill>
+        <p:spPr>
+          <a:xfrm>
+            <a:off x="1476919" y="2338251"/>
+            <a:ext cx="6648177" cy="3333568"/>
+          </a:xfrm>
+          <a:prstGeom prst="rect">
+            <a:avLst/>
+          </a:prstGeom>
+        </p:spPr>
+      </p:pic>
     </p:spTree>
     <p:extLst>
       <p:ext uri="{BB962C8B-B14F-4D97-AF65-F5344CB8AC3E}">
-        <p14:creationId xmlns:p14="http://schemas.microsoft.com/office/powerpoint/2010/main" val="3869973666"/>
+        <p14:creationId xmlns:p14="http://schemas.microsoft.com/office/powerpoint/2010/main" val="3527420152"/>
       </p:ext>
     </p:extLst>
   </p:cSld>
   <p:clrMapOvr>
     <a:masterClrMapping/>
   </p:clrMapOvr>
-  <mc:AlternateContent xmlns:mc="http://schemas.openxmlformats.org/markup-compatibility/2006" xmlns:p14="http://schemas.microsoft.com/office/powerpoint/2010/main">
-    <mc:Choice Requires="p14">
-      <p:transition spd="med" p14:dur="700">
-        <p:fade/>
-      </p:transition>
-    </mc:Choice>
-    <mc:Fallback xmlns="">
-      <p:transition spd="med">
-        <p:fade/>
-      </p:transition>
-    </mc:Fallback>
-  </mc:AlternateContent>
 </p:sld>
 </file>
 
@@ -4135,189 +4261,46 @@
       </p:grpSpPr>
       <p:sp>
         <p:nvSpPr>
-          <p:cNvPr id="69" name="Retângulo 68">
+          <p:cNvPr id="2" name="Título 1">
             <a:extLst>
               <a:ext uri="{FF2B5EF4-FFF2-40B4-BE49-F238E27FC236}">
-                <a16:creationId xmlns:a16="http://schemas.microsoft.com/office/drawing/2014/main" xmlns="" id="{EBFC5BB0-32C0-4A1A-97DB-0C3084894AAF}"/>
+                <a16:creationId xmlns:a16="http://schemas.microsoft.com/office/drawing/2014/main" id="{1DBDCC19-41A4-43AA-B20A-425069423CAD}"/>
               </a:ext>
             </a:extLst>
           </p:cNvPr>
-          <p:cNvSpPr/>
-          <p:nvPr/>
-        </p:nvSpPr>
-        <p:spPr>
-          <a:xfrm>
-            <a:off x="7001302" y="4157821"/>
-            <a:ext cx="1885966" cy="1697069"/>
-          </a:xfrm>
-          <a:prstGeom prst="rect">
-            <a:avLst/>
-          </a:prstGeom>
-          <a:solidFill>
-            <a:schemeClr val="bg1">
-              <a:lumMod val="95000"/>
-            </a:schemeClr>
-          </a:solidFill>
-          <a:ln>
-            <a:noFill/>
-          </a:ln>
-          <a:effectLst>
-            <a:softEdge rad="88900"/>
-          </a:effectLst>
-        </p:spPr>
-        <p:style>
-          <a:lnRef idx="2">
-            <a:schemeClr val="accent1">
-              <a:shade val="50000"/>
-            </a:schemeClr>
-          </a:lnRef>
-          <a:fillRef idx="1">
-            <a:schemeClr val="accent1"/>
-          </a:fillRef>
-          <a:effectRef idx="0">
-            <a:schemeClr val="accent1"/>
-          </a:effectRef>
-          <a:fontRef idx="minor">
-            <a:schemeClr val="lt1"/>
-          </a:fontRef>
-        </p:style>
-        <p:txBody>
-          <a:bodyPr rtlCol="0" anchor="ctr"/>
-          <a:lstStyle/>
-          <a:p>
-            <a:pPr algn="ctr"/>
-            <a:endParaRPr lang="pt-BR"/>
-          </a:p>
-        </p:txBody>
-      </p:sp>
-      <p:sp>
-        <p:nvSpPr>
-          <p:cNvPr id="68" name="Retângulo 67">
+          <p:cNvSpPr>
+            <a:spLocks noGrp="1"/>
+          </p:cNvSpPr>
+          <p:nvPr>
+            <p:ph type="title"/>
+          </p:nvPr>
+        </p:nvSpPr>
+        <p:spPr/>
+        <p:txBody>
+          <a:bodyPr/>
+          <a:lstStyle/>
+          <a:p>
+            <a:r>
+              <a:rPr lang="pt-BR" dirty="0"/>
+              <a:t>Desenvolvimento da ideia</a:t>
+            </a:r>
+          </a:p>
+        </p:txBody>
+      </p:sp>
+      <p:sp>
+        <p:nvSpPr>
+          <p:cNvPr id="3" name="Espaço Reservado para Conteúdo 2">
             <a:extLst>
               <a:ext uri="{FF2B5EF4-FFF2-40B4-BE49-F238E27FC236}">
-                <a16:creationId xmlns:a16="http://schemas.microsoft.com/office/drawing/2014/main" xmlns="" id="{BB15851C-8849-4BB4-A4B8-D54E9BBFFF16}"/>
+                <a16:creationId xmlns:a16="http://schemas.microsoft.com/office/drawing/2014/main" id="{30C3EF9A-9A91-4C09-9FDE-6CF0EDC35FEF}"/>
               </a:ext>
             </a:extLst>
           </p:cNvPr>
-          <p:cNvSpPr/>
-          <p:nvPr/>
-        </p:nvSpPr>
-        <p:spPr>
-          <a:xfrm>
-            <a:off x="3782376" y="2285789"/>
-            <a:ext cx="4732974" cy="1931369"/>
-          </a:xfrm>
-          <a:prstGeom prst="rect">
-            <a:avLst/>
-          </a:prstGeom>
-          <a:solidFill>
-            <a:schemeClr val="bg1">
-              <a:lumMod val="95000"/>
-            </a:schemeClr>
-          </a:solidFill>
-          <a:ln>
-            <a:noFill/>
-          </a:ln>
-          <a:effectLst>
-            <a:softEdge rad="88900"/>
-          </a:effectLst>
-        </p:spPr>
-        <p:style>
-          <a:lnRef idx="2">
-            <a:schemeClr val="accent1">
-              <a:shade val="50000"/>
-            </a:schemeClr>
-          </a:lnRef>
-          <a:fillRef idx="1">
-            <a:schemeClr val="accent1"/>
-          </a:fillRef>
-          <a:effectRef idx="0">
-            <a:schemeClr val="accent1"/>
-          </a:effectRef>
-          <a:fontRef idx="minor">
-            <a:schemeClr val="lt1"/>
-          </a:fontRef>
-        </p:style>
-        <p:txBody>
-          <a:bodyPr rtlCol="0" anchor="ctr"/>
-          <a:lstStyle/>
-          <a:p>
-            <a:pPr algn="ctr"/>
-            <a:endParaRPr lang="pt-BR"/>
-          </a:p>
-        </p:txBody>
-      </p:sp>
-      <p:sp>
-        <p:nvSpPr>
-          <p:cNvPr id="67" name="Retângulo 66">
-            <a:extLst>
-              <a:ext uri="{FF2B5EF4-FFF2-40B4-BE49-F238E27FC236}">
-                <a16:creationId xmlns:a16="http://schemas.microsoft.com/office/drawing/2014/main" xmlns="" id="{AD081554-7BCA-47F9-B04D-057F73A85947}"/>
-              </a:ext>
-            </a:extLst>
-          </p:cNvPr>
-          <p:cNvSpPr/>
-          <p:nvPr/>
-        </p:nvSpPr>
-        <p:spPr>
-          <a:xfrm>
-            <a:off x="518615" y="1323834"/>
-            <a:ext cx="3207224" cy="4217158"/>
-          </a:xfrm>
-          <a:prstGeom prst="rect">
-            <a:avLst/>
-          </a:prstGeom>
-          <a:solidFill>
-            <a:schemeClr val="bg1">
-              <a:lumMod val="95000"/>
-            </a:schemeClr>
-          </a:solidFill>
-          <a:ln>
-            <a:noFill/>
-          </a:ln>
-          <a:effectLst>
-            <a:softEdge rad="88900"/>
-          </a:effectLst>
-        </p:spPr>
-        <p:style>
-          <a:lnRef idx="2">
-            <a:schemeClr val="accent1">
-              <a:shade val="50000"/>
-            </a:schemeClr>
-          </a:lnRef>
-          <a:fillRef idx="1">
-            <a:schemeClr val="accent1"/>
-          </a:fillRef>
-          <a:effectRef idx="0">
-            <a:schemeClr val="accent1"/>
-          </a:effectRef>
-          <a:fontRef idx="minor">
-            <a:schemeClr val="lt1"/>
-          </a:fontRef>
-        </p:style>
-        <p:txBody>
-          <a:bodyPr rtlCol="0" anchor="ctr"/>
-          <a:lstStyle/>
-          <a:p>
-            <a:pPr algn="ctr"/>
-            <a:endParaRPr lang="pt-BR"/>
-          </a:p>
-        </p:txBody>
-      </p:sp>
-      <p:sp>
-        <p:nvSpPr>
-          <p:cNvPr id="2" name="Título 1">
-            <a:extLst>
-              <a:ext uri="{FF2B5EF4-FFF2-40B4-BE49-F238E27FC236}">
-                <a16:creationId xmlns:a16="http://schemas.microsoft.com/office/drawing/2014/main" xmlns="" id="{94C2F05D-26FF-4195-A380-E4834B9609A4}"/>
-              </a:ext>
-            </a:extLst>
-          </p:cNvPr>
-          <p:cNvSpPr>
-            <a:spLocks noGrp="1"/>
-          </p:cNvSpPr>
-          <p:nvPr>
-            <p:ph type="title"/>
+          <p:cNvSpPr>
+            <a:spLocks noGrp="1"/>
+          </p:cNvSpPr>
+          <p:nvPr>
+            <p:ph idx="1"/>
           </p:nvPr>
         </p:nvSpPr>
         <p:spPr/>
@@ -4327,1503 +4310,47 @@
           <a:p>
             <a:r>
               <a:rPr lang="pt-BR" dirty="0"/>
-              <a:t>Funcionamento</a:t>
-            </a:r>
-          </a:p>
-        </p:txBody>
-      </p:sp>
-      <p:pic>
-        <p:nvPicPr>
-          <p:cNvPr id="9" name="Imagem 8">
-            <a:extLst>
-              <a:ext uri="{FF2B5EF4-FFF2-40B4-BE49-F238E27FC236}">
-                <a16:creationId xmlns:a16="http://schemas.microsoft.com/office/drawing/2014/main" xmlns="" id="{A7F933AF-4903-402C-8C66-83FB8B982337}"/>
-              </a:ext>
-            </a:extLst>
-          </p:cNvPr>
-          <p:cNvPicPr>
-            <a:picLocks noChangeAspect="1"/>
-          </p:cNvPicPr>
-          <p:nvPr/>
-        </p:nvPicPr>
-        <p:blipFill>
-          <a:blip r:embed="rId2" cstate="print">
-            <a:extLst>
-              <a:ext uri="{BEBA8EAE-BF5A-486C-A8C5-ECC9F3942E4B}">
-                <a14:imgProps xmlns:a14="http://schemas.microsoft.com/office/drawing/2010/main">
-                  <a14:imgLayer r:embed="rId3">
-                    <a14:imgEffect>
-                      <a14:backgroundRemoval t="9961" b="89844" l="391" r="98633">
-                        <a14:foregroundMark x1="25977" y1="48242" x2="1367" y2="62500"/>
-                        <a14:foregroundMark x1="1367" y1="62500" x2="24023" y2="83398"/>
-                        <a14:foregroundMark x1="24023" y1="83398" x2="84180" y2="84180"/>
-                        <a14:foregroundMark x1="84180" y1="84180" x2="98633" y2="25781"/>
-                        <a14:foregroundMark x1="98633" y1="25781" x2="69922" y2="26953"/>
-                        <a14:foregroundMark x1="51493" y1="48802" x2="50977" y2="49414"/>
-                        <a14:foregroundMark x1="69922" y1="26953" x2="58424" y2="40585"/>
-                        <a14:foregroundMark x1="50977" y1="49414" x2="24414" y2="47461"/>
-                        <a14:foregroundMark x1="74609" y1="45898" x2="86719" y2="53906"/>
-                        <a14:foregroundMark x1="4492" y1="69727" x2="391" y2="71484"/>
-                        <a14:foregroundMark x1="6836" y1="68164" x2="2148" y2="67383"/>
-                        <a14:backgroundMark x1="34766" y1="33203" x2="59766" y2="50586"/>
-                        <a14:backgroundMark x1="59766" y1="50586" x2="49023" y2="22461"/>
-                        <a14:backgroundMark x1="49023" y1="22461" x2="33984" y2="36328"/>
-                        <a14:backgroundMark x1="55469" y1="42773" x2="57031" y2="42773"/>
-                      </a14:backgroundRemoval>
-                    </a14:imgEffect>
-                  </a14:imgLayer>
-                </a14:imgProps>
-              </a:ext>
-              <a:ext uri="{28A0092B-C50C-407E-A947-70E740481C1C}">
-                <a14:useLocalDpi xmlns:a14="http://schemas.microsoft.com/office/drawing/2010/main" val="0"/>
-              </a:ext>
-            </a:extLst>
-          </a:blip>
-          <a:stretch>
-            <a:fillRect/>
-          </a:stretch>
-        </p:blipFill>
-        <p:spPr>
-          <a:xfrm>
-            <a:off x="1111007" y="1371240"/>
-            <a:ext cx="608611" cy="608611"/>
-          </a:xfrm>
-          <a:prstGeom prst="rect">
-            <a:avLst/>
-          </a:prstGeom>
-        </p:spPr>
-      </p:pic>
-      <p:pic>
-        <p:nvPicPr>
-          <p:cNvPr id="11" name="Imagem 10">
-            <a:extLst>
-              <a:ext uri="{FF2B5EF4-FFF2-40B4-BE49-F238E27FC236}">
-                <a16:creationId xmlns:a16="http://schemas.microsoft.com/office/drawing/2014/main" xmlns="" id="{491B5552-652C-4F0C-8EB5-87567019B9FC}"/>
-              </a:ext>
-            </a:extLst>
-          </p:cNvPr>
-          <p:cNvPicPr>
-            <a:picLocks noChangeAspect="1"/>
-          </p:cNvPicPr>
-          <p:nvPr/>
-        </p:nvPicPr>
-        <p:blipFill>
-          <a:blip r:embed="rId4" cstate="print">
-            <a:extLst>
-              <a:ext uri="{28A0092B-C50C-407E-A947-70E740481C1C}">
-                <a14:useLocalDpi xmlns:a14="http://schemas.microsoft.com/office/drawing/2010/main" val="0"/>
-              </a:ext>
-            </a:extLst>
-          </a:blip>
-          <a:stretch>
-            <a:fillRect/>
-          </a:stretch>
-        </p:blipFill>
-        <p:spPr>
-          <a:xfrm>
-            <a:off x="2880061" y="2997896"/>
-            <a:ext cx="598891" cy="598891"/>
-          </a:xfrm>
-          <a:prstGeom prst="rect">
-            <a:avLst/>
-          </a:prstGeom>
-        </p:spPr>
-      </p:pic>
-      <p:pic>
-        <p:nvPicPr>
-          <p:cNvPr id="12" name="Imagem 11">
-            <a:extLst>
-              <a:ext uri="{FF2B5EF4-FFF2-40B4-BE49-F238E27FC236}">
-                <a16:creationId xmlns:a16="http://schemas.microsoft.com/office/drawing/2014/main" xmlns="" id="{691EB0B0-48A2-4AF6-BD6A-7902A38CF514}"/>
-              </a:ext>
-            </a:extLst>
-          </p:cNvPr>
-          <p:cNvPicPr>
-            <a:picLocks noChangeAspect="1"/>
-          </p:cNvPicPr>
-          <p:nvPr/>
-        </p:nvPicPr>
-        <p:blipFill>
-          <a:blip r:embed="rId2" cstate="print">
-            <a:extLst>
-              <a:ext uri="{BEBA8EAE-BF5A-486C-A8C5-ECC9F3942E4B}">
-                <a14:imgProps xmlns:a14="http://schemas.microsoft.com/office/drawing/2010/main">
-                  <a14:imgLayer r:embed="rId3">
-                    <a14:imgEffect>
-                      <a14:backgroundRemoval t="9961" b="89844" l="391" r="98633">
-                        <a14:foregroundMark x1="25977" y1="48242" x2="1367" y2="62500"/>
-                        <a14:foregroundMark x1="1367" y1="62500" x2="24023" y2="83398"/>
-                        <a14:foregroundMark x1="24023" y1="83398" x2="84180" y2="84180"/>
-                        <a14:foregroundMark x1="84180" y1="84180" x2="98633" y2="25781"/>
-                        <a14:foregroundMark x1="98633" y1="25781" x2="69922" y2="26953"/>
-                        <a14:foregroundMark x1="51493" y1="48802" x2="50977" y2="49414"/>
-                        <a14:foregroundMark x1="69922" y1="26953" x2="58424" y2="40585"/>
-                        <a14:foregroundMark x1="50977" y1="49414" x2="24414" y2="47461"/>
-                        <a14:foregroundMark x1="74609" y1="45898" x2="86719" y2="53906"/>
-                        <a14:foregroundMark x1="4492" y1="69727" x2="391" y2="71484"/>
-                        <a14:foregroundMark x1="6836" y1="68164" x2="2148" y2="67383"/>
-                        <a14:backgroundMark x1="34766" y1="33203" x2="59766" y2="50586"/>
-                        <a14:backgroundMark x1="59766" y1="50586" x2="49023" y2="22461"/>
-                        <a14:backgroundMark x1="49023" y1="22461" x2="33984" y2="36328"/>
-                        <a14:backgroundMark x1="55469" y1="42773" x2="57031" y2="42773"/>
-                      </a14:backgroundRemoval>
-                    </a14:imgEffect>
-                  </a14:imgLayer>
-                </a14:imgProps>
-              </a:ext>
-              <a:ext uri="{28A0092B-C50C-407E-A947-70E740481C1C}">
-                <a14:useLocalDpi xmlns:a14="http://schemas.microsoft.com/office/drawing/2010/main" val="0"/>
-              </a:ext>
-            </a:extLst>
-          </a:blip>
-          <a:stretch>
-            <a:fillRect/>
-          </a:stretch>
-        </p:blipFill>
-        <p:spPr>
-          <a:xfrm>
-            <a:off x="1111007" y="2285789"/>
-            <a:ext cx="608611" cy="608611"/>
-          </a:xfrm>
-          <a:prstGeom prst="rect">
-            <a:avLst/>
-          </a:prstGeom>
-        </p:spPr>
-      </p:pic>
-      <p:pic>
-        <p:nvPicPr>
-          <p:cNvPr id="13" name="Imagem 12">
-            <a:extLst>
-              <a:ext uri="{FF2B5EF4-FFF2-40B4-BE49-F238E27FC236}">
-                <a16:creationId xmlns:a16="http://schemas.microsoft.com/office/drawing/2014/main" xmlns="" id="{BE22B3D0-948A-41CA-8DF4-C7346FB28D85}"/>
-              </a:ext>
-            </a:extLst>
-          </p:cNvPr>
-          <p:cNvPicPr>
-            <a:picLocks noChangeAspect="1"/>
-          </p:cNvPicPr>
-          <p:nvPr/>
-        </p:nvPicPr>
-        <p:blipFill>
-          <a:blip r:embed="rId2" cstate="print">
-            <a:extLst>
-              <a:ext uri="{BEBA8EAE-BF5A-486C-A8C5-ECC9F3942E4B}">
-                <a14:imgProps xmlns:a14="http://schemas.microsoft.com/office/drawing/2010/main">
-                  <a14:imgLayer r:embed="rId3">
-                    <a14:imgEffect>
-                      <a14:backgroundRemoval t="9961" b="89844" l="391" r="98633">
-                        <a14:foregroundMark x1="25977" y1="48242" x2="1367" y2="62500"/>
-                        <a14:foregroundMark x1="1367" y1="62500" x2="24023" y2="83398"/>
-                        <a14:foregroundMark x1="24023" y1="83398" x2="84180" y2="84180"/>
-                        <a14:foregroundMark x1="84180" y1="84180" x2="98633" y2="25781"/>
-                        <a14:foregroundMark x1="98633" y1="25781" x2="69922" y2="26953"/>
-                        <a14:foregroundMark x1="51493" y1="48802" x2="50977" y2="49414"/>
-                        <a14:foregroundMark x1="69922" y1="26953" x2="58424" y2="40585"/>
-                        <a14:foregroundMark x1="50977" y1="49414" x2="24414" y2="47461"/>
-                        <a14:foregroundMark x1="74609" y1="45898" x2="86719" y2="53906"/>
-                        <a14:foregroundMark x1="4492" y1="69727" x2="391" y2="71484"/>
-                        <a14:foregroundMark x1="6836" y1="68164" x2="2148" y2="67383"/>
-                        <a14:backgroundMark x1="34766" y1="33203" x2="59766" y2="50586"/>
-                        <a14:backgroundMark x1="59766" y1="50586" x2="49023" y2="22461"/>
-                        <a14:backgroundMark x1="49023" y1="22461" x2="33984" y2="36328"/>
-                        <a14:backgroundMark x1="55469" y1="42773" x2="57031" y2="42773"/>
-                      </a14:backgroundRemoval>
-                    </a14:imgEffect>
-                  </a14:imgLayer>
-                </a14:imgProps>
-              </a:ext>
-              <a:ext uri="{28A0092B-C50C-407E-A947-70E740481C1C}">
-                <a14:useLocalDpi xmlns:a14="http://schemas.microsoft.com/office/drawing/2010/main" val="0"/>
-              </a:ext>
-            </a:extLst>
-          </a:blip>
-          <a:stretch>
-            <a:fillRect/>
-          </a:stretch>
-        </p:blipFill>
-        <p:spPr>
-          <a:xfrm>
-            <a:off x="1111007" y="3398516"/>
-            <a:ext cx="608611" cy="608611"/>
-          </a:xfrm>
-          <a:prstGeom prst="rect">
-            <a:avLst/>
-          </a:prstGeom>
-        </p:spPr>
-      </p:pic>
-      <p:pic>
-        <p:nvPicPr>
-          <p:cNvPr id="14" name="Imagem 13">
-            <a:extLst>
-              <a:ext uri="{FF2B5EF4-FFF2-40B4-BE49-F238E27FC236}">
-                <a16:creationId xmlns:a16="http://schemas.microsoft.com/office/drawing/2014/main" xmlns="" id="{3E2A16AE-B7FC-439E-AF30-13210930E81E}"/>
-              </a:ext>
-            </a:extLst>
-          </p:cNvPr>
-          <p:cNvPicPr>
-            <a:picLocks noChangeAspect="1"/>
-          </p:cNvPicPr>
-          <p:nvPr/>
-        </p:nvPicPr>
-        <p:blipFill>
-          <a:blip r:embed="rId2" cstate="print">
-            <a:extLst>
-              <a:ext uri="{BEBA8EAE-BF5A-486C-A8C5-ECC9F3942E4B}">
-                <a14:imgProps xmlns:a14="http://schemas.microsoft.com/office/drawing/2010/main">
-                  <a14:imgLayer r:embed="rId3">
-                    <a14:imgEffect>
-                      <a14:backgroundRemoval t="9961" b="89844" l="391" r="98633">
-                        <a14:foregroundMark x1="25977" y1="48242" x2="1367" y2="62500"/>
-                        <a14:foregroundMark x1="1367" y1="62500" x2="24023" y2="83398"/>
-                        <a14:foregroundMark x1="24023" y1="83398" x2="84180" y2="84180"/>
-                        <a14:foregroundMark x1="84180" y1="84180" x2="98633" y2="25781"/>
-                        <a14:foregroundMark x1="98633" y1="25781" x2="69922" y2="26953"/>
-                        <a14:foregroundMark x1="51493" y1="48802" x2="50977" y2="49414"/>
-                        <a14:foregroundMark x1="69922" y1="26953" x2="58424" y2="40585"/>
-                        <a14:foregroundMark x1="50977" y1="49414" x2="24414" y2="47461"/>
-                        <a14:foregroundMark x1="74609" y1="45898" x2="86719" y2="53906"/>
-                        <a14:foregroundMark x1="4492" y1="69727" x2="391" y2="71484"/>
-                        <a14:foregroundMark x1="6836" y1="68164" x2="2148" y2="67383"/>
-                        <a14:backgroundMark x1="34766" y1="33203" x2="59766" y2="50586"/>
-                        <a14:backgroundMark x1="59766" y1="50586" x2="49023" y2="22461"/>
-                        <a14:backgroundMark x1="49023" y1="22461" x2="33984" y2="36328"/>
-                        <a14:backgroundMark x1="55469" y1="42773" x2="57031" y2="42773"/>
-                      </a14:backgroundRemoval>
-                    </a14:imgEffect>
-                  </a14:imgLayer>
-                </a14:imgProps>
-              </a:ext>
-              <a:ext uri="{28A0092B-C50C-407E-A947-70E740481C1C}">
-                <a14:useLocalDpi xmlns:a14="http://schemas.microsoft.com/office/drawing/2010/main" val="0"/>
-              </a:ext>
-            </a:extLst>
-          </a:blip>
-          <a:stretch>
-            <a:fillRect/>
-          </a:stretch>
-        </p:blipFill>
-        <p:spPr>
-          <a:xfrm>
-            <a:off x="1111007" y="4438020"/>
-            <a:ext cx="608611" cy="608611"/>
-          </a:xfrm>
-          <a:prstGeom prst="rect">
-            <a:avLst/>
-          </a:prstGeom>
-        </p:spPr>
-      </p:pic>
-      <p:pic>
-        <p:nvPicPr>
-          <p:cNvPr id="18" name="Imagem 17" descr="Uma imagem contendo gráficos vetoriais&#10;&#10;Descrição gerada com alta confiança">
-            <a:extLst>
-              <a:ext uri="{FF2B5EF4-FFF2-40B4-BE49-F238E27FC236}">
-                <a16:creationId xmlns:a16="http://schemas.microsoft.com/office/drawing/2014/main" xmlns="" id="{1803E050-861B-452D-A073-BB379ED3AE9C}"/>
-              </a:ext>
-            </a:extLst>
-          </p:cNvPr>
-          <p:cNvPicPr>
-            <a:picLocks noChangeAspect="1"/>
-          </p:cNvPicPr>
-          <p:nvPr/>
-        </p:nvPicPr>
-        <p:blipFill>
-          <a:blip r:embed="rId5" cstate="print">
-            <a:extLst>
-              <a:ext uri="{28A0092B-C50C-407E-A947-70E740481C1C}">
-                <a14:useLocalDpi xmlns:a14="http://schemas.microsoft.com/office/drawing/2010/main" val="0"/>
-              </a:ext>
-            </a:extLst>
-          </a:blip>
-          <a:stretch>
-            <a:fillRect/>
-          </a:stretch>
-        </p:blipFill>
-        <p:spPr>
-          <a:xfrm>
-            <a:off x="4120529" y="2890591"/>
-            <a:ext cx="840624" cy="840624"/>
-          </a:xfrm>
-          <a:prstGeom prst="rect">
-            <a:avLst/>
-          </a:prstGeom>
-        </p:spPr>
-      </p:pic>
-      <p:pic>
-        <p:nvPicPr>
-          <p:cNvPr id="20" name="Imagem 19">
-            <a:extLst>
-              <a:ext uri="{FF2B5EF4-FFF2-40B4-BE49-F238E27FC236}">
-                <a16:creationId xmlns:a16="http://schemas.microsoft.com/office/drawing/2014/main" xmlns="" id="{3450EB97-9EA4-49C8-813B-5B21F90BF2CC}"/>
-              </a:ext>
-            </a:extLst>
-          </p:cNvPr>
-          <p:cNvPicPr>
-            <a:picLocks noChangeAspect="1"/>
-          </p:cNvPicPr>
-          <p:nvPr/>
-        </p:nvPicPr>
-        <p:blipFill>
-          <a:blip r:embed="rId6" cstate="print">
-            <a:extLst>
-              <a:ext uri="{28A0092B-C50C-407E-A947-70E740481C1C}">
-                <a14:useLocalDpi xmlns:a14="http://schemas.microsoft.com/office/drawing/2010/main" val="0"/>
-              </a:ext>
-            </a:extLst>
-          </a:blip>
-          <a:stretch>
-            <a:fillRect/>
-          </a:stretch>
-        </p:blipFill>
-        <p:spPr>
-          <a:xfrm>
-            <a:off x="5756587" y="2863296"/>
-            <a:ext cx="867919" cy="867919"/>
-          </a:xfrm>
-          <a:prstGeom prst="rect">
-            <a:avLst/>
-          </a:prstGeom>
-        </p:spPr>
-      </p:pic>
-      <p:pic>
-        <p:nvPicPr>
-          <p:cNvPr id="23" name="Imagem 22" descr="Uma imagem contendo gráficos vetoriais&#10;&#10;Descrição gerada com alta confiança">
-            <a:extLst>
-              <a:ext uri="{FF2B5EF4-FFF2-40B4-BE49-F238E27FC236}">
-                <a16:creationId xmlns:a16="http://schemas.microsoft.com/office/drawing/2014/main" xmlns="" id="{5F68E8C8-EE65-416D-A554-3773142907A9}"/>
-              </a:ext>
-            </a:extLst>
-          </p:cNvPr>
-          <p:cNvPicPr>
-            <a:picLocks noChangeAspect="1"/>
-          </p:cNvPicPr>
-          <p:nvPr/>
-        </p:nvPicPr>
-        <p:blipFill>
-          <a:blip r:embed="rId5" cstate="print">
-            <a:extLst>
-              <a:ext uri="{28A0092B-C50C-407E-A947-70E740481C1C}">
-                <a14:useLocalDpi xmlns:a14="http://schemas.microsoft.com/office/drawing/2010/main" val="0"/>
-              </a:ext>
-            </a:extLst>
-          </a:blip>
-          <a:stretch>
-            <a:fillRect/>
-          </a:stretch>
-        </p:blipFill>
-        <p:spPr>
-          <a:xfrm>
-            <a:off x="7419940" y="2890591"/>
-            <a:ext cx="840624" cy="840624"/>
-          </a:xfrm>
-          <a:prstGeom prst="rect">
-            <a:avLst/>
-          </a:prstGeom>
-        </p:spPr>
-      </p:pic>
-      <p:pic>
-        <p:nvPicPr>
-          <p:cNvPr id="25" name="Imagem 24">
-            <a:extLst>
-              <a:ext uri="{FF2B5EF4-FFF2-40B4-BE49-F238E27FC236}">
-                <a16:creationId xmlns:a16="http://schemas.microsoft.com/office/drawing/2014/main" xmlns="" id="{8D4B34B1-D757-41D2-BA0B-696C00F753C4}"/>
-              </a:ext>
-            </a:extLst>
-          </p:cNvPr>
-          <p:cNvPicPr>
-            <a:picLocks noChangeAspect="1"/>
-          </p:cNvPicPr>
-          <p:nvPr/>
-        </p:nvPicPr>
-        <p:blipFill>
-          <a:blip r:embed="rId7" cstate="print">
-            <a:extLst>
-              <a:ext uri="{28A0092B-C50C-407E-A947-70E740481C1C}">
-                <a14:useLocalDpi xmlns:a14="http://schemas.microsoft.com/office/drawing/2010/main" val="0"/>
-              </a:ext>
-            </a:extLst>
-          </a:blip>
-          <a:stretch>
-            <a:fillRect/>
-          </a:stretch>
-        </p:blipFill>
-        <p:spPr>
-          <a:xfrm>
-            <a:off x="7333612" y="4584427"/>
-            <a:ext cx="1058988" cy="1058988"/>
-          </a:xfrm>
-          <a:prstGeom prst="rect">
-            <a:avLst/>
-          </a:prstGeom>
-        </p:spPr>
-      </p:pic>
-      <p:cxnSp>
-        <p:nvCxnSpPr>
-          <p:cNvPr id="29" name="Conector: Angulado 28">
-            <a:extLst>
-              <a:ext uri="{FF2B5EF4-FFF2-40B4-BE49-F238E27FC236}">
-                <a16:creationId xmlns:a16="http://schemas.microsoft.com/office/drawing/2014/main" xmlns="" id="{6FB5DBA4-DE35-457C-ABF4-5710F0FA9ADC}"/>
-              </a:ext>
-            </a:extLst>
-          </p:cNvPr>
-          <p:cNvCxnSpPr>
-            <a:cxnSpLocks/>
-            <a:stCxn id="9" idx="3"/>
-          </p:cNvCxnSpPr>
-          <p:nvPr/>
-        </p:nvCxnSpPr>
-        <p:spPr>
-          <a:xfrm>
-            <a:off x="1719618" y="1675546"/>
-            <a:ext cx="1392072" cy="1292077"/>
-          </a:xfrm>
-          <a:prstGeom prst="bentConnector3">
-            <a:avLst>
-              <a:gd name="adj1" fmla="val 100000"/>
-            </a:avLst>
-          </a:prstGeom>
-          <a:ln>
-            <a:tailEnd type="triangle"/>
-          </a:ln>
-        </p:spPr>
-        <p:style>
-          <a:lnRef idx="1">
-            <a:schemeClr val="accent1"/>
-          </a:lnRef>
-          <a:fillRef idx="0">
-            <a:schemeClr val="accent1"/>
-          </a:fillRef>
-          <a:effectRef idx="0">
-            <a:schemeClr val="accent1"/>
-          </a:effectRef>
-          <a:fontRef idx="minor">
-            <a:schemeClr val="tx1"/>
-          </a:fontRef>
-        </p:style>
-      </p:cxnSp>
-      <p:cxnSp>
-        <p:nvCxnSpPr>
-          <p:cNvPr id="31" name="Conector: Angulado 30">
-            <a:extLst>
-              <a:ext uri="{FF2B5EF4-FFF2-40B4-BE49-F238E27FC236}">
-                <a16:creationId xmlns:a16="http://schemas.microsoft.com/office/drawing/2014/main" xmlns="" id="{97FD1CDA-E8E3-4D2D-9F4E-A6F9799DA8BE}"/>
-              </a:ext>
-            </a:extLst>
-          </p:cNvPr>
-          <p:cNvCxnSpPr>
-            <a:cxnSpLocks/>
-            <a:stCxn id="12" idx="3"/>
-          </p:cNvCxnSpPr>
-          <p:nvPr/>
-        </p:nvCxnSpPr>
-        <p:spPr>
-          <a:xfrm>
-            <a:off x="1719618" y="2590095"/>
-            <a:ext cx="1160443" cy="600992"/>
-          </a:xfrm>
-          <a:prstGeom prst="bentConnector3">
-            <a:avLst/>
-          </a:prstGeom>
-          <a:ln>
-            <a:tailEnd type="triangle"/>
-          </a:ln>
-        </p:spPr>
-        <p:style>
-          <a:lnRef idx="1">
-            <a:schemeClr val="accent1"/>
-          </a:lnRef>
-          <a:fillRef idx="0">
-            <a:schemeClr val="accent1"/>
-          </a:fillRef>
-          <a:effectRef idx="0">
-            <a:schemeClr val="accent1"/>
-          </a:effectRef>
-          <a:fontRef idx="minor">
-            <a:schemeClr val="tx1"/>
-          </a:fontRef>
-        </p:style>
-      </p:cxnSp>
-      <p:cxnSp>
-        <p:nvCxnSpPr>
-          <p:cNvPr id="33" name="Conector: Angulado 32">
-            <a:extLst>
-              <a:ext uri="{FF2B5EF4-FFF2-40B4-BE49-F238E27FC236}">
-                <a16:creationId xmlns:a16="http://schemas.microsoft.com/office/drawing/2014/main" xmlns="" id="{7E1B90CA-7E2F-4D7E-84FA-AAD793D017AD}"/>
-              </a:ext>
-            </a:extLst>
-          </p:cNvPr>
-          <p:cNvCxnSpPr>
-            <a:cxnSpLocks/>
-            <a:stCxn id="13" idx="3"/>
-          </p:cNvCxnSpPr>
-          <p:nvPr/>
-        </p:nvCxnSpPr>
-        <p:spPr>
-          <a:xfrm flipV="1">
-            <a:off x="1719618" y="3428789"/>
-            <a:ext cx="1160443" cy="274033"/>
-          </a:xfrm>
-          <a:prstGeom prst="bentConnector3">
-            <a:avLst/>
-          </a:prstGeom>
-          <a:ln>
-            <a:tailEnd type="triangle"/>
-          </a:ln>
-        </p:spPr>
-        <p:style>
-          <a:lnRef idx="1">
-            <a:schemeClr val="accent1"/>
-          </a:lnRef>
-          <a:fillRef idx="0">
-            <a:schemeClr val="accent1"/>
-          </a:fillRef>
-          <a:effectRef idx="0">
-            <a:schemeClr val="accent1"/>
-          </a:effectRef>
-          <a:fontRef idx="minor">
-            <a:schemeClr val="tx1"/>
-          </a:fontRef>
-        </p:style>
-      </p:cxnSp>
-      <p:cxnSp>
-        <p:nvCxnSpPr>
-          <p:cNvPr id="35" name="Conector: Angulado 34">
-            <a:extLst>
-              <a:ext uri="{FF2B5EF4-FFF2-40B4-BE49-F238E27FC236}">
-                <a16:creationId xmlns:a16="http://schemas.microsoft.com/office/drawing/2014/main" xmlns="" id="{C714BA67-EC25-40E9-BD08-2949E22A0C86}"/>
-              </a:ext>
-            </a:extLst>
-          </p:cNvPr>
-          <p:cNvCxnSpPr>
-            <a:cxnSpLocks/>
-          </p:cNvCxnSpPr>
-          <p:nvPr/>
-        </p:nvCxnSpPr>
-        <p:spPr>
-          <a:xfrm flipV="1">
-            <a:off x="1719618" y="3657541"/>
-            <a:ext cx="1392072" cy="952348"/>
-          </a:xfrm>
-          <a:prstGeom prst="bentConnector3">
-            <a:avLst>
-              <a:gd name="adj1" fmla="val 100000"/>
-            </a:avLst>
-          </a:prstGeom>
-          <a:ln>
-            <a:tailEnd type="triangle"/>
-          </a:ln>
-        </p:spPr>
-        <p:style>
-          <a:lnRef idx="1">
-            <a:schemeClr val="accent1"/>
-          </a:lnRef>
-          <a:fillRef idx="0">
-            <a:schemeClr val="accent1"/>
-          </a:fillRef>
-          <a:effectRef idx="0">
-            <a:schemeClr val="accent1"/>
-          </a:effectRef>
-          <a:fontRef idx="minor">
-            <a:schemeClr val="tx1"/>
-          </a:fontRef>
-        </p:style>
-      </p:cxnSp>
-      <p:cxnSp>
-        <p:nvCxnSpPr>
-          <p:cNvPr id="44" name="Conector de Seta Reta 43">
-            <a:extLst>
-              <a:ext uri="{FF2B5EF4-FFF2-40B4-BE49-F238E27FC236}">
-                <a16:creationId xmlns:a16="http://schemas.microsoft.com/office/drawing/2014/main" xmlns="" id="{7B4DE83B-2C0E-4EAD-945F-9E47B26205A0}"/>
-              </a:ext>
-            </a:extLst>
-          </p:cNvPr>
-          <p:cNvCxnSpPr>
-            <a:cxnSpLocks/>
-          </p:cNvCxnSpPr>
-          <p:nvPr/>
-        </p:nvCxnSpPr>
-        <p:spPr>
-          <a:xfrm>
-            <a:off x="3478952" y="3379365"/>
-            <a:ext cx="641577" cy="13561"/>
-          </a:xfrm>
-          <a:prstGeom prst="straightConnector1">
-            <a:avLst/>
-          </a:prstGeom>
-          <a:ln>
-            <a:tailEnd type="triangle"/>
-          </a:ln>
-        </p:spPr>
-        <p:style>
-          <a:lnRef idx="1">
-            <a:schemeClr val="accent1"/>
-          </a:lnRef>
-          <a:fillRef idx="0">
-            <a:schemeClr val="accent1"/>
-          </a:fillRef>
-          <a:effectRef idx="0">
-            <a:schemeClr val="accent1"/>
-          </a:effectRef>
-          <a:fontRef idx="minor">
-            <a:schemeClr val="tx1"/>
-          </a:fontRef>
-        </p:style>
-      </p:cxnSp>
-      <p:cxnSp>
-        <p:nvCxnSpPr>
-          <p:cNvPr id="46" name="Conector de Seta Reta 45">
-            <a:extLst>
-              <a:ext uri="{FF2B5EF4-FFF2-40B4-BE49-F238E27FC236}">
-                <a16:creationId xmlns:a16="http://schemas.microsoft.com/office/drawing/2014/main" xmlns="" id="{612137DD-B838-4FFA-8A7D-B094EA1EC866}"/>
-              </a:ext>
-            </a:extLst>
-          </p:cNvPr>
-          <p:cNvCxnSpPr/>
-          <p:nvPr/>
-        </p:nvCxnSpPr>
-        <p:spPr>
-          <a:xfrm flipH="1">
-            <a:off x="3478952" y="3191087"/>
-            <a:ext cx="634398" cy="0"/>
-          </a:xfrm>
-          <a:prstGeom prst="straightConnector1">
-            <a:avLst/>
-          </a:prstGeom>
-          <a:ln>
-            <a:solidFill>
-              <a:srgbClr val="9CE169"/>
-            </a:solidFill>
-            <a:tailEnd type="triangle"/>
-          </a:ln>
-        </p:spPr>
-        <p:style>
-          <a:lnRef idx="1">
-            <a:schemeClr val="accent1"/>
-          </a:lnRef>
-          <a:fillRef idx="0">
-            <a:schemeClr val="accent1"/>
-          </a:fillRef>
-          <a:effectRef idx="0">
-            <a:schemeClr val="accent1"/>
-          </a:effectRef>
-          <a:fontRef idx="minor">
-            <a:schemeClr val="tx1"/>
-          </a:fontRef>
-        </p:style>
-      </p:cxnSp>
-      <p:cxnSp>
-        <p:nvCxnSpPr>
-          <p:cNvPr id="47" name="Conector de Seta Reta 46">
-            <a:extLst>
-              <a:ext uri="{FF2B5EF4-FFF2-40B4-BE49-F238E27FC236}">
-                <a16:creationId xmlns:a16="http://schemas.microsoft.com/office/drawing/2014/main" xmlns="" id="{5BB12B19-DC04-4757-95E6-A57413711FCA}"/>
-              </a:ext>
-            </a:extLst>
-          </p:cNvPr>
-          <p:cNvCxnSpPr>
-            <a:cxnSpLocks/>
-          </p:cNvCxnSpPr>
-          <p:nvPr/>
-        </p:nvCxnSpPr>
-        <p:spPr>
-          <a:xfrm flipH="1">
-            <a:off x="4964485" y="3190873"/>
-            <a:ext cx="685689" cy="0"/>
-          </a:xfrm>
-          <a:prstGeom prst="straightConnector1">
-            <a:avLst/>
-          </a:prstGeom>
-          <a:ln>
-            <a:solidFill>
-              <a:srgbClr val="9CE169"/>
-            </a:solidFill>
-            <a:tailEnd type="triangle"/>
-          </a:ln>
-        </p:spPr>
-        <p:style>
-          <a:lnRef idx="1">
-            <a:schemeClr val="accent1"/>
-          </a:lnRef>
-          <a:fillRef idx="0">
-            <a:schemeClr val="accent1"/>
-          </a:fillRef>
-          <a:effectRef idx="0">
-            <a:schemeClr val="accent1"/>
-          </a:effectRef>
-          <a:fontRef idx="minor">
-            <a:schemeClr val="tx1"/>
-          </a:fontRef>
-        </p:style>
-      </p:cxnSp>
-      <p:cxnSp>
-        <p:nvCxnSpPr>
-          <p:cNvPr id="49" name="Conector de Seta Reta 48">
-            <a:extLst>
-              <a:ext uri="{FF2B5EF4-FFF2-40B4-BE49-F238E27FC236}">
-                <a16:creationId xmlns:a16="http://schemas.microsoft.com/office/drawing/2014/main" xmlns="" id="{E9E2023B-3896-4FBB-AF1B-F0C072E404C9}"/>
-              </a:ext>
-            </a:extLst>
-          </p:cNvPr>
-          <p:cNvCxnSpPr>
-            <a:cxnSpLocks/>
-          </p:cNvCxnSpPr>
-          <p:nvPr/>
-        </p:nvCxnSpPr>
-        <p:spPr>
-          <a:xfrm>
-            <a:off x="4974801" y="3428789"/>
-            <a:ext cx="689021" cy="0"/>
-          </a:xfrm>
-          <a:prstGeom prst="straightConnector1">
-            <a:avLst/>
-          </a:prstGeom>
-          <a:ln>
-            <a:solidFill>
-              <a:srgbClr val="9CE169"/>
-            </a:solidFill>
-            <a:tailEnd type="triangle"/>
-          </a:ln>
-        </p:spPr>
-        <p:style>
-          <a:lnRef idx="1">
-            <a:schemeClr val="accent1"/>
-          </a:lnRef>
-          <a:fillRef idx="0">
-            <a:schemeClr val="accent1"/>
-          </a:fillRef>
-          <a:effectRef idx="0">
-            <a:schemeClr val="accent1"/>
-          </a:effectRef>
-          <a:fontRef idx="minor">
-            <a:schemeClr val="tx1"/>
-          </a:fontRef>
-        </p:style>
-      </p:cxnSp>
-      <p:cxnSp>
-        <p:nvCxnSpPr>
-          <p:cNvPr id="53" name="Conector de Seta Reta 52">
-            <a:extLst>
-              <a:ext uri="{FF2B5EF4-FFF2-40B4-BE49-F238E27FC236}">
-                <a16:creationId xmlns:a16="http://schemas.microsoft.com/office/drawing/2014/main" xmlns="" id="{B1ADFABE-3FD3-4E1F-8CCE-27AB82A428A9}"/>
-              </a:ext>
-            </a:extLst>
-          </p:cNvPr>
-          <p:cNvCxnSpPr>
-            <a:cxnSpLocks/>
-          </p:cNvCxnSpPr>
-          <p:nvPr/>
-        </p:nvCxnSpPr>
-        <p:spPr>
-          <a:xfrm flipH="1">
-            <a:off x="6668782" y="3196349"/>
-            <a:ext cx="685689" cy="0"/>
-          </a:xfrm>
-          <a:prstGeom prst="straightConnector1">
-            <a:avLst/>
-          </a:prstGeom>
-          <a:ln>
-            <a:solidFill>
-              <a:srgbClr val="9CE169"/>
-            </a:solidFill>
-            <a:tailEnd type="triangle"/>
-          </a:ln>
-        </p:spPr>
-        <p:style>
-          <a:lnRef idx="1">
-            <a:schemeClr val="accent1"/>
-          </a:lnRef>
-          <a:fillRef idx="0">
-            <a:schemeClr val="accent1"/>
-          </a:fillRef>
-          <a:effectRef idx="0">
-            <a:schemeClr val="accent1"/>
-          </a:effectRef>
-          <a:fontRef idx="minor">
-            <a:schemeClr val="tx1"/>
-          </a:fontRef>
-        </p:style>
-      </p:cxnSp>
-      <p:cxnSp>
-        <p:nvCxnSpPr>
-          <p:cNvPr id="54" name="Conector de Seta Reta 53">
-            <a:extLst>
-              <a:ext uri="{FF2B5EF4-FFF2-40B4-BE49-F238E27FC236}">
-                <a16:creationId xmlns:a16="http://schemas.microsoft.com/office/drawing/2014/main" xmlns="" id="{93E11A4D-EBCB-4B25-8336-315F504CD1CB}"/>
-              </a:ext>
-            </a:extLst>
-          </p:cNvPr>
-          <p:cNvCxnSpPr>
-            <a:cxnSpLocks/>
-          </p:cNvCxnSpPr>
-          <p:nvPr/>
-        </p:nvCxnSpPr>
-        <p:spPr>
-          <a:xfrm>
-            <a:off x="6679098" y="3434265"/>
-            <a:ext cx="689021" cy="0"/>
-          </a:xfrm>
-          <a:prstGeom prst="straightConnector1">
-            <a:avLst/>
-          </a:prstGeom>
-          <a:ln>
-            <a:solidFill>
-              <a:srgbClr val="9CE169"/>
-            </a:solidFill>
-            <a:tailEnd type="triangle"/>
-          </a:ln>
-        </p:spPr>
-        <p:style>
-          <a:lnRef idx="1">
-            <a:schemeClr val="accent1"/>
-          </a:lnRef>
-          <a:fillRef idx="0">
-            <a:schemeClr val="accent1"/>
-          </a:fillRef>
-          <a:effectRef idx="0">
-            <a:schemeClr val="accent1"/>
-          </a:effectRef>
-          <a:fontRef idx="minor">
-            <a:schemeClr val="tx1"/>
-          </a:fontRef>
-        </p:style>
-      </p:cxnSp>
-      <p:cxnSp>
-        <p:nvCxnSpPr>
-          <p:cNvPr id="55" name="Conector de Seta Reta 54">
-            <a:extLst>
-              <a:ext uri="{FF2B5EF4-FFF2-40B4-BE49-F238E27FC236}">
-                <a16:creationId xmlns:a16="http://schemas.microsoft.com/office/drawing/2014/main" xmlns="" id="{1D74C6EA-6D79-4D24-8E7E-7C460F82ADF3}"/>
-              </a:ext>
-            </a:extLst>
-          </p:cNvPr>
-          <p:cNvCxnSpPr>
-            <a:cxnSpLocks/>
-          </p:cNvCxnSpPr>
-          <p:nvPr/>
-        </p:nvCxnSpPr>
-        <p:spPr>
-          <a:xfrm flipV="1">
-            <a:off x="7779591" y="3852160"/>
-            <a:ext cx="1" cy="585860"/>
-          </a:xfrm>
-          <a:prstGeom prst="straightConnector1">
-            <a:avLst/>
-          </a:prstGeom>
-          <a:ln>
-            <a:solidFill>
-              <a:srgbClr val="9940CC"/>
-            </a:solidFill>
-            <a:tailEnd type="triangle"/>
-          </a:ln>
-        </p:spPr>
-        <p:style>
-          <a:lnRef idx="1">
-            <a:schemeClr val="accent1"/>
-          </a:lnRef>
-          <a:fillRef idx="0">
-            <a:schemeClr val="accent1"/>
-          </a:fillRef>
-          <a:effectRef idx="0">
-            <a:schemeClr val="accent1"/>
-          </a:effectRef>
-          <a:fontRef idx="minor">
-            <a:schemeClr val="tx1"/>
-          </a:fontRef>
-        </p:style>
-      </p:cxnSp>
-      <p:cxnSp>
-        <p:nvCxnSpPr>
-          <p:cNvPr id="56" name="Conector de Seta Reta 55">
-            <a:extLst>
-              <a:ext uri="{FF2B5EF4-FFF2-40B4-BE49-F238E27FC236}">
-                <a16:creationId xmlns:a16="http://schemas.microsoft.com/office/drawing/2014/main" xmlns="" id="{72778425-BC2E-4152-955C-2C2950385313}"/>
-              </a:ext>
-            </a:extLst>
-          </p:cNvPr>
-          <p:cNvCxnSpPr>
-            <a:cxnSpLocks/>
-          </p:cNvCxnSpPr>
-          <p:nvPr/>
-        </p:nvCxnSpPr>
-        <p:spPr>
-          <a:xfrm>
-            <a:off x="7949434" y="3877622"/>
-            <a:ext cx="0" cy="560398"/>
-          </a:xfrm>
-          <a:prstGeom prst="straightConnector1">
-            <a:avLst/>
-          </a:prstGeom>
-          <a:ln>
-            <a:solidFill>
-              <a:srgbClr val="9CE169"/>
-            </a:solidFill>
-            <a:tailEnd type="triangle"/>
-          </a:ln>
-        </p:spPr>
-        <p:style>
-          <a:lnRef idx="1">
-            <a:schemeClr val="accent1"/>
-          </a:lnRef>
-          <a:fillRef idx="0">
-            <a:schemeClr val="accent1"/>
-          </a:fillRef>
-          <a:effectRef idx="0">
-            <a:schemeClr val="accent1"/>
-          </a:effectRef>
-          <a:fontRef idx="minor">
-            <a:schemeClr val="tx1"/>
-          </a:fontRef>
-        </p:style>
-      </p:cxnSp>
-      <p:sp>
-        <p:nvSpPr>
-          <p:cNvPr id="70" name="CaixaDeTexto 69">
-            <a:extLst>
-              <a:ext uri="{FF2B5EF4-FFF2-40B4-BE49-F238E27FC236}">
-                <a16:creationId xmlns:a16="http://schemas.microsoft.com/office/drawing/2014/main" xmlns="" id="{1AB27E2A-5487-42F4-B538-DD085A524F21}"/>
-              </a:ext>
-            </a:extLst>
-          </p:cNvPr>
-          <p:cNvSpPr txBox="1"/>
-          <p:nvPr/>
-        </p:nvSpPr>
-        <p:spPr>
-          <a:xfrm>
-            <a:off x="627798" y="5046631"/>
-            <a:ext cx="3098041" cy="369332"/>
-          </a:xfrm>
-          <a:prstGeom prst="rect">
-            <a:avLst/>
-          </a:prstGeom>
-          <a:noFill/>
-        </p:spPr>
-        <p:txBody>
-          <a:bodyPr wrap="square" rtlCol="0">
-            <a:spAutoFit/>
-          </a:bodyPr>
-          <a:lstStyle/>
-          <a:p>
-            <a:pPr algn="ctr"/>
-            <a:r>
-              <a:rPr lang="pt-BR" dirty="0">
-                <a:solidFill>
-                  <a:schemeClr val="bg1">
-                    <a:lumMod val="50000"/>
-                  </a:schemeClr>
-                </a:solidFill>
-              </a:rPr>
-              <a:t>Estacionamento</a:t>
-            </a:r>
-          </a:p>
-        </p:txBody>
-      </p:sp>
-      <p:sp>
-        <p:nvSpPr>
-          <p:cNvPr id="71" name="CaixaDeTexto 70">
-            <a:extLst>
-              <a:ext uri="{FF2B5EF4-FFF2-40B4-BE49-F238E27FC236}">
-                <a16:creationId xmlns:a16="http://schemas.microsoft.com/office/drawing/2014/main" xmlns="" id="{0FB48185-6889-4311-B14D-D131115A9F0C}"/>
-              </a:ext>
-            </a:extLst>
-          </p:cNvPr>
-          <p:cNvSpPr txBox="1"/>
-          <p:nvPr/>
-        </p:nvSpPr>
-        <p:spPr>
-          <a:xfrm>
-            <a:off x="4540841" y="2359936"/>
-            <a:ext cx="3098041" cy="369332"/>
-          </a:xfrm>
-          <a:prstGeom prst="rect">
-            <a:avLst/>
-          </a:prstGeom>
-          <a:noFill/>
-        </p:spPr>
-        <p:txBody>
-          <a:bodyPr wrap="square" rtlCol="0">
-            <a:spAutoFit/>
-          </a:bodyPr>
-          <a:lstStyle/>
-          <a:p>
-            <a:pPr algn="ctr"/>
-            <a:r>
-              <a:rPr lang="pt-BR" dirty="0">
-                <a:solidFill>
-                  <a:schemeClr val="bg1">
-                    <a:lumMod val="50000"/>
-                  </a:schemeClr>
-                </a:solidFill>
-              </a:rPr>
-              <a:t>Servidor</a:t>
-            </a:r>
-          </a:p>
-        </p:txBody>
-      </p:sp>
-      <p:sp>
-        <p:nvSpPr>
-          <p:cNvPr id="72" name="CaixaDeTexto 71">
-            <a:extLst>
-              <a:ext uri="{FF2B5EF4-FFF2-40B4-BE49-F238E27FC236}">
-                <a16:creationId xmlns:a16="http://schemas.microsoft.com/office/drawing/2014/main" xmlns="" id="{DC1198D3-D02E-412E-ABD2-4BAEE048E467}"/>
-              </a:ext>
-            </a:extLst>
-          </p:cNvPr>
-          <p:cNvSpPr txBox="1"/>
-          <p:nvPr/>
-        </p:nvSpPr>
-        <p:spPr>
-          <a:xfrm>
-            <a:off x="6395264" y="5627047"/>
-            <a:ext cx="3098041" cy="369332"/>
-          </a:xfrm>
-          <a:prstGeom prst="rect">
-            <a:avLst/>
-          </a:prstGeom>
-          <a:noFill/>
-        </p:spPr>
-        <p:txBody>
-          <a:bodyPr wrap="square" rtlCol="0">
-            <a:spAutoFit/>
-          </a:bodyPr>
-          <a:lstStyle/>
-          <a:p>
-            <a:pPr algn="ctr"/>
-            <a:r>
-              <a:rPr lang="pt-BR" dirty="0">
-                <a:solidFill>
-                  <a:schemeClr val="bg1">
-                    <a:lumMod val="50000"/>
-                  </a:schemeClr>
-                </a:solidFill>
-              </a:rPr>
-              <a:t>Aplicativo/Web</a:t>
-            </a:r>
-          </a:p>
-        </p:txBody>
-      </p:sp>
-      <p:sp>
-        <p:nvSpPr>
-          <p:cNvPr id="73" name="CaixaDeTexto 72">
-            <a:extLst>
-              <a:ext uri="{FF2B5EF4-FFF2-40B4-BE49-F238E27FC236}">
-                <a16:creationId xmlns:a16="http://schemas.microsoft.com/office/drawing/2014/main" xmlns="" id="{5985F4F9-1D2D-4676-9572-42F6606AF5AC}"/>
-              </a:ext>
-            </a:extLst>
-          </p:cNvPr>
-          <p:cNvSpPr txBox="1"/>
-          <p:nvPr/>
-        </p:nvSpPr>
-        <p:spPr>
-          <a:xfrm>
-            <a:off x="947877" y="1825473"/>
-            <a:ext cx="934872" cy="276999"/>
-          </a:xfrm>
-          <a:prstGeom prst="rect">
-            <a:avLst/>
-          </a:prstGeom>
-          <a:noFill/>
-        </p:spPr>
-        <p:txBody>
-          <a:bodyPr wrap="square" rtlCol="0">
-            <a:spAutoFit/>
-          </a:bodyPr>
-          <a:lstStyle/>
-          <a:p>
-            <a:pPr algn="ctr"/>
-            <a:r>
-              <a:rPr lang="pt-BR" sz="1200" dirty="0">
-                <a:solidFill>
-                  <a:schemeClr val="bg1">
-                    <a:lumMod val="50000"/>
-                  </a:schemeClr>
-                </a:solidFill>
-              </a:rPr>
-              <a:t>Vaga 1</a:t>
-            </a:r>
-          </a:p>
-        </p:txBody>
-      </p:sp>
-      <p:sp>
-        <p:nvSpPr>
-          <p:cNvPr id="74" name="CaixaDeTexto 73">
-            <a:extLst>
-              <a:ext uri="{FF2B5EF4-FFF2-40B4-BE49-F238E27FC236}">
-                <a16:creationId xmlns:a16="http://schemas.microsoft.com/office/drawing/2014/main" xmlns="" id="{071F00D1-E92B-4E7F-B306-3747FDB76631}"/>
-              </a:ext>
-            </a:extLst>
-          </p:cNvPr>
-          <p:cNvSpPr txBox="1"/>
-          <p:nvPr/>
-        </p:nvSpPr>
-        <p:spPr>
-          <a:xfrm>
-            <a:off x="989217" y="2729268"/>
-            <a:ext cx="934872" cy="276999"/>
-          </a:xfrm>
-          <a:prstGeom prst="rect">
-            <a:avLst/>
-          </a:prstGeom>
-          <a:noFill/>
-        </p:spPr>
-        <p:txBody>
-          <a:bodyPr wrap="square" rtlCol="0">
-            <a:spAutoFit/>
-          </a:bodyPr>
-          <a:lstStyle/>
-          <a:p>
-            <a:pPr algn="ctr"/>
-            <a:r>
-              <a:rPr lang="pt-BR" sz="1200" dirty="0">
-                <a:solidFill>
-                  <a:schemeClr val="bg1">
-                    <a:lumMod val="50000"/>
-                  </a:schemeClr>
-                </a:solidFill>
-              </a:rPr>
-              <a:t>Vaga 2</a:t>
-            </a:r>
-          </a:p>
-        </p:txBody>
-      </p:sp>
-      <p:sp>
-        <p:nvSpPr>
-          <p:cNvPr id="75" name="CaixaDeTexto 74">
-            <a:extLst>
-              <a:ext uri="{FF2B5EF4-FFF2-40B4-BE49-F238E27FC236}">
-                <a16:creationId xmlns:a16="http://schemas.microsoft.com/office/drawing/2014/main" xmlns="" id="{44C1203A-7912-4C22-9AC1-60C6BDBCA686}"/>
-              </a:ext>
-            </a:extLst>
-          </p:cNvPr>
-          <p:cNvSpPr txBox="1"/>
-          <p:nvPr/>
-        </p:nvSpPr>
-        <p:spPr>
-          <a:xfrm>
-            <a:off x="989217" y="3850326"/>
-            <a:ext cx="934872" cy="276999"/>
-          </a:xfrm>
-          <a:prstGeom prst="rect">
-            <a:avLst/>
-          </a:prstGeom>
-          <a:noFill/>
-        </p:spPr>
-        <p:txBody>
-          <a:bodyPr wrap="square" rtlCol="0">
-            <a:spAutoFit/>
-          </a:bodyPr>
-          <a:lstStyle/>
-          <a:p>
-            <a:pPr algn="ctr"/>
-            <a:r>
-              <a:rPr lang="pt-BR" sz="1200" dirty="0">
-                <a:solidFill>
-                  <a:srgbClr val="9940CC"/>
-                </a:solidFill>
-              </a:rPr>
-              <a:t>Vaga 3</a:t>
-            </a:r>
-          </a:p>
-        </p:txBody>
-      </p:sp>
-      <p:sp>
-        <p:nvSpPr>
-          <p:cNvPr id="76" name="CaixaDeTexto 75">
-            <a:extLst>
-              <a:ext uri="{FF2B5EF4-FFF2-40B4-BE49-F238E27FC236}">
-                <a16:creationId xmlns:a16="http://schemas.microsoft.com/office/drawing/2014/main" xmlns="" id="{930B661D-33E0-42E1-A86A-A0A19FAD5CF7}"/>
-              </a:ext>
-            </a:extLst>
-          </p:cNvPr>
-          <p:cNvSpPr txBox="1"/>
-          <p:nvPr/>
-        </p:nvSpPr>
-        <p:spPr>
-          <a:xfrm>
-            <a:off x="991489" y="4862536"/>
-            <a:ext cx="934872" cy="276999"/>
-          </a:xfrm>
-          <a:prstGeom prst="rect">
-            <a:avLst/>
-          </a:prstGeom>
-          <a:noFill/>
-        </p:spPr>
-        <p:txBody>
-          <a:bodyPr wrap="square" rtlCol="0">
-            <a:spAutoFit/>
-          </a:bodyPr>
-          <a:lstStyle/>
-          <a:p>
-            <a:pPr algn="ctr"/>
-            <a:r>
-              <a:rPr lang="pt-BR" sz="1200" dirty="0">
-                <a:solidFill>
-                  <a:schemeClr val="bg1">
-                    <a:lumMod val="50000"/>
-                  </a:schemeClr>
-                </a:solidFill>
-              </a:rPr>
-              <a:t>Vaga 4</a:t>
-            </a:r>
-          </a:p>
-        </p:txBody>
-      </p:sp>
-      <p:pic>
-        <p:nvPicPr>
-          <p:cNvPr id="78" name="Imagem 77">
-            <a:extLst>
-              <a:ext uri="{FF2B5EF4-FFF2-40B4-BE49-F238E27FC236}">
-                <a16:creationId xmlns:a16="http://schemas.microsoft.com/office/drawing/2014/main" xmlns="" id="{DAB752EC-1E0A-4E45-B83F-A5080EE1615B}"/>
-              </a:ext>
-            </a:extLst>
-          </p:cNvPr>
-          <p:cNvPicPr>
-            <a:picLocks noChangeAspect="1"/>
-          </p:cNvPicPr>
-          <p:nvPr/>
-        </p:nvPicPr>
-        <p:blipFill>
-          <a:blip r:embed="rId8" cstate="print">
-            <a:duotone>
-              <a:prstClr val="black"/>
-              <a:schemeClr val="accent1">
-                <a:lumMod val="50000"/>
-                <a:tint val="45000"/>
-                <a:satMod val="400000"/>
-              </a:schemeClr>
-            </a:duotone>
-            <a:extLst>
-              <a:ext uri="{28A0092B-C50C-407E-A947-70E740481C1C}">
-                <a14:useLocalDpi xmlns:a14="http://schemas.microsoft.com/office/drawing/2010/main" val="0"/>
-              </a:ext>
-            </a:extLst>
-          </a:blip>
-          <a:stretch>
-            <a:fillRect/>
-          </a:stretch>
-        </p:blipFill>
-        <p:spPr>
-          <a:xfrm flipH="1">
-            <a:off x="749824" y="3101829"/>
-            <a:ext cx="806779" cy="806779"/>
-          </a:xfrm>
-          <a:prstGeom prst="rect">
-            <a:avLst/>
-          </a:prstGeom>
-        </p:spPr>
-      </p:pic>
-      <p:sp>
-        <p:nvSpPr>
-          <p:cNvPr id="79" name="CaixaDeTexto 78">
-            <a:extLst>
-              <a:ext uri="{FF2B5EF4-FFF2-40B4-BE49-F238E27FC236}">
-                <a16:creationId xmlns:a16="http://schemas.microsoft.com/office/drawing/2014/main" xmlns="" id="{C0EEAE68-548B-4597-B9C3-49E70F4D45D6}"/>
-              </a:ext>
-            </a:extLst>
-          </p:cNvPr>
-          <p:cNvSpPr txBox="1"/>
-          <p:nvPr/>
-        </p:nvSpPr>
-        <p:spPr>
-          <a:xfrm>
-            <a:off x="3029004" y="3690147"/>
-            <a:ext cx="1228225" cy="830997"/>
-          </a:xfrm>
-          <a:prstGeom prst="rect">
-            <a:avLst/>
-          </a:prstGeom>
-          <a:noFill/>
-        </p:spPr>
-        <p:txBody>
-          <a:bodyPr wrap="square" rtlCol="0">
-            <a:spAutoFit/>
-          </a:bodyPr>
-          <a:lstStyle/>
-          <a:p>
-            <a:pPr algn="ctr"/>
-            <a:r>
-              <a:rPr lang="pt-BR" sz="1200" dirty="0">
-                <a:solidFill>
-                  <a:schemeClr val="accent1">
-                    <a:lumMod val="75000"/>
-                  </a:schemeClr>
-                </a:solidFill>
-              </a:rPr>
-              <a:t>Informa Vagas Livres e Ocupadas na Região</a:t>
-            </a:r>
-          </a:p>
-        </p:txBody>
-      </p:sp>
-      <p:sp>
-        <p:nvSpPr>
-          <p:cNvPr id="80" name="CaixaDeTexto 79">
-            <a:extLst>
-              <a:ext uri="{FF2B5EF4-FFF2-40B4-BE49-F238E27FC236}">
-                <a16:creationId xmlns:a16="http://schemas.microsoft.com/office/drawing/2014/main" xmlns="" id="{3FAAB88B-FE87-489D-8A1D-8CAECDC8B794}"/>
-              </a:ext>
-            </a:extLst>
-          </p:cNvPr>
-          <p:cNvSpPr txBox="1"/>
-          <p:nvPr/>
-        </p:nvSpPr>
-        <p:spPr>
-          <a:xfrm>
-            <a:off x="5380145" y="3718216"/>
-            <a:ext cx="1579626" cy="830997"/>
-          </a:xfrm>
-          <a:prstGeom prst="rect">
-            <a:avLst/>
-          </a:prstGeom>
-          <a:noFill/>
-        </p:spPr>
-        <p:txBody>
-          <a:bodyPr wrap="square" rtlCol="0">
-            <a:spAutoFit/>
-          </a:bodyPr>
-          <a:lstStyle/>
-          <a:p>
-            <a:pPr algn="ctr"/>
-            <a:r>
-              <a:rPr lang="pt-BR" sz="1200" dirty="0">
-                <a:solidFill>
-                  <a:schemeClr val="accent1">
-                    <a:lumMod val="75000"/>
-                  </a:schemeClr>
-                </a:solidFill>
-              </a:rPr>
-              <a:t>Processa a informação e classifica o local, tipo e disponibilidade da vaga na região</a:t>
-            </a:r>
-          </a:p>
-        </p:txBody>
-      </p:sp>
-      <p:sp>
-        <p:nvSpPr>
-          <p:cNvPr id="81" name="CaixaDeTexto 80">
-            <a:extLst>
-              <a:ext uri="{FF2B5EF4-FFF2-40B4-BE49-F238E27FC236}">
-                <a16:creationId xmlns:a16="http://schemas.microsoft.com/office/drawing/2014/main" xmlns="" id="{D3DCCC21-4535-44B3-A443-CE9147DE0325}"/>
-              </a:ext>
-            </a:extLst>
-          </p:cNvPr>
-          <p:cNvSpPr txBox="1"/>
-          <p:nvPr/>
-        </p:nvSpPr>
-        <p:spPr>
-          <a:xfrm>
-            <a:off x="8004008" y="3310903"/>
-            <a:ext cx="1208214" cy="1200329"/>
-          </a:xfrm>
-          <a:prstGeom prst="rect">
-            <a:avLst/>
-          </a:prstGeom>
-          <a:noFill/>
-        </p:spPr>
-        <p:txBody>
-          <a:bodyPr wrap="square" rtlCol="0">
-            <a:spAutoFit/>
-          </a:bodyPr>
-          <a:lstStyle/>
-          <a:p>
-            <a:pPr algn="ctr"/>
-            <a:r>
-              <a:rPr lang="pt-BR" sz="1200" dirty="0">
-                <a:solidFill>
-                  <a:schemeClr val="accent1">
-                    <a:lumMod val="75000"/>
-                  </a:schemeClr>
-                </a:solidFill>
-              </a:rPr>
-              <a:t>Informa o resultado do processamento e recebe solicitações de reservas</a:t>
-            </a:r>
-          </a:p>
-        </p:txBody>
-      </p:sp>
-      <p:sp>
-        <p:nvSpPr>
-          <p:cNvPr id="82" name="CaixaDeTexto 81">
-            <a:extLst>
-              <a:ext uri="{FF2B5EF4-FFF2-40B4-BE49-F238E27FC236}">
-                <a16:creationId xmlns:a16="http://schemas.microsoft.com/office/drawing/2014/main" xmlns="" id="{64A47887-1341-4502-B4AC-9246A6AB33A0}"/>
-              </a:ext>
-            </a:extLst>
-          </p:cNvPr>
-          <p:cNvSpPr txBox="1"/>
-          <p:nvPr/>
-        </p:nvSpPr>
-        <p:spPr>
-          <a:xfrm>
-            <a:off x="3177195" y="2340895"/>
-            <a:ext cx="1228225" cy="646331"/>
-          </a:xfrm>
-          <a:prstGeom prst="rect">
-            <a:avLst/>
-          </a:prstGeom>
-          <a:noFill/>
-        </p:spPr>
-        <p:txBody>
-          <a:bodyPr wrap="square" rtlCol="0">
-            <a:spAutoFit/>
-          </a:bodyPr>
-          <a:lstStyle/>
-          <a:p>
-            <a:pPr algn="ctr"/>
-            <a:r>
-              <a:rPr lang="pt-BR" sz="1200" dirty="0">
-                <a:solidFill>
-                  <a:schemeClr val="accent1">
-                    <a:lumMod val="75000"/>
-                  </a:schemeClr>
-                </a:solidFill>
-              </a:rPr>
-              <a:t>Reserva/Libera Virtualmente uma Vaga</a:t>
-            </a:r>
-          </a:p>
-        </p:txBody>
-      </p:sp>
-      <p:sp>
-        <p:nvSpPr>
-          <p:cNvPr id="83" name="CaixaDeTexto 82">
-            <a:extLst>
-              <a:ext uri="{FF2B5EF4-FFF2-40B4-BE49-F238E27FC236}">
-                <a16:creationId xmlns:a16="http://schemas.microsoft.com/office/drawing/2014/main" xmlns="" id="{30A195DC-010E-4889-93F8-85BBA98E6830}"/>
-              </a:ext>
-            </a:extLst>
-          </p:cNvPr>
-          <p:cNvSpPr txBox="1"/>
-          <p:nvPr/>
-        </p:nvSpPr>
-        <p:spPr>
-          <a:xfrm>
-            <a:off x="5733866" y="5287487"/>
-            <a:ext cx="1634253" cy="646331"/>
-          </a:xfrm>
-          <a:prstGeom prst="rect">
-            <a:avLst/>
-          </a:prstGeom>
-          <a:noFill/>
-        </p:spPr>
-        <p:txBody>
-          <a:bodyPr wrap="square" rtlCol="0">
-            <a:spAutoFit/>
-          </a:bodyPr>
-          <a:lstStyle/>
-          <a:p>
-            <a:pPr algn="ctr"/>
-            <a:r>
-              <a:rPr lang="pt-BR" sz="1200" dirty="0">
-                <a:solidFill>
-                  <a:schemeClr val="accent1">
-                    <a:lumMod val="75000"/>
-                  </a:schemeClr>
-                </a:solidFill>
-              </a:rPr>
-              <a:t>Vê vagas e informações/Solicita reservas</a:t>
-            </a:r>
+              <a:t>Sensor de presença em cada vaga</a:t>
+            </a:r>
+          </a:p>
+          <a:p>
+            <a:r>
+              <a:rPr lang="pt-BR" dirty="0"/>
+              <a:t>Servidor para processar as informações e oferecer dados</a:t>
+            </a:r>
+          </a:p>
+          <a:p>
+            <a:r>
+              <a:rPr lang="pt-BR" dirty="0"/>
+              <a:t>Aplicativo </a:t>
+            </a:r>
+            <a:r>
+              <a:rPr lang="pt-BR" dirty="0" err="1"/>
+              <a:t>Android</a:t>
+            </a:r>
+            <a:endParaRPr lang="pt-BR" dirty="0"/>
+          </a:p>
+          <a:p>
+            <a:r>
+              <a:rPr lang="pt-BR" dirty="0"/>
+              <a:t>Arduino e PIR DYP-ME003 </a:t>
+            </a:r>
+          </a:p>
+          <a:p>
+            <a:endParaRPr lang="pt-BR" dirty="0"/>
+          </a:p>
+          <a:p>
+            <a:endParaRPr lang="pt-BR" dirty="0"/>
+          </a:p>
+          <a:p>
+            <a:endParaRPr lang="pt-BR" dirty="0"/>
           </a:p>
         </p:txBody>
       </p:sp>
     </p:spTree>
     <p:extLst>
       <p:ext uri="{BB962C8B-B14F-4D97-AF65-F5344CB8AC3E}">
-        <p14:creationId xmlns:p14="http://schemas.microsoft.com/office/powerpoint/2010/main" val="1228936730"/>
+        <p14:creationId xmlns:p14="http://schemas.microsoft.com/office/powerpoint/2010/main" val="3869973666"/>
       </p:ext>
     </p:extLst>
   </p:cSld>
@@ -5864,10 +4391,181 @@
       </p:grpSpPr>
       <p:sp>
         <p:nvSpPr>
+          <p:cNvPr id="69" name="Retângulo 68">
+            <a:extLst>
+              <a:ext uri="{FF2B5EF4-FFF2-40B4-BE49-F238E27FC236}">
+                <a16:creationId xmlns:a16="http://schemas.microsoft.com/office/drawing/2014/main" id="{EBFC5BB0-32C0-4A1A-97DB-0C3084894AAF}"/>
+              </a:ext>
+            </a:extLst>
+          </p:cNvPr>
+          <p:cNvSpPr/>
+          <p:nvPr/>
+        </p:nvSpPr>
+        <p:spPr>
+          <a:xfrm>
+            <a:off x="7001302" y="4157821"/>
+            <a:ext cx="1885966" cy="1697069"/>
+          </a:xfrm>
+          <a:prstGeom prst="rect">
+            <a:avLst/>
+          </a:prstGeom>
+          <a:solidFill>
+            <a:schemeClr val="bg1">
+              <a:lumMod val="95000"/>
+            </a:schemeClr>
+          </a:solidFill>
+          <a:ln>
+            <a:noFill/>
+          </a:ln>
+          <a:effectLst>
+            <a:softEdge rad="88900"/>
+          </a:effectLst>
+        </p:spPr>
+        <p:style>
+          <a:lnRef idx="2">
+            <a:schemeClr val="accent1">
+              <a:shade val="50000"/>
+            </a:schemeClr>
+          </a:lnRef>
+          <a:fillRef idx="1">
+            <a:schemeClr val="accent1"/>
+          </a:fillRef>
+          <a:effectRef idx="0">
+            <a:schemeClr val="accent1"/>
+          </a:effectRef>
+          <a:fontRef idx="minor">
+            <a:schemeClr val="lt1"/>
+          </a:fontRef>
+        </p:style>
+        <p:txBody>
+          <a:bodyPr rtlCol="0" anchor="ctr"/>
+          <a:lstStyle/>
+          <a:p>
+            <a:pPr algn="ctr"/>
+            <a:endParaRPr lang="pt-BR"/>
+          </a:p>
+        </p:txBody>
+      </p:sp>
+      <p:sp>
+        <p:nvSpPr>
+          <p:cNvPr id="68" name="Retângulo 67">
+            <a:extLst>
+              <a:ext uri="{FF2B5EF4-FFF2-40B4-BE49-F238E27FC236}">
+                <a16:creationId xmlns:a16="http://schemas.microsoft.com/office/drawing/2014/main" id="{BB15851C-8849-4BB4-A4B8-D54E9BBFFF16}"/>
+              </a:ext>
+            </a:extLst>
+          </p:cNvPr>
+          <p:cNvSpPr/>
+          <p:nvPr/>
+        </p:nvSpPr>
+        <p:spPr>
+          <a:xfrm>
+            <a:off x="3782376" y="2285789"/>
+            <a:ext cx="4732974" cy="1931369"/>
+          </a:xfrm>
+          <a:prstGeom prst="rect">
+            <a:avLst/>
+          </a:prstGeom>
+          <a:solidFill>
+            <a:schemeClr val="bg1">
+              <a:lumMod val="95000"/>
+            </a:schemeClr>
+          </a:solidFill>
+          <a:ln>
+            <a:noFill/>
+          </a:ln>
+          <a:effectLst>
+            <a:softEdge rad="88900"/>
+          </a:effectLst>
+        </p:spPr>
+        <p:style>
+          <a:lnRef idx="2">
+            <a:schemeClr val="accent1">
+              <a:shade val="50000"/>
+            </a:schemeClr>
+          </a:lnRef>
+          <a:fillRef idx="1">
+            <a:schemeClr val="accent1"/>
+          </a:fillRef>
+          <a:effectRef idx="0">
+            <a:schemeClr val="accent1"/>
+          </a:effectRef>
+          <a:fontRef idx="minor">
+            <a:schemeClr val="lt1"/>
+          </a:fontRef>
+        </p:style>
+        <p:txBody>
+          <a:bodyPr rtlCol="0" anchor="ctr"/>
+          <a:lstStyle/>
+          <a:p>
+            <a:pPr algn="ctr"/>
+            <a:endParaRPr lang="pt-BR"/>
+          </a:p>
+        </p:txBody>
+      </p:sp>
+      <p:sp>
+        <p:nvSpPr>
+          <p:cNvPr id="67" name="Retângulo 66">
+            <a:extLst>
+              <a:ext uri="{FF2B5EF4-FFF2-40B4-BE49-F238E27FC236}">
+                <a16:creationId xmlns:a16="http://schemas.microsoft.com/office/drawing/2014/main" id="{AD081554-7BCA-47F9-B04D-057F73A85947}"/>
+              </a:ext>
+            </a:extLst>
+          </p:cNvPr>
+          <p:cNvSpPr/>
+          <p:nvPr/>
+        </p:nvSpPr>
+        <p:spPr>
+          <a:xfrm>
+            <a:off x="518615" y="1323834"/>
+            <a:ext cx="3207224" cy="4217158"/>
+          </a:xfrm>
+          <a:prstGeom prst="rect">
+            <a:avLst/>
+          </a:prstGeom>
+          <a:solidFill>
+            <a:schemeClr val="bg1">
+              <a:lumMod val="95000"/>
+            </a:schemeClr>
+          </a:solidFill>
+          <a:ln>
+            <a:noFill/>
+          </a:ln>
+          <a:effectLst>
+            <a:softEdge rad="88900"/>
+          </a:effectLst>
+        </p:spPr>
+        <p:style>
+          <a:lnRef idx="2">
+            <a:schemeClr val="accent1">
+              <a:shade val="50000"/>
+            </a:schemeClr>
+          </a:lnRef>
+          <a:fillRef idx="1">
+            <a:schemeClr val="accent1"/>
+          </a:fillRef>
+          <a:effectRef idx="0">
+            <a:schemeClr val="accent1"/>
+          </a:effectRef>
+          <a:fontRef idx="minor">
+            <a:schemeClr val="lt1"/>
+          </a:fontRef>
+        </p:style>
+        <p:txBody>
+          <a:bodyPr rtlCol="0" anchor="ctr"/>
+          <a:lstStyle/>
+          <a:p>
+            <a:pPr algn="ctr"/>
+            <a:endParaRPr lang="pt-BR"/>
+          </a:p>
+        </p:txBody>
+      </p:sp>
+      <p:sp>
+        <p:nvSpPr>
           <p:cNvPr id="2" name="Título 1">
             <a:extLst>
               <a:ext uri="{FF2B5EF4-FFF2-40B4-BE49-F238E27FC236}">
-                <a16:creationId xmlns:a16="http://schemas.microsoft.com/office/drawing/2014/main" xmlns="" id="{F2B947D0-576F-47F6-8609-E9C08D781D29}"/>
+                <a16:creationId xmlns:a16="http://schemas.microsoft.com/office/drawing/2014/main" id="{94C2F05D-26FF-4195-A380-E4834B9609A4}"/>
               </a:ext>
             </a:extLst>
           </p:cNvPr>
@@ -5885,67 +4583,1503 @@
           <a:p>
             <a:r>
               <a:rPr lang="pt-BR" dirty="0"/>
-              <a:t>Considerações finais</a:t>
-            </a:r>
-          </a:p>
-        </p:txBody>
-      </p:sp>
-      <p:sp>
-        <p:nvSpPr>
-          <p:cNvPr id="3" name="Espaço Reservado para Conteúdo 2">
+              <a:t>Funcionamento</a:t>
+            </a:r>
+          </a:p>
+        </p:txBody>
+      </p:sp>
+      <p:pic>
+        <p:nvPicPr>
+          <p:cNvPr id="9" name="Imagem 8">
             <a:extLst>
               <a:ext uri="{FF2B5EF4-FFF2-40B4-BE49-F238E27FC236}">
-                <a16:creationId xmlns:a16="http://schemas.microsoft.com/office/drawing/2014/main" xmlns="" id="{AE4E2037-6713-40C8-B78D-FF89A0C6A191}"/>
+                <a16:creationId xmlns:a16="http://schemas.microsoft.com/office/drawing/2014/main" id="{A7F933AF-4903-402C-8C66-83FB8B982337}"/>
               </a:ext>
             </a:extLst>
           </p:cNvPr>
-          <p:cNvSpPr>
-            <a:spLocks noGrp="1"/>
-          </p:cNvSpPr>
-          <p:nvPr>
-            <p:ph idx="1"/>
-          </p:nvPr>
-        </p:nvSpPr>
-        <p:spPr/>
-        <p:txBody>
-          <a:bodyPr/>
-          <a:lstStyle/>
-          <a:p>
-            <a:r>
-              <a:rPr lang="pt-BR" dirty="0"/>
-              <a:t>Extensão da ideia</a:t>
-            </a:r>
-          </a:p>
-          <a:p>
-            <a:pPr lvl="1"/>
-            <a:r>
-              <a:rPr lang="pt-BR" dirty="0"/>
-              <a:t>Vagas públicas em shoppings</a:t>
-            </a:r>
-          </a:p>
-          <a:p>
-            <a:pPr lvl="1"/>
-            <a:r>
-              <a:rPr lang="pt-BR" dirty="0"/>
-              <a:t>Reservar estacionamento particular de outros usuários</a:t>
-            </a:r>
-          </a:p>
-          <a:p>
-            <a:pPr lvl="1"/>
-            <a:endParaRPr lang="pt-BR" dirty="0"/>
-          </a:p>
-          <a:p>
-            <a:pPr marL="0" indent="0">
-              <a:buNone/>
-            </a:pPr>
-            <a:endParaRPr lang="pt-BR" dirty="0"/>
+          <p:cNvPicPr>
+            <a:picLocks noChangeAspect="1"/>
+          </p:cNvPicPr>
+          <p:nvPr/>
+        </p:nvPicPr>
+        <p:blipFill>
+          <a:blip r:embed="rId2" cstate="print">
+            <a:extLst>
+              <a:ext uri="{BEBA8EAE-BF5A-486C-A8C5-ECC9F3942E4B}">
+                <a14:imgProps xmlns:a14="http://schemas.microsoft.com/office/drawing/2010/main">
+                  <a14:imgLayer r:embed="rId3">
+                    <a14:imgEffect>
+                      <a14:backgroundRemoval t="9961" b="89844" l="391" r="98633">
+                        <a14:foregroundMark x1="25977" y1="48242" x2="1367" y2="62500"/>
+                        <a14:foregroundMark x1="1367" y1="62500" x2="24023" y2="83398"/>
+                        <a14:foregroundMark x1="24023" y1="83398" x2="84180" y2="84180"/>
+                        <a14:foregroundMark x1="84180" y1="84180" x2="98633" y2="25781"/>
+                        <a14:foregroundMark x1="98633" y1="25781" x2="69922" y2="26953"/>
+                        <a14:foregroundMark x1="51493" y1="48802" x2="50977" y2="49414"/>
+                        <a14:foregroundMark x1="69922" y1="26953" x2="58424" y2="40585"/>
+                        <a14:foregroundMark x1="50977" y1="49414" x2="24414" y2="47461"/>
+                        <a14:foregroundMark x1="74609" y1="45898" x2="86719" y2="53906"/>
+                        <a14:foregroundMark x1="4492" y1="69727" x2="391" y2="71484"/>
+                        <a14:foregroundMark x1="6836" y1="68164" x2="2148" y2="67383"/>
+                        <a14:backgroundMark x1="34766" y1="33203" x2="59766" y2="50586"/>
+                        <a14:backgroundMark x1="59766" y1="50586" x2="49023" y2="22461"/>
+                        <a14:backgroundMark x1="49023" y1="22461" x2="33984" y2="36328"/>
+                        <a14:backgroundMark x1="55469" y1="42773" x2="57031" y2="42773"/>
+                      </a14:backgroundRemoval>
+                    </a14:imgEffect>
+                  </a14:imgLayer>
+                </a14:imgProps>
+              </a:ext>
+              <a:ext uri="{28A0092B-C50C-407E-A947-70E740481C1C}">
+                <a14:useLocalDpi xmlns:a14="http://schemas.microsoft.com/office/drawing/2010/main" val="0"/>
+              </a:ext>
+            </a:extLst>
+          </a:blip>
+          <a:stretch>
+            <a:fillRect/>
+          </a:stretch>
+        </p:blipFill>
+        <p:spPr>
+          <a:xfrm>
+            <a:off x="1111007" y="1371240"/>
+            <a:ext cx="608611" cy="608611"/>
+          </a:xfrm>
+          <a:prstGeom prst="rect">
+            <a:avLst/>
+          </a:prstGeom>
+        </p:spPr>
+      </p:pic>
+      <p:pic>
+        <p:nvPicPr>
+          <p:cNvPr id="11" name="Imagem 10">
+            <a:extLst>
+              <a:ext uri="{FF2B5EF4-FFF2-40B4-BE49-F238E27FC236}">
+                <a16:creationId xmlns:a16="http://schemas.microsoft.com/office/drawing/2014/main" id="{491B5552-652C-4F0C-8EB5-87567019B9FC}"/>
+              </a:ext>
+            </a:extLst>
+          </p:cNvPr>
+          <p:cNvPicPr>
+            <a:picLocks noChangeAspect="1"/>
+          </p:cNvPicPr>
+          <p:nvPr/>
+        </p:nvPicPr>
+        <p:blipFill>
+          <a:blip r:embed="rId4" cstate="print">
+            <a:extLst>
+              <a:ext uri="{28A0092B-C50C-407E-A947-70E740481C1C}">
+                <a14:useLocalDpi xmlns:a14="http://schemas.microsoft.com/office/drawing/2010/main" val="0"/>
+              </a:ext>
+            </a:extLst>
+          </a:blip>
+          <a:stretch>
+            <a:fillRect/>
+          </a:stretch>
+        </p:blipFill>
+        <p:spPr>
+          <a:xfrm>
+            <a:off x="2880061" y="2997896"/>
+            <a:ext cx="598891" cy="598891"/>
+          </a:xfrm>
+          <a:prstGeom prst="rect">
+            <a:avLst/>
+          </a:prstGeom>
+        </p:spPr>
+      </p:pic>
+      <p:pic>
+        <p:nvPicPr>
+          <p:cNvPr id="12" name="Imagem 11">
+            <a:extLst>
+              <a:ext uri="{FF2B5EF4-FFF2-40B4-BE49-F238E27FC236}">
+                <a16:creationId xmlns:a16="http://schemas.microsoft.com/office/drawing/2014/main" id="{691EB0B0-48A2-4AF6-BD6A-7902A38CF514}"/>
+              </a:ext>
+            </a:extLst>
+          </p:cNvPr>
+          <p:cNvPicPr>
+            <a:picLocks noChangeAspect="1"/>
+          </p:cNvPicPr>
+          <p:nvPr/>
+        </p:nvPicPr>
+        <p:blipFill>
+          <a:blip r:embed="rId2" cstate="print">
+            <a:extLst>
+              <a:ext uri="{BEBA8EAE-BF5A-486C-A8C5-ECC9F3942E4B}">
+                <a14:imgProps xmlns:a14="http://schemas.microsoft.com/office/drawing/2010/main">
+                  <a14:imgLayer r:embed="rId3">
+                    <a14:imgEffect>
+                      <a14:backgroundRemoval t="9961" b="89844" l="391" r="98633">
+                        <a14:foregroundMark x1="25977" y1="48242" x2="1367" y2="62500"/>
+                        <a14:foregroundMark x1="1367" y1="62500" x2="24023" y2="83398"/>
+                        <a14:foregroundMark x1="24023" y1="83398" x2="84180" y2="84180"/>
+                        <a14:foregroundMark x1="84180" y1="84180" x2="98633" y2="25781"/>
+                        <a14:foregroundMark x1="98633" y1="25781" x2="69922" y2="26953"/>
+                        <a14:foregroundMark x1="51493" y1="48802" x2="50977" y2="49414"/>
+                        <a14:foregroundMark x1="69922" y1="26953" x2="58424" y2="40585"/>
+                        <a14:foregroundMark x1="50977" y1="49414" x2="24414" y2="47461"/>
+                        <a14:foregroundMark x1="74609" y1="45898" x2="86719" y2="53906"/>
+                        <a14:foregroundMark x1="4492" y1="69727" x2="391" y2="71484"/>
+                        <a14:foregroundMark x1="6836" y1="68164" x2="2148" y2="67383"/>
+                        <a14:backgroundMark x1="34766" y1="33203" x2="59766" y2="50586"/>
+                        <a14:backgroundMark x1="59766" y1="50586" x2="49023" y2="22461"/>
+                        <a14:backgroundMark x1="49023" y1="22461" x2="33984" y2="36328"/>
+                        <a14:backgroundMark x1="55469" y1="42773" x2="57031" y2="42773"/>
+                      </a14:backgroundRemoval>
+                    </a14:imgEffect>
+                  </a14:imgLayer>
+                </a14:imgProps>
+              </a:ext>
+              <a:ext uri="{28A0092B-C50C-407E-A947-70E740481C1C}">
+                <a14:useLocalDpi xmlns:a14="http://schemas.microsoft.com/office/drawing/2010/main" val="0"/>
+              </a:ext>
+            </a:extLst>
+          </a:blip>
+          <a:stretch>
+            <a:fillRect/>
+          </a:stretch>
+        </p:blipFill>
+        <p:spPr>
+          <a:xfrm>
+            <a:off x="1111007" y="2285789"/>
+            <a:ext cx="608611" cy="608611"/>
+          </a:xfrm>
+          <a:prstGeom prst="rect">
+            <a:avLst/>
+          </a:prstGeom>
+        </p:spPr>
+      </p:pic>
+      <p:pic>
+        <p:nvPicPr>
+          <p:cNvPr id="13" name="Imagem 12">
+            <a:extLst>
+              <a:ext uri="{FF2B5EF4-FFF2-40B4-BE49-F238E27FC236}">
+                <a16:creationId xmlns:a16="http://schemas.microsoft.com/office/drawing/2014/main" id="{BE22B3D0-948A-41CA-8DF4-C7346FB28D85}"/>
+              </a:ext>
+            </a:extLst>
+          </p:cNvPr>
+          <p:cNvPicPr>
+            <a:picLocks noChangeAspect="1"/>
+          </p:cNvPicPr>
+          <p:nvPr/>
+        </p:nvPicPr>
+        <p:blipFill>
+          <a:blip r:embed="rId2" cstate="print">
+            <a:extLst>
+              <a:ext uri="{BEBA8EAE-BF5A-486C-A8C5-ECC9F3942E4B}">
+                <a14:imgProps xmlns:a14="http://schemas.microsoft.com/office/drawing/2010/main">
+                  <a14:imgLayer r:embed="rId3">
+                    <a14:imgEffect>
+                      <a14:backgroundRemoval t="9961" b="89844" l="391" r="98633">
+                        <a14:foregroundMark x1="25977" y1="48242" x2="1367" y2="62500"/>
+                        <a14:foregroundMark x1="1367" y1="62500" x2="24023" y2="83398"/>
+                        <a14:foregroundMark x1="24023" y1="83398" x2="84180" y2="84180"/>
+                        <a14:foregroundMark x1="84180" y1="84180" x2="98633" y2="25781"/>
+                        <a14:foregroundMark x1="98633" y1="25781" x2="69922" y2="26953"/>
+                        <a14:foregroundMark x1="51493" y1="48802" x2="50977" y2="49414"/>
+                        <a14:foregroundMark x1="69922" y1="26953" x2="58424" y2="40585"/>
+                        <a14:foregroundMark x1="50977" y1="49414" x2="24414" y2="47461"/>
+                        <a14:foregroundMark x1="74609" y1="45898" x2="86719" y2="53906"/>
+                        <a14:foregroundMark x1="4492" y1="69727" x2="391" y2="71484"/>
+                        <a14:foregroundMark x1="6836" y1="68164" x2="2148" y2="67383"/>
+                        <a14:backgroundMark x1="34766" y1="33203" x2="59766" y2="50586"/>
+                        <a14:backgroundMark x1="59766" y1="50586" x2="49023" y2="22461"/>
+                        <a14:backgroundMark x1="49023" y1="22461" x2="33984" y2="36328"/>
+                        <a14:backgroundMark x1="55469" y1="42773" x2="57031" y2="42773"/>
+                      </a14:backgroundRemoval>
+                    </a14:imgEffect>
+                  </a14:imgLayer>
+                </a14:imgProps>
+              </a:ext>
+              <a:ext uri="{28A0092B-C50C-407E-A947-70E740481C1C}">
+                <a14:useLocalDpi xmlns:a14="http://schemas.microsoft.com/office/drawing/2010/main" val="0"/>
+              </a:ext>
+            </a:extLst>
+          </a:blip>
+          <a:stretch>
+            <a:fillRect/>
+          </a:stretch>
+        </p:blipFill>
+        <p:spPr>
+          <a:xfrm>
+            <a:off x="1111007" y="3398516"/>
+            <a:ext cx="608611" cy="608611"/>
+          </a:xfrm>
+          <a:prstGeom prst="rect">
+            <a:avLst/>
+          </a:prstGeom>
+        </p:spPr>
+      </p:pic>
+      <p:pic>
+        <p:nvPicPr>
+          <p:cNvPr id="14" name="Imagem 13">
+            <a:extLst>
+              <a:ext uri="{FF2B5EF4-FFF2-40B4-BE49-F238E27FC236}">
+                <a16:creationId xmlns:a16="http://schemas.microsoft.com/office/drawing/2014/main" id="{3E2A16AE-B7FC-439E-AF30-13210930E81E}"/>
+              </a:ext>
+            </a:extLst>
+          </p:cNvPr>
+          <p:cNvPicPr>
+            <a:picLocks noChangeAspect="1"/>
+          </p:cNvPicPr>
+          <p:nvPr/>
+        </p:nvPicPr>
+        <p:blipFill>
+          <a:blip r:embed="rId2" cstate="print">
+            <a:extLst>
+              <a:ext uri="{BEBA8EAE-BF5A-486C-A8C5-ECC9F3942E4B}">
+                <a14:imgProps xmlns:a14="http://schemas.microsoft.com/office/drawing/2010/main">
+                  <a14:imgLayer r:embed="rId3">
+                    <a14:imgEffect>
+                      <a14:backgroundRemoval t="9961" b="89844" l="391" r="98633">
+                        <a14:foregroundMark x1="25977" y1="48242" x2="1367" y2="62500"/>
+                        <a14:foregroundMark x1="1367" y1="62500" x2="24023" y2="83398"/>
+                        <a14:foregroundMark x1="24023" y1="83398" x2="84180" y2="84180"/>
+                        <a14:foregroundMark x1="84180" y1="84180" x2="98633" y2="25781"/>
+                        <a14:foregroundMark x1="98633" y1="25781" x2="69922" y2="26953"/>
+                        <a14:foregroundMark x1="51493" y1="48802" x2="50977" y2="49414"/>
+                        <a14:foregroundMark x1="69922" y1="26953" x2="58424" y2="40585"/>
+                        <a14:foregroundMark x1="50977" y1="49414" x2="24414" y2="47461"/>
+                        <a14:foregroundMark x1="74609" y1="45898" x2="86719" y2="53906"/>
+                        <a14:foregroundMark x1="4492" y1="69727" x2="391" y2="71484"/>
+                        <a14:foregroundMark x1="6836" y1="68164" x2="2148" y2="67383"/>
+                        <a14:backgroundMark x1="34766" y1="33203" x2="59766" y2="50586"/>
+                        <a14:backgroundMark x1="59766" y1="50586" x2="49023" y2="22461"/>
+                        <a14:backgroundMark x1="49023" y1="22461" x2="33984" y2="36328"/>
+                        <a14:backgroundMark x1="55469" y1="42773" x2="57031" y2="42773"/>
+                      </a14:backgroundRemoval>
+                    </a14:imgEffect>
+                  </a14:imgLayer>
+                </a14:imgProps>
+              </a:ext>
+              <a:ext uri="{28A0092B-C50C-407E-A947-70E740481C1C}">
+                <a14:useLocalDpi xmlns:a14="http://schemas.microsoft.com/office/drawing/2010/main" val="0"/>
+              </a:ext>
+            </a:extLst>
+          </a:blip>
+          <a:stretch>
+            <a:fillRect/>
+          </a:stretch>
+        </p:blipFill>
+        <p:spPr>
+          <a:xfrm>
+            <a:off x="1111007" y="4438020"/>
+            <a:ext cx="608611" cy="608611"/>
+          </a:xfrm>
+          <a:prstGeom prst="rect">
+            <a:avLst/>
+          </a:prstGeom>
+        </p:spPr>
+      </p:pic>
+      <p:pic>
+        <p:nvPicPr>
+          <p:cNvPr id="18" name="Imagem 17" descr="Uma imagem contendo gráficos vetoriais&#10;&#10;Descrição gerada com alta confiança">
+            <a:extLst>
+              <a:ext uri="{FF2B5EF4-FFF2-40B4-BE49-F238E27FC236}">
+                <a16:creationId xmlns:a16="http://schemas.microsoft.com/office/drawing/2014/main" id="{1803E050-861B-452D-A073-BB379ED3AE9C}"/>
+              </a:ext>
+            </a:extLst>
+          </p:cNvPr>
+          <p:cNvPicPr>
+            <a:picLocks noChangeAspect="1"/>
+          </p:cNvPicPr>
+          <p:nvPr/>
+        </p:nvPicPr>
+        <p:blipFill>
+          <a:blip r:embed="rId5" cstate="print">
+            <a:extLst>
+              <a:ext uri="{28A0092B-C50C-407E-A947-70E740481C1C}">
+                <a14:useLocalDpi xmlns:a14="http://schemas.microsoft.com/office/drawing/2010/main" val="0"/>
+              </a:ext>
+            </a:extLst>
+          </a:blip>
+          <a:stretch>
+            <a:fillRect/>
+          </a:stretch>
+        </p:blipFill>
+        <p:spPr>
+          <a:xfrm>
+            <a:off x="4120529" y="2890591"/>
+            <a:ext cx="840624" cy="840624"/>
+          </a:xfrm>
+          <a:prstGeom prst="rect">
+            <a:avLst/>
+          </a:prstGeom>
+        </p:spPr>
+      </p:pic>
+      <p:pic>
+        <p:nvPicPr>
+          <p:cNvPr id="20" name="Imagem 19">
+            <a:extLst>
+              <a:ext uri="{FF2B5EF4-FFF2-40B4-BE49-F238E27FC236}">
+                <a16:creationId xmlns:a16="http://schemas.microsoft.com/office/drawing/2014/main" id="{3450EB97-9EA4-49C8-813B-5B21F90BF2CC}"/>
+              </a:ext>
+            </a:extLst>
+          </p:cNvPr>
+          <p:cNvPicPr>
+            <a:picLocks noChangeAspect="1"/>
+          </p:cNvPicPr>
+          <p:nvPr/>
+        </p:nvPicPr>
+        <p:blipFill>
+          <a:blip r:embed="rId6" cstate="print">
+            <a:extLst>
+              <a:ext uri="{28A0092B-C50C-407E-A947-70E740481C1C}">
+                <a14:useLocalDpi xmlns:a14="http://schemas.microsoft.com/office/drawing/2010/main" val="0"/>
+              </a:ext>
+            </a:extLst>
+          </a:blip>
+          <a:stretch>
+            <a:fillRect/>
+          </a:stretch>
+        </p:blipFill>
+        <p:spPr>
+          <a:xfrm>
+            <a:off x="5756587" y="2863296"/>
+            <a:ext cx="867919" cy="867919"/>
+          </a:xfrm>
+          <a:prstGeom prst="rect">
+            <a:avLst/>
+          </a:prstGeom>
+        </p:spPr>
+      </p:pic>
+      <p:pic>
+        <p:nvPicPr>
+          <p:cNvPr id="23" name="Imagem 22" descr="Uma imagem contendo gráficos vetoriais&#10;&#10;Descrição gerada com alta confiança">
+            <a:extLst>
+              <a:ext uri="{FF2B5EF4-FFF2-40B4-BE49-F238E27FC236}">
+                <a16:creationId xmlns:a16="http://schemas.microsoft.com/office/drawing/2014/main" id="{5F68E8C8-EE65-416D-A554-3773142907A9}"/>
+              </a:ext>
+            </a:extLst>
+          </p:cNvPr>
+          <p:cNvPicPr>
+            <a:picLocks noChangeAspect="1"/>
+          </p:cNvPicPr>
+          <p:nvPr/>
+        </p:nvPicPr>
+        <p:blipFill>
+          <a:blip r:embed="rId5" cstate="print">
+            <a:extLst>
+              <a:ext uri="{28A0092B-C50C-407E-A947-70E740481C1C}">
+                <a14:useLocalDpi xmlns:a14="http://schemas.microsoft.com/office/drawing/2010/main" val="0"/>
+              </a:ext>
+            </a:extLst>
+          </a:blip>
+          <a:stretch>
+            <a:fillRect/>
+          </a:stretch>
+        </p:blipFill>
+        <p:spPr>
+          <a:xfrm>
+            <a:off x="7419940" y="2890591"/>
+            <a:ext cx="840624" cy="840624"/>
+          </a:xfrm>
+          <a:prstGeom prst="rect">
+            <a:avLst/>
+          </a:prstGeom>
+        </p:spPr>
+      </p:pic>
+      <p:pic>
+        <p:nvPicPr>
+          <p:cNvPr id="25" name="Imagem 24">
+            <a:extLst>
+              <a:ext uri="{FF2B5EF4-FFF2-40B4-BE49-F238E27FC236}">
+                <a16:creationId xmlns:a16="http://schemas.microsoft.com/office/drawing/2014/main" id="{8D4B34B1-D757-41D2-BA0B-696C00F753C4}"/>
+              </a:ext>
+            </a:extLst>
+          </p:cNvPr>
+          <p:cNvPicPr>
+            <a:picLocks noChangeAspect="1"/>
+          </p:cNvPicPr>
+          <p:nvPr/>
+        </p:nvPicPr>
+        <p:blipFill>
+          <a:blip r:embed="rId7" cstate="print">
+            <a:extLst>
+              <a:ext uri="{28A0092B-C50C-407E-A947-70E740481C1C}">
+                <a14:useLocalDpi xmlns:a14="http://schemas.microsoft.com/office/drawing/2010/main" val="0"/>
+              </a:ext>
+            </a:extLst>
+          </a:blip>
+          <a:stretch>
+            <a:fillRect/>
+          </a:stretch>
+        </p:blipFill>
+        <p:spPr>
+          <a:xfrm>
+            <a:off x="7333612" y="4584427"/>
+            <a:ext cx="1058988" cy="1058988"/>
+          </a:xfrm>
+          <a:prstGeom prst="rect">
+            <a:avLst/>
+          </a:prstGeom>
+        </p:spPr>
+      </p:pic>
+      <p:cxnSp>
+        <p:nvCxnSpPr>
+          <p:cNvPr id="29" name="Conector: Angulado 28">
+            <a:extLst>
+              <a:ext uri="{FF2B5EF4-FFF2-40B4-BE49-F238E27FC236}">
+                <a16:creationId xmlns:a16="http://schemas.microsoft.com/office/drawing/2014/main" id="{6FB5DBA4-DE35-457C-ABF4-5710F0FA9ADC}"/>
+              </a:ext>
+            </a:extLst>
+          </p:cNvPr>
+          <p:cNvCxnSpPr>
+            <a:cxnSpLocks/>
+            <a:stCxn id="9" idx="3"/>
+          </p:cNvCxnSpPr>
+          <p:nvPr/>
+        </p:nvCxnSpPr>
+        <p:spPr>
+          <a:xfrm>
+            <a:off x="1719618" y="1675546"/>
+            <a:ext cx="1392072" cy="1292077"/>
+          </a:xfrm>
+          <a:prstGeom prst="bentConnector3">
+            <a:avLst>
+              <a:gd name="adj1" fmla="val 100000"/>
+            </a:avLst>
+          </a:prstGeom>
+          <a:ln>
+            <a:tailEnd type="triangle"/>
+          </a:ln>
+        </p:spPr>
+        <p:style>
+          <a:lnRef idx="1">
+            <a:schemeClr val="accent1"/>
+          </a:lnRef>
+          <a:fillRef idx="0">
+            <a:schemeClr val="accent1"/>
+          </a:fillRef>
+          <a:effectRef idx="0">
+            <a:schemeClr val="accent1"/>
+          </a:effectRef>
+          <a:fontRef idx="minor">
+            <a:schemeClr val="tx1"/>
+          </a:fontRef>
+        </p:style>
+      </p:cxnSp>
+      <p:cxnSp>
+        <p:nvCxnSpPr>
+          <p:cNvPr id="31" name="Conector: Angulado 30">
+            <a:extLst>
+              <a:ext uri="{FF2B5EF4-FFF2-40B4-BE49-F238E27FC236}">
+                <a16:creationId xmlns:a16="http://schemas.microsoft.com/office/drawing/2014/main" id="{97FD1CDA-E8E3-4D2D-9F4E-A6F9799DA8BE}"/>
+              </a:ext>
+            </a:extLst>
+          </p:cNvPr>
+          <p:cNvCxnSpPr>
+            <a:cxnSpLocks/>
+            <a:stCxn id="12" idx="3"/>
+          </p:cNvCxnSpPr>
+          <p:nvPr/>
+        </p:nvCxnSpPr>
+        <p:spPr>
+          <a:xfrm>
+            <a:off x="1719618" y="2590095"/>
+            <a:ext cx="1160443" cy="600992"/>
+          </a:xfrm>
+          <a:prstGeom prst="bentConnector3">
+            <a:avLst/>
+          </a:prstGeom>
+          <a:ln>
+            <a:tailEnd type="triangle"/>
+          </a:ln>
+        </p:spPr>
+        <p:style>
+          <a:lnRef idx="1">
+            <a:schemeClr val="accent1"/>
+          </a:lnRef>
+          <a:fillRef idx="0">
+            <a:schemeClr val="accent1"/>
+          </a:fillRef>
+          <a:effectRef idx="0">
+            <a:schemeClr val="accent1"/>
+          </a:effectRef>
+          <a:fontRef idx="minor">
+            <a:schemeClr val="tx1"/>
+          </a:fontRef>
+        </p:style>
+      </p:cxnSp>
+      <p:cxnSp>
+        <p:nvCxnSpPr>
+          <p:cNvPr id="33" name="Conector: Angulado 32">
+            <a:extLst>
+              <a:ext uri="{FF2B5EF4-FFF2-40B4-BE49-F238E27FC236}">
+                <a16:creationId xmlns:a16="http://schemas.microsoft.com/office/drawing/2014/main" id="{7E1B90CA-7E2F-4D7E-84FA-AAD793D017AD}"/>
+              </a:ext>
+            </a:extLst>
+          </p:cNvPr>
+          <p:cNvCxnSpPr>
+            <a:cxnSpLocks/>
+            <a:stCxn id="13" idx="3"/>
+          </p:cNvCxnSpPr>
+          <p:nvPr/>
+        </p:nvCxnSpPr>
+        <p:spPr>
+          <a:xfrm flipV="1">
+            <a:off x="1719618" y="3428789"/>
+            <a:ext cx="1160443" cy="274033"/>
+          </a:xfrm>
+          <a:prstGeom prst="bentConnector3">
+            <a:avLst/>
+          </a:prstGeom>
+          <a:ln>
+            <a:tailEnd type="triangle"/>
+          </a:ln>
+        </p:spPr>
+        <p:style>
+          <a:lnRef idx="1">
+            <a:schemeClr val="accent1"/>
+          </a:lnRef>
+          <a:fillRef idx="0">
+            <a:schemeClr val="accent1"/>
+          </a:fillRef>
+          <a:effectRef idx="0">
+            <a:schemeClr val="accent1"/>
+          </a:effectRef>
+          <a:fontRef idx="minor">
+            <a:schemeClr val="tx1"/>
+          </a:fontRef>
+        </p:style>
+      </p:cxnSp>
+      <p:cxnSp>
+        <p:nvCxnSpPr>
+          <p:cNvPr id="35" name="Conector: Angulado 34">
+            <a:extLst>
+              <a:ext uri="{FF2B5EF4-FFF2-40B4-BE49-F238E27FC236}">
+                <a16:creationId xmlns:a16="http://schemas.microsoft.com/office/drawing/2014/main" id="{C714BA67-EC25-40E9-BD08-2949E22A0C86}"/>
+              </a:ext>
+            </a:extLst>
+          </p:cNvPr>
+          <p:cNvCxnSpPr>
+            <a:cxnSpLocks/>
+          </p:cNvCxnSpPr>
+          <p:nvPr/>
+        </p:nvCxnSpPr>
+        <p:spPr>
+          <a:xfrm flipV="1">
+            <a:off x="1719618" y="3657541"/>
+            <a:ext cx="1392072" cy="952348"/>
+          </a:xfrm>
+          <a:prstGeom prst="bentConnector3">
+            <a:avLst>
+              <a:gd name="adj1" fmla="val 100000"/>
+            </a:avLst>
+          </a:prstGeom>
+          <a:ln>
+            <a:tailEnd type="triangle"/>
+          </a:ln>
+        </p:spPr>
+        <p:style>
+          <a:lnRef idx="1">
+            <a:schemeClr val="accent1"/>
+          </a:lnRef>
+          <a:fillRef idx="0">
+            <a:schemeClr val="accent1"/>
+          </a:fillRef>
+          <a:effectRef idx="0">
+            <a:schemeClr val="accent1"/>
+          </a:effectRef>
+          <a:fontRef idx="minor">
+            <a:schemeClr val="tx1"/>
+          </a:fontRef>
+        </p:style>
+      </p:cxnSp>
+      <p:cxnSp>
+        <p:nvCxnSpPr>
+          <p:cNvPr id="44" name="Conector de Seta Reta 43">
+            <a:extLst>
+              <a:ext uri="{FF2B5EF4-FFF2-40B4-BE49-F238E27FC236}">
+                <a16:creationId xmlns:a16="http://schemas.microsoft.com/office/drawing/2014/main" id="{7B4DE83B-2C0E-4EAD-945F-9E47B26205A0}"/>
+              </a:ext>
+            </a:extLst>
+          </p:cNvPr>
+          <p:cNvCxnSpPr>
+            <a:cxnSpLocks/>
+          </p:cNvCxnSpPr>
+          <p:nvPr/>
+        </p:nvCxnSpPr>
+        <p:spPr>
+          <a:xfrm>
+            <a:off x="3478952" y="3379365"/>
+            <a:ext cx="641577" cy="13561"/>
+          </a:xfrm>
+          <a:prstGeom prst="straightConnector1">
+            <a:avLst/>
+          </a:prstGeom>
+          <a:ln>
+            <a:tailEnd type="triangle"/>
+          </a:ln>
+        </p:spPr>
+        <p:style>
+          <a:lnRef idx="1">
+            <a:schemeClr val="accent1"/>
+          </a:lnRef>
+          <a:fillRef idx="0">
+            <a:schemeClr val="accent1"/>
+          </a:fillRef>
+          <a:effectRef idx="0">
+            <a:schemeClr val="accent1"/>
+          </a:effectRef>
+          <a:fontRef idx="minor">
+            <a:schemeClr val="tx1"/>
+          </a:fontRef>
+        </p:style>
+      </p:cxnSp>
+      <p:cxnSp>
+        <p:nvCxnSpPr>
+          <p:cNvPr id="46" name="Conector de Seta Reta 45">
+            <a:extLst>
+              <a:ext uri="{FF2B5EF4-FFF2-40B4-BE49-F238E27FC236}">
+                <a16:creationId xmlns:a16="http://schemas.microsoft.com/office/drawing/2014/main" id="{612137DD-B838-4FFA-8A7D-B094EA1EC866}"/>
+              </a:ext>
+            </a:extLst>
+          </p:cNvPr>
+          <p:cNvCxnSpPr/>
+          <p:nvPr/>
+        </p:nvCxnSpPr>
+        <p:spPr>
+          <a:xfrm flipH="1">
+            <a:off x="3478952" y="3191087"/>
+            <a:ext cx="634398" cy="0"/>
+          </a:xfrm>
+          <a:prstGeom prst="straightConnector1">
+            <a:avLst/>
+          </a:prstGeom>
+          <a:ln>
+            <a:solidFill>
+              <a:srgbClr val="9CE169"/>
+            </a:solidFill>
+            <a:tailEnd type="triangle"/>
+          </a:ln>
+        </p:spPr>
+        <p:style>
+          <a:lnRef idx="1">
+            <a:schemeClr val="accent1"/>
+          </a:lnRef>
+          <a:fillRef idx="0">
+            <a:schemeClr val="accent1"/>
+          </a:fillRef>
+          <a:effectRef idx="0">
+            <a:schemeClr val="accent1"/>
+          </a:effectRef>
+          <a:fontRef idx="minor">
+            <a:schemeClr val="tx1"/>
+          </a:fontRef>
+        </p:style>
+      </p:cxnSp>
+      <p:cxnSp>
+        <p:nvCxnSpPr>
+          <p:cNvPr id="47" name="Conector de Seta Reta 46">
+            <a:extLst>
+              <a:ext uri="{FF2B5EF4-FFF2-40B4-BE49-F238E27FC236}">
+                <a16:creationId xmlns:a16="http://schemas.microsoft.com/office/drawing/2014/main" id="{5BB12B19-DC04-4757-95E6-A57413711FCA}"/>
+              </a:ext>
+            </a:extLst>
+          </p:cNvPr>
+          <p:cNvCxnSpPr>
+            <a:cxnSpLocks/>
+          </p:cNvCxnSpPr>
+          <p:nvPr/>
+        </p:nvCxnSpPr>
+        <p:spPr>
+          <a:xfrm flipH="1">
+            <a:off x="4964485" y="3190873"/>
+            <a:ext cx="685689" cy="0"/>
+          </a:xfrm>
+          <a:prstGeom prst="straightConnector1">
+            <a:avLst/>
+          </a:prstGeom>
+          <a:ln>
+            <a:solidFill>
+              <a:srgbClr val="9CE169"/>
+            </a:solidFill>
+            <a:tailEnd type="triangle"/>
+          </a:ln>
+        </p:spPr>
+        <p:style>
+          <a:lnRef idx="1">
+            <a:schemeClr val="accent1"/>
+          </a:lnRef>
+          <a:fillRef idx="0">
+            <a:schemeClr val="accent1"/>
+          </a:fillRef>
+          <a:effectRef idx="0">
+            <a:schemeClr val="accent1"/>
+          </a:effectRef>
+          <a:fontRef idx="minor">
+            <a:schemeClr val="tx1"/>
+          </a:fontRef>
+        </p:style>
+      </p:cxnSp>
+      <p:cxnSp>
+        <p:nvCxnSpPr>
+          <p:cNvPr id="49" name="Conector de Seta Reta 48">
+            <a:extLst>
+              <a:ext uri="{FF2B5EF4-FFF2-40B4-BE49-F238E27FC236}">
+                <a16:creationId xmlns:a16="http://schemas.microsoft.com/office/drawing/2014/main" id="{E9E2023B-3896-4FBB-AF1B-F0C072E404C9}"/>
+              </a:ext>
+            </a:extLst>
+          </p:cNvPr>
+          <p:cNvCxnSpPr>
+            <a:cxnSpLocks/>
+          </p:cNvCxnSpPr>
+          <p:nvPr/>
+        </p:nvCxnSpPr>
+        <p:spPr>
+          <a:xfrm>
+            <a:off x="4974801" y="3428789"/>
+            <a:ext cx="689021" cy="0"/>
+          </a:xfrm>
+          <a:prstGeom prst="straightConnector1">
+            <a:avLst/>
+          </a:prstGeom>
+          <a:ln>
+            <a:solidFill>
+              <a:srgbClr val="9CE169"/>
+            </a:solidFill>
+            <a:tailEnd type="triangle"/>
+          </a:ln>
+        </p:spPr>
+        <p:style>
+          <a:lnRef idx="1">
+            <a:schemeClr val="accent1"/>
+          </a:lnRef>
+          <a:fillRef idx="0">
+            <a:schemeClr val="accent1"/>
+          </a:fillRef>
+          <a:effectRef idx="0">
+            <a:schemeClr val="accent1"/>
+          </a:effectRef>
+          <a:fontRef idx="minor">
+            <a:schemeClr val="tx1"/>
+          </a:fontRef>
+        </p:style>
+      </p:cxnSp>
+      <p:cxnSp>
+        <p:nvCxnSpPr>
+          <p:cNvPr id="53" name="Conector de Seta Reta 52">
+            <a:extLst>
+              <a:ext uri="{FF2B5EF4-FFF2-40B4-BE49-F238E27FC236}">
+                <a16:creationId xmlns:a16="http://schemas.microsoft.com/office/drawing/2014/main" id="{B1ADFABE-3FD3-4E1F-8CCE-27AB82A428A9}"/>
+              </a:ext>
+            </a:extLst>
+          </p:cNvPr>
+          <p:cNvCxnSpPr>
+            <a:cxnSpLocks/>
+          </p:cNvCxnSpPr>
+          <p:nvPr/>
+        </p:nvCxnSpPr>
+        <p:spPr>
+          <a:xfrm flipH="1">
+            <a:off x="6668782" y="3196349"/>
+            <a:ext cx="685689" cy="0"/>
+          </a:xfrm>
+          <a:prstGeom prst="straightConnector1">
+            <a:avLst/>
+          </a:prstGeom>
+          <a:ln>
+            <a:solidFill>
+              <a:srgbClr val="9CE169"/>
+            </a:solidFill>
+            <a:tailEnd type="triangle"/>
+          </a:ln>
+        </p:spPr>
+        <p:style>
+          <a:lnRef idx="1">
+            <a:schemeClr val="accent1"/>
+          </a:lnRef>
+          <a:fillRef idx="0">
+            <a:schemeClr val="accent1"/>
+          </a:fillRef>
+          <a:effectRef idx="0">
+            <a:schemeClr val="accent1"/>
+          </a:effectRef>
+          <a:fontRef idx="minor">
+            <a:schemeClr val="tx1"/>
+          </a:fontRef>
+        </p:style>
+      </p:cxnSp>
+      <p:cxnSp>
+        <p:nvCxnSpPr>
+          <p:cNvPr id="54" name="Conector de Seta Reta 53">
+            <a:extLst>
+              <a:ext uri="{FF2B5EF4-FFF2-40B4-BE49-F238E27FC236}">
+                <a16:creationId xmlns:a16="http://schemas.microsoft.com/office/drawing/2014/main" id="{93E11A4D-EBCB-4B25-8336-315F504CD1CB}"/>
+              </a:ext>
+            </a:extLst>
+          </p:cNvPr>
+          <p:cNvCxnSpPr>
+            <a:cxnSpLocks/>
+          </p:cNvCxnSpPr>
+          <p:nvPr/>
+        </p:nvCxnSpPr>
+        <p:spPr>
+          <a:xfrm>
+            <a:off x="6679098" y="3434265"/>
+            <a:ext cx="689021" cy="0"/>
+          </a:xfrm>
+          <a:prstGeom prst="straightConnector1">
+            <a:avLst/>
+          </a:prstGeom>
+          <a:ln>
+            <a:solidFill>
+              <a:srgbClr val="9CE169"/>
+            </a:solidFill>
+            <a:tailEnd type="triangle"/>
+          </a:ln>
+        </p:spPr>
+        <p:style>
+          <a:lnRef idx="1">
+            <a:schemeClr val="accent1"/>
+          </a:lnRef>
+          <a:fillRef idx="0">
+            <a:schemeClr val="accent1"/>
+          </a:fillRef>
+          <a:effectRef idx="0">
+            <a:schemeClr val="accent1"/>
+          </a:effectRef>
+          <a:fontRef idx="minor">
+            <a:schemeClr val="tx1"/>
+          </a:fontRef>
+        </p:style>
+      </p:cxnSp>
+      <p:cxnSp>
+        <p:nvCxnSpPr>
+          <p:cNvPr id="55" name="Conector de Seta Reta 54">
+            <a:extLst>
+              <a:ext uri="{FF2B5EF4-FFF2-40B4-BE49-F238E27FC236}">
+                <a16:creationId xmlns:a16="http://schemas.microsoft.com/office/drawing/2014/main" id="{1D74C6EA-6D79-4D24-8E7E-7C460F82ADF3}"/>
+              </a:ext>
+            </a:extLst>
+          </p:cNvPr>
+          <p:cNvCxnSpPr>
+            <a:cxnSpLocks/>
+          </p:cNvCxnSpPr>
+          <p:nvPr/>
+        </p:nvCxnSpPr>
+        <p:spPr>
+          <a:xfrm flipV="1">
+            <a:off x="7779591" y="3852160"/>
+            <a:ext cx="1" cy="585860"/>
+          </a:xfrm>
+          <a:prstGeom prst="straightConnector1">
+            <a:avLst/>
+          </a:prstGeom>
+          <a:ln>
+            <a:solidFill>
+              <a:srgbClr val="9940CC"/>
+            </a:solidFill>
+            <a:tailEnd type="triangle"/>
+          </a:ln>
+        </p:spPr>
+        <p:style>
+          <a:lnRef idx="1">
+            <a:schemeClr val="accent1"/>
+          </a:lnRef>
+          <a:fillRef idx="0">
+            <a:schemeClr val="accent1"/>
+          </a:fillRef>
+          <a:effectRef idx="0">
+            <a:schemeClr val="accent1"/>
+          </a:effectRef>
+          <a:fontRef idx="minor">
+            <a:schemeClr val="tx1"/>
+          </a:fontRef>
+        </p:style>
+      </p:cxnSp>
+      <p:cxnSp>
+        <p:nvCxnSpPr>
+          <p:cNvPr id="56" name="Conector de Seta Reta 55">
+            <a:extLst>
+              <a:ext uri="{FF2B5EF4-FFF2-40B4-BE49-F238E27FC236}">
+                <a16:creationId xmlns:a16="http://schemas.microsoft.com/office/drawing/2014/main" id="{72778425-BC2E-4152-955C-2C2950385313}"/>
+              </a:ext>
+            </a:extLst>
+          </p:cNvPr>
+          <p:cNvCxnSpPr>
+            <a:cxnSpLocks/>
+          </p:cNvCxnSpPr>
+          <p:nvPr/>
+        </p:nvCxnSpPr>
+        <p:spPr>
+          <a:xfrm>
+            <a:off x="7949434" y="3877622"/>
+            <a:ext cx="0" cy="560398"/>
+          </a:xfrm>
+          <a:prstGeom prst="straightConnector1">
+            <a:avLst/>
+          </a:prstGeom>
+          <a:ln>
+            <a:solidFill>
+              <a:srgbClr val="9CE169"/>
+            </a:solidFill>
+            <a:tailEnd type="triangle"/>
+          </a:ln>
+        </p:spPr>
+        <p:style>
+          <a:lnRef idx="1">
+            <a:schemeClr val="accent1"/>
+          </a:lnRef>
+          <a:fillRef idx="0">
+            <a:schemeClr val="accent1"/>
+          </a:fillRef>
+          <a:effectRef idx="0">
+            <a:schemeClr val="accent1"/>
+          </a:effectRef>
+          <a:fontRef idx="minor">
+            <a:schemeClr val="tx1"/>
+          </a:fontRef>
+        </p:style>
+      </p:cxnSp>
+      <p:sp>
+        <p:nvSpPr>
+          <p:cNvPr id="70" name="CaixaDeTexto 69">
+            <a:extLst>
+              <a:ext uri="{FF2B5EF4-FFF2-40B4-BE49-F238E27FC236}">
+                <a16:creationId xmlns:a16="http://schemas.microsoft.com/office/drawing/2014/main" id="{1AB27E2A-5487-42F4-B538-DD085A524F21}"/>
+              </a:ext>
+            </a:extLst>
+          </p:cNvPr>
+          <p:cNvSpPr txBox="1"/>
+          <p:nvPr/>
+        </p:nvSpPr>
+        <p:spPr>
+          <a:xfrm>
+            <a:off x="627798" y="5046631"/>
+            <a:ext cx="3098041" cy="369332"/>
+          </a:xfrm>
+          <a:prstGeom prst="rect">
+            <a:avLst/>
+          </a:prstGeom>
+          <a:noFill/>
+        </p:spPr>
+        <p:txBody>
+          <a:bodyPr wrap="square" rtlCol="0">
+            <a:spAutoFit/>
+          </a:bodyPr>
+          <a:lstStyle/>
+          <a:p>
+            <a:pPr algn="ctr"/>
+            <a:r>
+              <a:rPr lang="pt-BR" dirty="0">
+                <a:solidFill>
+                  <a:schemeClr val="bg1">
+                    <a:lumMod val="50000"/>
+                  </a:schemeClr>
+                </a:solidFill>
+              </a:rPr>
+              <a:t>Estacionamento</a:t>
+            </a:r>
+          </a:p>
+        </p:txBody>
+      </p:sp>
+      <p:sp>
+        <p:nvSpPr>
+          <p:cNvPr id="71" name="CaixaDeTexto 70">
+            <a:extLst>
+              <a:ext uri="{FF2B5EF4-FFF2-40B4-BE49-F238E27FC236}">
+                <a16:creationId xmlns:a16="http://schemas.microsoft.com/office/drawing/2014/main" id="{0FB48185-6889-4311-B14D-D131115A9F0C}"/>
+              </a:ext>
+            </a:extLst>
+          </p:cNvPr>
+          <p:cNvSpPr txBox="1"/>
+          <p:nvPr/>
+        </p:nvSpPr>
+        <p:spPr>
+          <a:xfrm>
+            <a:off x="4540841" y="2359936"/>
+            <a:ext cx="3098041" cy="369332"/>
+          </a:xfrm>
+          <a:prstGeom prst="rect">
+            <a:avLst/>
+          </a:prstGeom>
+          <a:noFill/>
+        </p:spPr>
+        <p:txBody>
+          <a:bodyPr wrap="square" rtlCol="0">
+            <a:spAutoFit/>
+          </a:bodyPr>
+          <a:lstStyle/>
+          <a:p>
+            <a:pPr algn="ctr"/>
+            <a:r>
+              <a:rPr lang="pt-BR" dirty="0">
+                <a:solidFill>
+                  <a:schemeClr val="bg1">
+                    <a:lumMod val="50000"/>
+                  </a:schemeClr>
+                </a:solidFill>
+              </a:rPr>
+              <a:t>Servidor</a:t>
+            </a:r>
+          </a:p>
+        </p:txBody>
+      </p:sp>
+      <p:sp>
+        <p:nvSpPr>
+          <p:cNvPr id="72" name="CaixaDeTexto 71">
+            <a:extLst>
+              <a:ext uri="{FF2B5EF4-FFF2-40B4-BE49-F238E27FC236}">
+                <a16:creationId xmlns:a16="http://schemas.microsoft.com/office/drawing/2014/main" id="{DC1198D3-D02E-412E-ABD2-4BAEE048E467}"/>
+              </a:ext>
+            </a:extLst>
+          </p:cNvPr>
+          <p:cNvSpPr txBox="1"/>
+          <p:nvPr/>
+        </p:nvSpPr>
+        <p:spPr>
+          <a:xfrm>
+            <a:off x="6395264" y="5627047"/>
+            <a:ext cx="3098041" cy="369332"/>
+          </a:xfrm>
+          <a:prstGeom prst="rect">
+            <a:avLst/>
+          </a:prstGeom>
+          <a:noFill/>
+        </p:spPr>
+        <p:txBody>
+          <a:bodyPr wrap="square" rtlCol="0">
+            <a:spAutoFit/>
+          </a:bodyPr>
+          <a:lstStyle/>
+          <a:p>
+            <a:pPr algn="ctr"/>
+            <a:r>
+              <a:rPr lang="pt-BR" dirty="0">
+                <a:solidFill>
+                  <a:schemeClr val="bg1">
+                    <a:lumMod val="50000"/>
+                  </a:schemeClr>
+                </a:solidFill>
+              </a:rPr>
+              <a:t>Aplicativo/Web</a:t>
+            </a:r>
+          </a:p>
+        </p:txBody>
+      </p:sp>
+      <p:sp>
+        <p:nvSpPr>
+          <p:cNvPr id="73" name="CaixaDeTexto 72">
+            <a:extLst>
+              <a:ext uri="{FF2B5EF4-FFF2-40B4-BE49-F238E27FC236}">
+                <a16:creationId xmlns:a16="http://schemas.microsoft.com/office/drawing/2014/main" id="{5985F4F9-1D2D-4676-9572-42F6606AF5AC}"/>
+              </a:ext>
+            </a:extLst>
+          </p:cNvPr>
+          <p:cNvSpPr txBox="1"/>
+          <p:nvPr/>
+        </p:nvSpPr>
+        <p:spPr>
+          <a:xfrm>
+            <a:off x="947877" y="1825473"/>
+            <a:ext cx="934872" cy="276999"/>
+          </a:xfrm>
+          <a:prstGeom prst="rect">
+            <a:avLst/>
+          </a:prstGeom>
+          <a:noFill/>
+        </p:spPr>
+        <p:txBody>
+          <a:bodyPr wrap="square" rtlCol="0">
+            <a:spAutoFit/>
+          </a:bodyPr>
+          <a:lstStyle/>
+          <a:p>
+            <a:pPr algn="ctr"/>
+            <a:r>
+              <a:rPr lang="pt-BR" sz="1200" dirty="0">
+                <a:solidFill>
+                  <a:schemeClr val="bg1">
+                    <a:lumMod val="50000"/>
+                  </a:schemeClr>
+                </a:solidFill>
+              </a:rPr>
+              <a:t>Vaga 1</a:t>
+            </a:r>
+          </a:p>
+        </p:txBody>
+      </p:sp>
+      <p:sp>
+        <p:nvSpPr>
+          <p:cNvPr id="74" name="CaixaDeTexto 73">
+            <a:extLst>
+              <a:ext uri="{FF2B5EF4-FFF2-40B4-BE49-F238E27FC236}">
+                <a16:creationId xmlns:a16="http://schemas.microsoft.com/office/drawing/2014/main" id="{071F00D1-E92B-4E7F-B306-3747FDB76631}"/>
+              </a:ext>
+            </a:extLst>
+          </p:cNvPr>
+          <p:cNvSpPr txBox="1"/>
+          <p:nvPr/>
+        </p:nvSpPr>
+        <p:spPr>
+          <a:xfrm>
+            <a:off x="989217" y="2729268"/>
+            <a:ext cx="934872" cy="276999"/>
+          </a:xfrm>
+          <a:prstGeom prst="rect">
+            <a:avLst/>
+          </a:prstGeom>
+          <a:noFill/>
+        </p:spPr>
+        <p:txBody>
+          <a:bodyPr wrap="square" rtlCol="0">
+            <a:spAutoFit/>
+          </a:bodyPr>
+          <a:lstStyle/>
+          <a:p>
+            <a:pPr algn="ctr"/>
+            <a:r>
+              <a:rPr lang="pt-BR" sz="1200" dirty="0">
+                <a:solidFill>
+                  <a:schemeClr val="bg1">
+                    <a:lumMod val="50000"/>
+                  </a:schemeClr>
+                </a:solidFill>
+              </a:rPr>
+              <a:t>Vaga 2</a:t>
+            </a:r>
+          </a:p>
+        </p:txBody>
+      </p:sp>
+      <p:sp>
+        <p:nvSpPr>
+          <p:cNvPr id="75" name="CaixaDeTexto 74">
+            <a:extLst>
+              <a:ext uri="{FF2B5EF4-FFF2-40B4-BE49-F238E27FC236}">
+                <a16:creationId xmlns:a16="http://schemas.microsoft.com/office/drawing/2014/main" id="{44C1203A-7912-4C22-9AC1-60C6BDBCA686}"/>
+              </a:ext>
+            </a:extLst>
+          </p:cNvPr>
+          <p:cNvSpPr txBox="1"/>
+          <p:nvPr/>
+        </p:nvSpPr>
+        <p:spPr>
+          <a:xfrm>
+            <a:off x="989217" y="3850326"/>
+            <a:ext cx="934872" cy="276999"/>
+          </a:xfrm>
+          <a:prstGeom prst="rect">
+            <a:avLst/>
+          </a:prstGeom>
+          <a:noFill/>
+        </p:spPr>
+        <p:txBody>
+          <a:bodyPr wrap="square" rtlCol="0">
+            <a:spAutoFit/>
+          </a:bodyPr>
+          <a:lstStyle/>
+          <a:p>
+            <a:pPr algn="ctr"/>
+            <a:r>
+              <a:rPr lang="pt-BR" sz="1200" dirty="0">
+                <a:solidFill>
+                  <a:srgbClr val="9940CC"/>
+                </a:solidFill>
+              </a:rPr>
+              <a:t>Vaga 3</a:t>
+            </a:r>
+          </a:p>
+        </p:txBody>
+      </p:sp>
+      <p:sp>
+        <p:nvSpPr>
+          <p:cNvPr id="76" name="CaixaDeTexto 75">
+            <a:extLst>
+              <a:ext uri="{FF2B5EF4-FFF2-40B4-BE49-F238E27FC236}">
+                <a16:creationId xmlns:a16="http://schemas.microsoft.com/office/drawing/2014/main" id="{930B661D-33E0-42E1-A86A-A0A19FAD5CF7}"/>
+              </a:ext>
+            </a:extLst>
+          </p:cNvPr>
+          <p:cNvSpPr txBox="1"/>
+          <p:nvPr/>
+        </p:nvSpPr>
+        <p:spPr>
+          <a:xfrm>
+            <a:off x="991489" y="4862536"/>
+            <a:ext cx="934872" cy="276999"/>
+          </a:xfrm>
+          <a:prstGeom prst="rect">
+            <a:avLst/>
+          </a:prstGeom>
+          <a:noFill/>
+        </p:spPr>
+        <p:txBody>
+          <a:bodyPr wrap="square" rtlCol="0">
+            <a:spAutoFit/>
+          </a:bodyPr>
+          <a:lstStyle/>
+          <a:p>
+            <a:pPr algn="ctr"/>
+            <a:r>
+              <a:rPr lang="pt-BR" sz="1200" dirty="0">
+                <a:solidFill>
+                  <a:schemeClr val="bg1">
+                    <a:lumMod val="50000"/>
+                  </a:schemeClr>
+                </a:solidFill>
+              </a:rPr>
+              <a:t>Vaga 4</a:t>
+            </a:r>
+          </a:p>
+        </p:txBody>
+      </p:sp>
+      <p:pic>
+        <p:nvPicPr>
+          <p:cNvPr id="78" name="Imagem 77">
+            <a:extLst>
+              <a:ext uri="{FF2B5EF4-FFF2-40B4-BE49-F238E27FC236}">
+                <a16:creationId xmlns:a16="http://schemas.microsoft.com/office/drawing/2014/main" id="{DAB752EC-1E0A-4E45-B83F-A5080EE1615B}"/>
+              </a:ext>
+            </a:extLst>
+          </p:cNvPr>
+          <p:cNvPicPr>
+            <a:picLocks noChangeAspect="1"/>
+          </p:cNvPicPr>
+          <p:nvPr/>
+        </p:nvPicPr>
+        <p:blipFill>
+          <a:blip r:embed="rId8" cstate="print">
+            <a:duotone>
+              <a:prstClr val="black"/>
+              <a:schemeClr val="accent1">
+                <a:lumMod val="50000"/>
+                <a:tint val="45000"/>
+                <a:satMod val="400000"/>
+              </a:schemeClr>
+            </a:duotone>
+            <a:extLst>
+              <a:ext uri="{28A0092B-C50C-407E-A947-70E740481C1C}">
+                <a14:useLocalDpi xmlns:a14="http://schemas.microsoft.com/office/drawing/2010/main" val="0"/>
+              </a:ext>
+            </a:extLst>
+          </a:blip>
+          <a:stretch>
+            <a:fillRect/>
+          </a:stretch>
+        </p:blipFill>
+        <p:spPr>
+          <a:xfrm flipH="1">
+            <a:off x="749824" y="3101829"/>
+            <a:ext cx="806779" cy="806779"/>
+          </a:xfrm>
+          <a:prstGeom prst="rect">
+            <a:avLst/>
+          </a:prstGeom>
+        </p:spPr>
+      </p:pic>
+      <p:sp>
+        <p:nvSpPr>
+          <p:cNvPr id="79" name="CaixaDeTexto 78">
+            <a:extLst>
+              <a:ext uri="{FF2B5EF4-FFF2-40B4-BE49-F238E27FC236}">
+                <a16:creationId xmlns:a16="http://schemas.microsoft.com/office/drawing/2014/main" id="{C0EEAE68-548B-4597-B9C3-49E70F4D45D6}"/>
+              </a:ext>
+            </a:extLst>
+          </p:cNvPr>
+          <p:cNvSpPr txBox="1"/>
+          <p:nvPr/>
+        </p:nvSpPr>
+        <p:spPr>
+          <a:xfrm>
+            <a:off x="3029004" y="3690147"/>
+            <a:ext cx="1228225" cy="830997"/>
+          </a:xfrm>
+          <a:prstGeom prst="rect">
+            <a:avLst/>
+          </a:prstGeom>
+          <a:noFill/>
+        </p:spPr>
+        <p:txBody>
+          <a:bodyPr wrap="square" rtlCol="0">
+            <a:spAutoFit/>
+          </a:bodyPr>
+          <a:lstStyle/>
+          <a:p>
+            <a:pPr algn="ctr"/>
+            <a:r>
+              <a:rPr lang="pt-BR" sz="1200" dirty="0">
+                <a:solidFill>
+                  <a:schemeClr val="accent1">
+                    <a:lumMod val="75000"/>
+                  </a:schemeClr>
+                </a:solidFill>
+              </a:rPr>
+              <a:t>Informa Vagas Livres e Ocupadas na Região</a:t>
+            </a:r>
+          </a:p>
+        </p:txBody>
+      </p:sp>
+      <p:sp>
+        <p:nvSpPr>
+          <p:cNvPr id="80" name="CaixaDeTexto 79">
+            <a:extLst>
+              <a:ext uri="{FF2B5EF4-FFF2-40B4-BE49-F238E27FC236}">
+                <a16:creationId xmlns:a16="http://schemas.microsoft.com/office/drawing/2014/main" id="{3FAAB88B-FE87-489D-8A1D-8CAECDC8B794}"/>
+              </a:ext>
+            </a:extLst>
+          </p:cNvPr>
+          <p:cNvSpPr txBox="1"/>
+          <p:nvPr/>
+        </p:nvSpPr>
+        <p:spPr>
+          <a:xfrm>
+            <a:off x="5380145" y="3718216"/>
+            <a:ext cx="1579626" cy="830997"/>
+          </a:xfrm>
+          <a:prstGeom prst="rect">
+            <a:avLst/>
+          </a:prstGeom>
+          <a:noFill/>
+        </p:spPr>
+        <p:txBody>
+          <a:bodyPr wrap="square" rtlCol="0">
+            <a:spAutoFit/>
+          </a:bodyPr>
+          <a:lstStyle/>
+          <a:p>
+            <a:pPr algn="ctr"/>
+            <a:r>
+              <a:rPr lang="pt-BR" sz="1200" dirty="0">
+                <a:solidFill>
+                  <a:schemeClr val="accent1">
+                    <a:lumMod val="75000"/>
+                  </a:schemeClr>
+                </a:solidFill>
+              </a:rPr>
+              <a:t>Processa a informação e classifica o local, tipo e disponibilidade da vaga na região</a:t>
+            </a:r>
+          </a:p>
+        </p:txBody>
+      </p:sp>
+      <p:sp>
+        <p:nvSpPr>
+          <p:cNvPr id="81" name="CaixaDeTexto 80">
+            <a:extLst>
+              <a:ext uri="{FF2B5EF4-FFF2-40B4-BE49-F238E27FC236}">
+                <a16:creationId xmlns:a16="http://schemas.microsoft.com/office/drawing/2014/main" id="{D3DCCC21-4535-44B3-A443-CE9147DE0325}"/>
+              </a:ext>
+            </a:extLst>
+          </p:cNvPr>
+          <p:cNvSpPr txBox="1"/>
+          <p:nvPr/>
+        </p:nvSpPr>
+        <p:spPr>
+          <a:xfrm>
+            <a:off x="8004008" y="3310903"/>
+            <a:ext cx="1208214" cy="1200329"/>
+          </a:xfrm>
+          <a:prstGeom prst="rect">
+            <a:avLst/>
+          </a:prstGeom>
+          <a:noFill/>
+        </p:spPr>
+        <p:txBody>
+          <a:bodyPr wrap="square" rtlCol="0">
+            <a:spAutoFit/>
+          </a:bodyPr>
+          <a:lstStyle/>
+          <a:p>
+            <a:pPr algn="ctr"/>
+            <a:r>
+              <a:rPr lang="pt-BR" sz="1200" dirty="0">
+                <a:solidFill>
+                  <a:schemeClr val="accent1">
+                    <a:lumMod val="75000"/>
+                  </a:schemeClr>
+                </a:solidFill>
+              </a:rPr>
+              <a:t>Informa o resultado do processamento e recebe solicitações de reservas</a:t>
+            </a:r>
+          </a:p>
+        </p:txBody>
+      </p:sp>
+      <p:sp>
+        <p:nvSpPr>
+          <p:cNvPr id="82" name="CaixaDeTexto 81">
+            <a:extLst>
+              <a:ext uri="{FF2B5EF4-FFF2-40B4-BE49-F238E27FC236}">
+                <a16:creationId xmlns:a16="http://schemas.microsoft.com/office/drawing/2014/main" id="{64A47887-1341-4502-B4AC-9246A6AB33A0}"/>
+              </a:ext>
+            </a:extLst>
+          </p:cNvPr>
+          <p:cNvSpPr txBox="1"/>
+          <p:nvPr/>
+        </p:nvSpPr>
+        <p:spPr>
+          <a:xfrm>
+            <a:off x="3177195" y="2340895"/>
+            <a:ext cx="1228225" cy="646331"/>
+          </a:xfrm>
+          <a:prstGeom prst="rect">
+            <a:avLst/>
+          </a:prstGeom>
+          <a:noFill/>
+        </p:spPr>
+        <p:txBody>
+          <a:bodyPr wrap="square" rtlCol="0">
+            <a:spAutoFit/>
+          </a:bodyPr>
+          <a:lstStyle/>
+          <a:p>
+            <a:pPr algn="ctr"/>
+            <a:r>
+              <a:rPr lang="pt-BR" sz="1200" dirty="0">
+                <a:solidFill>
+                  <a:schemeClr val="accent1">
+                    <a:lumMod val="75000"/>
+                  </a:schemeClr>
+                </a:solidFill>
+              </a:rPr>
+              <a:t>Reserva/Libera Virtualmente uma Vaga</a:t>
+            </a:r>
+          </a:p>
+        </p:txBody>
+      </p:sp>
+      <p:sp>
+        <p:nvSpPr>
+          <p:cNvPr id="83" name="CaixaDeTexto 82">
+            <a:extLst>
+              <a:ext uri="{FF2B5EF4-FFF2-40B4-BE49-F238E27FC236}">
+                <a16:creationId xmlns:a16="http://schemas.microsoft.com/office/drawing/2014/main" id="{30A195DC-010E-4889-93F8-85BBA98E6830}"/>
+              </a:ext>
+            </a:extLst>
+          </p:cNvPr>
+          <p:cNvSpPr txBox="1"/>
+          <p:nvPr/>
+        </p:nvSpPr>
+        <p:spPr>
+          <a:xfrm>
+            <a:off x="5733866" y="5287487"/>
+            <a:ext cx="1634253" cy="646331"/>
+          </a:xfrm>
+          <a:prstGeom prst="rect">
+            <a:avLst/>
+          </a:prstGeom>
+          <a:noFill/>
+        </p:spPr>
+        <p:txBody>
+          <a:bodyPr wrap="square" rtlCol="0">
+            <a:spAutoFit/>
+          </a:bodyPr>
+          <a:lstStyle/>
+          <a:p>
+            <a:pPr algn="ctr"/>
+            <a:r>
+              <a:rPr lang="pt-BR" sz="1200" dirty="0">
+                <a:solidFill>
+                  <a:schemeClr val="accent1">
+                    <a:lumMod val="75000"/>
+                  </a:schemeClr>
+                </a:solidFill>
+              </a:rPr>
+              <a:t>Vê vagas e informações/Solicita reservas</a:t>
+            </a:r>
           </a:p>
         </p:txBody>
       </p:sp>
     </p:spTree>
     <p:extLst>
       <p:ext uri="{BB962C8B-B14F-4D97-AF65-F5344CB8AC3E}">
-        <p14:creationId xmlns:p14="http://schemas.microsoft.com/office/powerpoint/2010/main" val="1836809286"/>
+        <p14:creationId xmlns:p14="http://schemas.microsoft.com/office/powerpoint/2010/main" val="1228936730"/>
       </p:ext>
     </p:extLst>
   </p:cSld>

</xml_diff>

<commit_message>
Minha parte do relatório
</commit_message>
<xml_diff>
--- a/Apresentação - Projeto.pptx
+++ b/Apresentação - Projeto.pptx
@@ -257,7 +257,7 @@
           <a:p>
             <a:fld id="{10FE5BFE-EBFF-4D6E-8C56-06511E61A9FB}" type="datetimeFigureOut">
               <a:rPr lang="pt-BR" smtClean="0"/>
-              <a:t>01/09/2017</a:t>
+              <a:t>02/12/2017</a:t>
             </a:fld>
             <a:endParaRPr lang="pt-BR"/>
           </a:p>
@@ -427,7 +427,7 @@
           <a:p>
             <a:fld id="{10FE5BFE-EBFF-4D6E-8C56-06511E61A9FB}" type="datetimeFigureOut">
               <a:rPr lang="pt-BR" smtClean="0"/>
-              <a:t>01/09/2017</a:t>
+              <a:t>02/12/2017</a:t>
             </a:fld>
             <a:endParaRPr lang="pt-BR"/>
           </a:p>
@@ -607,7 +607,7 @@
           <a:p>
             <a:fld id="{10FE5BFE-EBFF-4D6E-8C56-06511E61A9FB}" type="datetimeFigureOut">
               <a:rPr lang="pt-BR" smtClean="0"/>
-              <a:t>01/09/2017</a:t>
+              <a:t>02/12/2017</a:t>
             </a:fld>
             <a:endParaRPr lang="pt-BR"/>
           </a:p>
@@ -777,7 +777,7 @@
           <a:p>
             <a:fld id="{10FE5BFE-EBFF-4D6E-8C56-06511E61A9FB}" type="datetimeFigureOut">
               <a:rPr lang="pt-BR" smtClean="0"/>
-              <a:t>01/09/2017</a:t>
+              <a:t>02/12/2017</a:t>
             </a:fld>
             <a:endParaRPr lang="pt-BR"/>
           </a:p>
@@ -1021,7 +1021,7 @@
           <a:p>
             <a:fld id="{10FE5BFE-EBFF-4D6E-8C56-06511E61A9FB}" type="datetimeFigureOut">
               <a:rPr lang="pt-BR" smtClean="0"/>
-              <a:t>01/09/2017</a:t>
+              <a:t>02/12/2017</a:t>
             </a:fld>
             <a:endParaRPr lang="pt-BR"/>
           </a:p>
@@ -1253,7 +1253,7 @@
           <a:p>
             <a:fld id="{10FE5BFE-EBFF-4D6E-8C56-06511E61A9FB}" type="datetimeFigureOut">
               <a:rPr lang="pt-BR" smtClean="0"/>
-              <a:t>01/09/2017</a:t>
+              <a:t>02/12/2017</a:t>
             </a:fld>
             <a:endParaRPr lang="pt-BR"/>
           </a:p>
@@ -1620,7 +1620,7 @@
           <a:p>
             <a:fld id="{10FE5BFE-EBFF-4D6E-8C56-06511E61A9FB}" type="datetimeFigureOut">
               <a:rPr lang="pt-BR" smtClean="0"/>
-              <a:t>01/09/2017</a:t>
+              <a:t>02/12/2017</a:t>
             </a:fld>
             <a:endParaRPr lang="pt-BR"/>
           </a:p>
@@ -1738,7 +1738,7 @@
           <a:p>
             <a:fld id="{10FE5BFE-EBFF-4D6E-8C56-06511E61A9FB}" type="datetimeFigureOut">
               <a:rPr lang="pt-BR" smtClean="0"/>
-              <a:t>01/09/2017</a:t>
+              <a:t>02/12/2017</a:t>
             </a:fld>
             <a:endParaRPr lang="pt-BR"/>
           </a:p>
@@ -1833,7 +1833,7 @@
           <a:p>
             <a:fld id="{10FE5BFE-EBFF-4D6E-8C56-06511E61A9FB}" type="datetimeFigureOut">
               <a:rPr lang="pt-BR" smtClean="0"/>
-              <a:t>01/09/2017</a:t>
+              <a:t>02/12/2017</a:t>
             </a:fld>
             <a:endParaRPr lang="pt-BR"/>
           </a:p>
@@ -2110,7 +2110,7 @@
           <a:p>
             <a:fld id="{10FE5BFE-EBFF-4D6E-8C56-06511E61A9FB}" type="datetimeFigureOut">
               <a:rPr lang="pt-BR" smtClean="0"/>
-              <a:t>01/09/2017</a:t>
+              <a:t>02/12/2017</a:t>
             </a:fld>
             <a:endParaRPr lang="pt-BR"/>
           </a:p>
@@ -2367,7 +2367,7 @@
           <a:p>
             <a:fld id="{10FE5BFE-EBFF-4D6E-8C56-06511E61A9FB}" type="datetimeFigureOut">
               <a:rPr lang="pt-BR" smtClean="0"/>
-              <a:t>01/09/2017</a:t>
+              <a:t>02/12/2017</a:t>
             </a:fld>
             <a:endParaRPr lang="pt-BR"/>
           </a:p>
@@ -2589,7 +2589,7 @@
           <a:p>
             <a:fld id="{10FE5BFE-EBFF-4D6E-8C56-06511E61A9FB}" type="datetimeFigureOut">
               <a:rPr lang="pt-BR" smtClean="0"/>
-              <a:t>01/09/2017</a:t>
+              <a:t>02/12/2017</a:t>
             </a:fld>
             <a:endParaRPr lang="pt-BR"/>
           </a:p>
@@ -4403,7 +4403,7 @@
         </p:nvSpPr>
         <p:spPr>
           <a:xfrm>
-            <a:off x="7001302" y="4157821"/>
+            <a:off x="3736266" y="4336017"/>
             <a:ext cx="1885966" cy="1697069"/>
           </a:xfrm>
           <a:prstGeom prst="rect">
@@ -4942,42 +4942,6 @@
       </p:pic>
       <p:pic>
         <p:nvPicPr>
-          <p:cNvPr id="23" name="Imagem 22" descr="Uma imagem contendo gráficos vetoriais&#10;&#10;Descrição gerada com alta confiança">
-            <a:extLst>
-              <a:ext uri="{FF2B5EF4-FFF2-40B4-BE49-F238E27FC236}">
-                <a16:creationId xmlns:a16="http://schemas.microsoft.com/office/drawing/2014/main" id="{5F68E8C8-EE65-416D-A554-3773142907A9}"/>
-              </a:ext>
-            </a:extLst>
-          </p:cNvPr>
-          <p:cNvPicPr>
-            <a:picLocks noChangeAspect="1"/>
-          </p:cNvPicPr>
-          <p:nvPr/>
-        </p:nvPicPr>
-        <p:blipFill>
-          <a:blip r:embed="rId5" cstate="print">
-            <a:extLst>
-              <a:ext uri="{28A0092B-C50C-407E-A947-70E740481C1C}">
-                <a14:useLocalDpi xmlns:a14="http://schemas.microsoft.com/office/drawing/2010/main" val="0"/>
-              </a:ext>
-            </a:extLst>
-          </a:blip>
-          <a:stretch>
-            <a:fillRect/>
-          </a:stretch>
-        </p:blipFill>
-        <p:spPr>
-          <a:xfrm>
-            <a:off x="7419940" y="2890591"/>
-            <a:ext cx="840624" cy="840624"/>
-          </a:xfrm>
-          <a:prstGeom prst="rect">
-            <a:avLst/>
-          </a:prstGeom>
-        </p:spPr>
-      </p:pic>
-      <p:pic>
-        <p:nvPicPr>
           <p:cNvPr id="25" name="Imagem 24">
             <a:extLst>
               <a:ext uri="{FF2B5EF4-FFF2-40B4-BE49-F238E27FC236}">
@@ -5004,7 +4968,7 @@
         </p:blipFill>
         <p:spPr>
           <a:xfrm>
-            <a:off x="7333612" y="4584427"/>
+            <a:off x="4135009" y="4557742"/>
             <a:ext cx="1058988" cy="1058988"/>
           </a:xfrm>
           <a:prstGeom prst="rect">
@@ -5356,10 +5320,10 @@
       </p:cxnSp>
       <p:cxnSp>
         <p:nvCxnSpPr>
-          <p:cNvPr id="53" name="Conector de Seta Reta 52">
+          <p:cNvPr id="55" name="Conector de Seta Reta 54">
             <a:extLst>
               <a:ext uri="{FF2B5EF4-FFF2-40B4-BE49-F238E27FC236}">
-                <a16:creationId xmlns:a16="http://schemas.microsoft.com/office/drawing/2014/main" id="{B1ADFABE-3FD3-4E1F-8CCE-27AB82A428A9}"/>
+                <a16:creationId xmlns:a16="http://schemas.microsoft.com/office/drawing/2014/main" id="{1D74C6EA-6D79-4D24-8E7E-7C460F82ADF3}"/>
               </a:ext>
             </a:extLst>
           </p:cNvPr>
@@ -5369,96 +5333,8 @@
           <p:nvPr/>
         </p:nvCxnSpPr>
         <p:spPr>
-          <a:xfrm flipH="1">
-            <a:off x="6668782" y="3196349"/>
-            <a:ext cx="685689" cy="0"/>
-          </a:xfrm>
-          <a:prstGeom prst="straightConnector1">
-            <a:avLst/>
-          </a:prstGeom>
-          <a:ln>
-            <a:solidFill>
-              <a:srgbClr val="9CE169"/>
-            </a:solidFill>
-            <a:tailEnd type="triangle"/>
-          </a:ln>
-        </p:spPr>
-        <p:style>
-          <a:lnRef idx="1">
-            <a:schemeClr val="accent1"/>
-          </a:lnRef>
-          <a:fillRef idx="0">
-            <a:schemeClr val="accent1"/>
-          </a:fillRef>
-          <a:effectRef idx="0">
-            <a:schemeClr val="accent1"/>
-          </a:effectRef>
-          <a:fontRef idx="minor">
-            <a:schemeClr val="tx1"/>
-          </a:fontRef>
-        </p:style>
-      </p:cxnSp>
-      <p:cxnSp>
-        <p:nvCxnSpPr>
-          <p:cNvPr id="54" name="Conector de Seta Reta 53">
-            <a:extLst>
-              <a:ext uri="{FF2B5EF4-FFF2-40B4-BE49-F238E27FC236}">
-                <a16:creationId xmlns:a16="http://schemas.microsoft.com/office/drawing/2014/main" id="{93E11A4D-EBCB-4B25-8336-315F504CD1CB}"/>
-              </a:ext>
-            </a:extLst>
-          </p:cNvPr>
-          <p:cNvCxnSpPr>
-            <a:cxnSpLocks/>
-          </p:cNvCxnSpPr>
-          <p:nvPr/>
-        </p:nvCxnSpPr>
-        <p:spPr>
-          <a:xfrm>
-            <a:off x="6679098" y="3434265"/>
-            <a:ext cx="689021" cy="0"/>
-          </a:xfrm>
-          <a:prstGeom prst="straightConnector1">
-            <a:avLst/>
-          </a:prstGeom>
-          <a:ln>
-            <a:solidFill>
-              <a:srgbClr val="9CE169"/>
-            </a:solidFill>
-            <a:tailEnd type="triangle"/>
-          </a:ln>
-        </p:spPr>
-        <p:style>
-          <a:lnRef idx="1">
-            <a:schemeClr val="accent1"/>
-          </a:lnRef>
-          <a:fillRef idx="0">
-            <a:schemeClr val="accent1"/>
-          </a:fillRef>
-          <a:effectRef idx="0">
-            <a:schemeClr val="accent1"/>
-          </a:effectRef>
-          <a:fontRef idx="minor">
-            <a:schemeClr val="tx1"/>
-          </a:fontRef>
-        </p:style>
-      </p:cxnSp>
-      <p:cxnSp>
-        <p:nvCxnSpPr>
-          <p:cNvPr id="55" name="Conector de Seta Reta 54">
-            <a:extLst>
-              <a:ext uri="{FF2B5EF4-FFF2-40B4-BE49-F238E27FC236}">
-                <a16:creationId xmlns:a16="http://schemas.microsoft.com/office/drawing/2014/main" id="{1D74C6EA-6D79-4D24-8E7E-7C460F82ADF3}"/>
-              </a:ext>
-            </a:extLst>
-          </p:cNvPr>
-          <p:cNvCxnSpPr>
-            <a:cxnSpLocks/>
-          </p:cNvCxnSpPr>
-          <p:nvPr/>
-        </p:nvCxnSpPr>
-        <p:spPr>
           <a:xfrm flipV="1">
-            <a:off x="7779591" y="3852160"/>
+            <a:off x="4580988" y="3825475"/>
             <a:ext cx="1" cy="585860"/>
           </a:xfrm>
           <a:prstGeom prst="straightConnector1">
@@ -5502,7 +5378,7 @@
         </p:nvCxnSpPr>
         <p:spPr>
           <a:xfrm>
-            <a:off x="7949434" y="3877622"/>
+            <a:off x="4750831" y="3850937"/>
             <a:ext cx="0" cy="560398"/>
           </a:xfrm>
           <a:prstGeom prst="straightConnector1">
@@ -5628,7 +5504,7 @@
         </p:nvSpPr>
         <p:spPr>
           <a:xfrm>
-            <a:off x="6395264" y="5627047"/>
+            <a:off x="3196661" y="5600362"/>
             <a:ext cx="3098041" cy="369332"/>
           </a:xfrm>
           <a:prstGeom prst="rect">
@@ -5923,7 +5799,7 @@
         <p:spPr>
           <a:xfrm>
             <a:off x="5380145" y="3718216"/>
-            <a:ext cx="1579626" cy="830997"/>
+            <a:ext cx="1579626" cy="1015663"/>
           </a:xfrm>
           <a:prstGeom prst="rect">
             <a:avLst/>
@@ -5945,7 +5821,7 @@
                   </a:schemeClr>
                 </a:solidFill>
               </a:rPr>
-              <a:t>Processa a informação e classifica o local, tipo e disponibilidade da vaga na região</a:t>
+              <a:t>Processa a informação e classifica o local, tipo e disponibilidade da vaga na região e dados do Usuário</a:t>
             </a:r>
           </a:p>
         </p:txBody>
@@ -5964,7 +5840,7 @@
         </p:nvSpPr>
         <p:spPr>
           <a:xfrm>
-            <a:off x="8004008" y="3310903"/>
+            <a:off x="4335599" y="1769296"/>
             <a:ext cx="1208214" cy="1200329"/>
           </a:xfrm>
           <a:prstGeom prst="rect">
@@ -6048,7 +5924,7 @@
         </p:nvSpPr>
         <p:spPr>
           <a:xfrm>
-            <a:off x="5733866" y="5287487"/>
+            <a:off x="2535263" y="5260802"/>
             <a:ext cx="1634253" cy="646331"/>
           </a:xfrm>
           <a:prstGeom prst="rect">

</xml_diff>